<commit_message>
Geoparsing data: Cleaning steps 0 to 4
</commit_message>
<xml_diff>
--- a/data/geoparsing/Error_geoparsing.pptx
+++ b/data/geoparsing/Error_geoparsing.pptx
@@ -17,6 +17,7 @@
     <p:sldId id="265" r:id="rId11"/>
     <p:sldId id="266" r:id="rId12"/>
     <p:sldId id="267" r:id="rId13"/>
+    <p:sldId id="268" r:id="rId14"/>
   </p:sldIdLst>
   <p:sldSz cx="12192000" cy="6858000"/>
   <p:notesSz cx="6858000" cy="9144000"/>
@@ -262,7 +263,7 @@
                   <a:bodyPr/>
                   <a:lstStyle/>
                   <a:p>
-                    <a:fld id="{4FEDCDE6-A89A-4946-8A13-A887EBAE3BBF}" type="CELLRANGE">
+                    <a:fld id="{25737099-F42B-48A8-A113-73B4DCDE725D}" type="CELLRANGE">
                       <a:rPr lang="en-GB"/>
                       <a:pPr/>
                       <a:t>[PLAGECELL]</a:t>
@@ -295,7 +296,7 @@
                   <a:bodyPr/>
                   <a:lstStyle/>
                   <a:p>
-                    <a:fld id="{3A38FB6B-EBDB-449C-94C6-BB13097B556A}" type="CELLRANGE">
+                    <a:fld id="{C65475F9-6BB8-4149-BB3B-C863A77D3512}" type="CELLRANGE">
                       <a:rPr lang="en-GB"/>
                       <a:pPr/>
                       <a:t>[PLAGECELL]</a:t>
@@ -328,7 +329,7 @@
                   <a:bodyPr/>
                   <a:lstStyle/>
                   <a:p>
-                    <a:fld id="{48AE7A5E-F6AD-4A9F-B487-E9C9633FBF72}" type="CELLRANGE">
+                    <a:fld id="{586E426E-16F2-4ECA-8518-D173DDF8E7A7}" type="CELLRANGE">
                       <a:rPr lang="en-GB"/>
                       <a:pPr/>
                       <a:t>[PLAGECELL]</a:t>
@@ -361,7 +362,7 @@
                   <a:bodyPr/>
                   <a:lstStyle/>
                   <a:p>
-                    <a:fld id="{29C52E43-95A8-449E-A155-95E681B25EB4}" type="CELLRANGE">
+                    <a:fld id="{F3E7B82E-E7B6-4D66-AB3B-7ED11F6C3C6C}" type="CELLRANGE">
                       <a:rPr lang="en-GB"/>
                       <a:pPr/>
                       <a:t>[PLAGECELL]</a:t>
@@ -876,7 +877,7 @@
                   <a:bodyPr/>
                   <a:lstStyle/>
                   <a:p>
-                    <a:fld id="{599D323A-A464-47D1-8204-51634A3861A6}" type="CELLRANGE">
+                    <a:fld id="{E733370B-E1E5-4B74-98C7-7E5BD62CC84E}" type="CELLRANGE">
                       <a:rPr lang="en-GB"/>
                       <a:pPr/>
                       <a:t>[PLAGECELL]</a:t>
@@ -909,7 +910,7 @@
                   <a:bodyPr/>
                   <a:lstStyle/>
                   <a:p>
-                    <a:fld id="{AC6323D8-B943-4D4F-A709-82301502218A}" type="CELLRANGE">
+                    <a:fld id="{D52BF9C2-73E9-4B3B-8982-7A5AF2324803}" type="CELLRANGE">
                       <a:rPr lang="en-GB"/>
                       <a:pPr/>
                       <a:t>[PLAGECELL]</a:t>
@@ -942,7 +943,7 @@
                   <a:bodyPr/>
                   <a:lstStyle/>
                   <a:p>
-                    <a:fld id="{E13CEDDD-B5BF-4C6D-A1B4-F12C75E7E53F}" type="CELLRANGE">
+                    <a:fld id="{38B36B77-4D02-4EAE-9D41-0B988CE189FE}" type="CELLRANGE">
                       <a:rPr lang="en-GB"/>
                       <a:pPr/>
                       <a:t>[PLAGECELL]</a:t>
@@ -975,7 +976,7 @@
                   <a:bodyPr/>
                   <a:lstStyle/>
                   <a:p>
-                    <a:fld id="{3301FC20-22D4-4537-99EE-324FDF528EB9}" type="CELLRANGE">
+                    <a:fld id="{28673DFD-4ED3-4B42-9907-02F6C8A9F0F4}" type="CELLRANGE">
                       <a:rPr lang="en-GB"/>
                       <a:pPr/>
                       <a:t>[PLAGECELL]</a:t>
@@ -1008,7 +1009,7 @@
                   <a:bodyPr/>
                   <a:lstStyle/>
                   <a:p>
-                    <a:fld id="{4DEBBC0F-6832-4A1D-9F2F-14D42FDAF33A}" type="CELLRANGE">
+                    <a:fld id="{A2B157EA-7AB5-4072-9AC8-EADEBA791DA3}" type="CELLRANGE">
                       <a:rPr lang="en-GB"/>
                       <a:pPr/>
                       <a:t>[PLAGECELL]</a:t>
@@ -1041,7 +1042,7 @@
                   <a:bodyPr/>
                   <a:lstStyle/>
                   <a:p>
-                    <a:fld id="{872C5C25-FBFE-4D78-BA27-C636332E3B67}" type="CELLRANGE">
+                    <a:fld id="{28CED11F-6E53-4459-ABDD-E3E11264B8F9}" type="CELLRANGE">
                       <a:rPr lang="en-GB"/>
                       <a:pPr/>
                       <a:t>[PLAGECELL]</a:t>
@@ -1074,7 +1075,7 @@
                   <a:bodyPr/>
                   <a:lstStyle/>
                   <a:p>
-                    <a:fld id="{3FB548A8-3869-4240-811D-A0097095186F}" type="CELLRANGE">
+                    <a:fld id="{BB28A303-E9B7-4272-B7B0-ED6900BA242D}" type="CELLRANGE">
                       <a:rPr lang="en-GB"/>
                       <a:pPr/>
                       <a:t>[PLAGECELL]</a:t>
@@ -1107,7 +1108,7 @@
                   <a:bodyPr/>
                   <a:lstStyle/>
                   <a:p>
-                    <a:fld id="{16AAA4AB-06F1-4947-BD49-8FFDC7D3F4C7}" type="CELLRANGE">
+                    <a:fld id="{A621237A-89A4-44FD-BF1B-FFE5D01F9C46}" type="CELLRANGE">
                       <a:rPr lang="en-GB"/>
                       <a:pPr/>
                       <a:t>[PLAGECELL]</a:t>
@@ -1140,7 +1141,7 @@
                   <a:bodyPr/>
                   <a:lstStyle/>
                   <a:p>
-                    <a:fld id="{08D6C008-D003-42E3-9BF2-3F8D061D7A78}" type="CELLRANGE">
+                    <a:fld id="{0EE6B6F0-130A-4B51-BB21-0F369BB27428}" type="CELLRANGE">
                       <a:rPr lang="en-GB"/>
                       <a:pPr/>
                       <a:t>[PLAGECELL]</a:t>
@@ -1173,7 +1174,7 @@
                   <a:bodyPr/>
                   <a:lstStyle/>
                   <a:p>
-                    <a:fld id="{2B96A7D8-9FFA-4B50-AC90-80C9F715D7C1}" type="CELLRANGE">
+                    <a:fld id="{549CBC65-8EE1-4260-B13F-195C16158B2E}" type="CELLRANGE">
                       <a:rPr lang="en-GB"/>
                       <a:pPr/>
                       <a:t>[PLAGECELL]</a:t>
@@ -1742,7 +1743,7 @@
                   <a:bodyPr/>
                   <a:lstStyle/>
                   <a:p>
-                    <a:fld id="{38EA221F-DC9C-469A-92F7-936188DCFB2A}" type="CELLRANGE">
+                    <a:fld id="{FE1FB807-D2F3-4FB8-BA99-818B138423A1}" type="CELLRANGE">
                       <a:rPr lang="en-GB"/>
                       <a:pPr/>
                       <a:t>[PLAGECELL]</a:t>
@@ -1775,7 +1776,7 @@
                   <a:bodyPr/>
                   <a:lstStyle/>
                   <a:p>
-                    <a:fld id="{65F8136B-5EA8-46C1-9C88-AAAA4CE17CAA}" type="CELLRANGE">
+                    <a:fld id="{CD20187E-D455-43B7-BE58-FD5EF6D0926D}" type="CELLRANGE">
                       <a:rPr lang="en-GB"/>
                       <a:pPr/>
                       <a:t>[PLAGECELL]</a:t>
@@ -1808,7 +1809,7 @@
                   <a:bodyPr/>
                   <a:lstStyle/>
                   <a:p>
-                    <a:fld id="{4902A370-058C-4830-A68D-D03D7AA1A9CD}" type="CELLRANGE">
+                    <a:fld id="{170844A0-3CC2-4303-A1FA-3F83643F8C8E}" type="CELLRANGE">
                       <a:rPr lang="en-GB"/>
                       <a:pPr/>
                       <a:t>[PLAGECELL]</a:t>
@@ -1841,7 +1842,7 @@
                   <a:bodyPr/>
                   <a:lstStyle/>
                   <a:p>
-                    <a:fld id="{0D207DCB-3746-4DA3-940C-46D760644B87}" type="CELLRANGE">
+                    <a:fld id="{F4A88DF2-A990-443C-8D3A-29913A36ED05}" type="CELLRANGE">
                       <a:rPr lang="en-GB"/>
                       <a:pPr/>
                       <a:t>[PLAGECELL]</a:t>
@@ -1874,7 +1875,7 @@
                   <a:bodyPr/>
                   <a:lstStyle/>
                   <a:p>
-                    <a:fld id="{D18D029E-CD3B-43C7-BE1B-FC15B49A73D5}" type="CELLRANGE">
+                    <a:fld id="{58F62AC9-BB31-4E83-9CA3-232D1B868D41}" type="CELLRANGE">
                       <a:rPr lang="en-GB"/>
                       <a:pPr/>
                       <a:t>[PLAGECELL]</a:t>
@@ -1907,7 +1908,7 @@
                   <a:bodyPr/>
                   <a:lstStyle/>
                   <a:p>
-                    <a:fld id="{7E9339E7-DDB1-4B50-974F-159E65D56FCD}" type="CELLRANGE">
+                    <a:fld id="{1F1A4874-210E-4539-B298-615AD042C55C}" type="CELLRANGE">
                       <a:rPr lang="en-GB"/>
                       <a:pPr/>
                       <a:t>[PLAGECELL]</a:t>
@@ -1940,7 +1941,7 @@
                   <a:bodyPr/>
                   <a:lstStyle/>
                   <a:p>
-                    <a:fld id="{EAA7F547-BE0A-4F13-BF09-475FE240527D}" type="CELLRANGE">
+                    <a:fld id="{56116548-00E9-40DD-B44A-AEE3C588F3DD}" type="CELLRANGE">
                       <a:rPr lang="en-GB"/>
                       <a:pPr/>
                       <a:t>[PLAGECELL]</a:t>
@@ -1973,7 +1974,7 @@
                   <a:bodyPr/>
                   <a:lstStyle/>
                   <a:p>
-                    <a:fld id="{80897771-37D4-484E-83B9-62479F3755C3}" type="CELLRANGE">
+                    <a:fld id="{FA181B74-CEF5-41FC-A6C9-4F3B077261D4}" type="CELLRANGE">
                       <a:rPr lang="en-GB"/>
                       <a:pPr/>
                       <a:t>[PLAGECELL]</a:t>
@@ -2006,7 +2007,7 @@
                   <a:bodyPr/>
                   <a:lstStyle/>
                   <a:p>
-                    <a:fld id="{E770E62A-CFEA-4702-A96E-400B6F860DDA}" type="CELLRANGE">
+                    <a:fld id="{E9A289BB-A193-4F44-8DB0-FA3EA7A731FF}" type="CELLRANGE">
                       <a:rPr lang="en-GB"/>
                       <a:pPr/>
                       <a:t>[PLAGECELL]</a:t>
@@ -2039,7 +2040,7 @@
                   <a:bodyPr/>
                   <a:lstStyle/>
                   <a:p>
-                    <a:fld id="{C48C0C30-0A51-426C-B98A-DF7F7D01F115}" type="CELLRANGE">
+                    <a:fld id="{C364882E-E0A0-429A-918E-467DC4D50D94}" type="CELLRANGE">
                       <a:rPr lang="en-GB"/>
                       <a:pPr/>
                       <a:t>[PLAGECELL]</a:t>
@@ -2608,7 +2609,7 @@
                   <a:bodyPr/>
                   <a:lstStyle/>
                   <a:p>
-                    <a:fld id="{CE8B2139-2353-491C-BFE5-BB1A6039994B}" type="CELLRANGE">
+                    <a:fld id="{1F95C306-85D1-446C-AF4E-11A3C41D498D}" type="CELLRANGE">
                       <a:rPr lang="en-GB"/>
                       <a:pPr/>
                       <a:t>[PLAGECELL]</a:t>
@@ -2641,7 +2642,7 @@
                   <a:bodyPr/>
                   <a:lstStyle/>
                   <a:p>
-                    <a:fld id="{BBCF256C-233B-4EB2-A911-EEC372085741}" type="CELLRANGE">
+                    <a:fld id="{29860C43-D3B5-4139-8AFC-EDF91E3AE0ED}" type="CELLRANGE">
                       <a:rPr lang="en-GB"/>
                       <a:pPr/>
                       <a:t>[PLAGECELL]</a:t>
@@ -2674,7 +2675,7 @@
                   <a:bodyPr/>
                   <a:lstStyle/>
                   <a:p>
-                    <a:fld id="{B56C2A4D-7B60-43E6-967C-B94D0B2D40DF}" type="CELLRANGE">
+                    <a:fld id="{FAECA2D4-9FF2-49E4-9F41-D57096CDF063}" type="CELLRANGE">
                       <a:rPr lang="en-GB"/>
                       <a:pPr/>
                       <a:t>[PLAGECELL]</a:t>
@@ -2707,7 +2708,7 @@
                   <a:bodyPr/>
                   <a:lstStyle/>
                   <a:p>
-                    <a:fld id="{E1BAFA18-5184-4718-A280-46F4EB33F27C}" type="CELLRANGE">
+                    <a:fld id="{40E99B61-A27F-4E41-8EA5-22B4715123C1}" type="CELLRANGE">
                       <a:rPr lang="en-GB"/>
                       <a:pPr/>
                       <a:t>[PLAGECELL]</a:t>
@@ -2740,7 +2741,7 @@
                   <a:bodyPr/>
                   <a:lstStyle/>
                   <a:p>
-                    <a:fld id="{E4BDD854-0834-4B14-A0BE-DF86E7D8A84B}" type="CELLRANGE">
+                    <a:fld id="{4E5945AB-07D9-4F52-95E8-37E8840CDB03}" type="CELLRANGE">
                       <a:rPr lang="en-GB"/>
                       <a:pPr/>
                       <a:t>[PLAGECELL]</a:t>
@@ -2773,7 +2774,7 @@
                   <a:bodyPr/>
                   <a:lstStyle/>
                   <a:p>
-                    <a:fld id="{113131D6-2EF4-4A50-8C24-A1DF567B1421}" type="CELLRANGE">
+                    <a:fld id="{D1F54952-5671-451F-BCF2-8EEE4243DBE4}" type="CELLRANGE">
                       <a:rPr lang="en-GB"/>
                       <a:pPr/>
                       <a:t>[PLAGECELL]</a:t>
@@ -2806,7 +2807,7 @@
                   <a:bodyPr/>
                   <a:lstStyle/>
                   <a:p>
-                    <a:fld id="{3F34610C-EFEA-4D5D-B60A-A1994CEE5F63}" type="CELLRANGE">
+                    <a:fld id="{5208FA9F-AFD3-4AC5-83E7-C454994DFCAD}" type="CELLRANGE">
                       <a:rPr lang="en-GB"/>
                       <a:pPr/>
                       <a:t>[PLAGECELL]</a:t>
@@ -2839,7 +2840,7 @@
                   <a:bodyPr/>
                   <a:lstStyle/>
                   <a:p>
-                    <a:fld id="{A54C54F4-BF54-4CB2-AA96-61BCEC749162}" type="CELLRANGE">
+                    <a:fld id="{0AEF4493-185D-4F9C-BC3A-81A47D88D80D}" type="CELLRANGE">
                       <a:rPr lang="en-GB"/>
                       <a:pPr/>
                       <a:t>[PLAGECELL]</a:t>
@@ -2872,7 +2873,7 @@
                   <a:bodyPr/>
                   <a:lstStyle/>
                   <a:p>
-                    <a:fld id="{2820A38E-979F-4D6B-B1C2-7A510CD86C8E}" type="CELLRANGE">
+                    <a:fld id="{097C5F0A-4850-4835-9586-303D3D8CB640}" type="CELLRANGE">
                       <a:rPr lang="en-GB"/>
                       <a:pPr/>
                       <a:t>[PLAGECELL]</a:t>
@@ -2905,7 +2906,7 @@
                   <a:bodyPr/>
                   <a:lstStyle/>
                   <a:p>
-                    <a:fld id="{77A31A69-2B93-4124-B334-6CB6F1547E8D}" type="CELLRANGE">
+                    <a:fld id="{65A4B249-F784-46D2-A97F-DFA25354E240}" type="CELLRANGE">
                       <a:rPr lang="en-GB"/>
                       <a:pPr/>
                       <a:t>[PLAGECELL]</a:t>
@@ -3203,6 +3204,936 @@
 </c:chartSpace>
 </file>
 
+<file path=ppt/charts/chart13.xml><?xml version="1.0" encoding="utf-8"?>
+<c:chartSpace xmlns:c="http://schemas.openxmlformats.org/drawingml/2006/chart" xmlns:a="http://schemas.openxmlformats.org/drawingml/2006/main" xmlns:r="http://schemas.openxmlformats.org/officeDocument/2006/relationships" xmlns:c16r2="http://schemas.microsoft.com/office/drawing/2015/06/chart">
+  <c:date1904 val="0"/>
+  <c:lang val="fr-FR"/>
+  <c:roundedCorners val="0"/>
+  <mc:AlternateContent xmlns:mc="http://schemas.openxmlformats.org/markup-compatibility/2006">
+    <mc:Choice xmlns:c14="http://schemas.microsoft.com/office/drawing/2007/8/2/chart" Requires="c14">
+      <c14:style val="102"/>
+    </mc:Choice>
+    <mc:Fallback>
+      <c:style val="2"/>
+    </mc:Fallback>
+  </mc:AlternateContent>
+  <c:chart>
+    <c:autoTitleDeleted val="1"/>
+    <c:plotArea>
+      <c:layout>
+        <c:manualLayout>
+          <c:layoutTarget val="inner"/>
+          <c:xMode val="edge"/>
+          <c:yMode val="edge"/>
+          <c:x val="3.0154988789135768E-2"/>
+          <c:y val="0"/>
+          <c:w val="0.75744394476990551"/>
+          <c:h val="1"/>
+        </c:manualLayout>
+      </c:layout>
+      <c:doughnutChart>
+        <c:varyColors val="1"/>
+        <c:ser>
+          <c:idx val="0"/>
+          <c:order val="0"/>
+          <c:tx>
+            <c:strRef>
+              <c:f>Feuil1!$B$1</c:f>
+              <c:strCache>
+                <c:ptCount val="1"/>
+                <c:pt idx="0">
+                  <c:v>Artciles</c:v>
+                </c:pt>
+              </c:strCache>
+            </c:strRef>
+          </c:tx>
+          <c:dPt>
+            <c:idx val="0"/>
+            <c:bubble3D val="0"/>
+            <c:spPr>
+              <a:solidFill>
+                <a:schemeClr val="accent6">
+                  <a:lumMod val="75000"/>
+                </a:schemeClr>
+              </a:solidFill>
+              <a:ln w="19050">
+                <a:solidFill>
+                  <a:schemeClr val="lt1"/>
+                </a:solidFill>
+              </a:ln>
+              <a:effectLst/>
+            </c:spPr>
+            <c:extLst>
+              <c:ext xmlns:c16="http://schemas.microsoft.com/office/drawing/2014/chart" uri="{C3380CC4-5D6E-409C-BE32-E72D297353CC}">
+                <c16:uniqueId val="{00000001-BC71-4E80-9F16-0E567D55CB0A}"/>
+              </c:ext>
+            </c:extLst>
+          </c:dPt>
+          <c:dPt>
+            <c:idx val="1"/>
+            <c:bubble3D val="0"/>
+            <c:spPr>
+              <a:solidFill>
+                <a:schemeClr val="accent1">
+                  <a:lumMod val="75000"/>
+                  <a:alpha val="80000"/>
+                </a:schemeClr>
+              </a:solidFill>
+              <a:ln w="19050">
+                <a:solidFill>
+                  <a:schemeClr val="lt1"/>
+                </a:solidFill>
+              </a:ln>
+              <a:effectLst/>
+            </c:spPr>
+            <c:extLst>
+              <c:ext xmlns:c16="http://schemas.microsoft.com/office/drawing/2014/chart" uri="{C3380CC4-5D6E-409C-BE32-E72D297353CC}">
+                <c16:uniqueId val="{00000003-BC71-4E80-9F16-0E567D55CB0A}"/>
+              </c:ext>
+            </c:extLst>
+          </c:dPt>
+          <c:dPt>
+            <c:idx val="2"/>
+            <c:bubble3D val="0"/>
+            <c:spPr>
+              <a:solidFill>
+                <a:schemeClr val="accent1">
+                  <a:lumMod val="75000"/>
+                  <a:alpha val="70000"/>
+                </a:schemeClr>
+              </a:solidFill>
+              <a:ln w="19050">
+                <a:solidFill>
+                  <a:schemeClr val="lt1"/>
+                </a:solidFill>
+              </a:ln>
+              <a:effectLst/>
+            </c:spPr>
+            <c:extLst>
+              <c:ext xmlns:c16="http://schemas.microsoft.com/office/drawing/2014/chart" uri="{C3380CC4-5D6E-409C-BE32-E72D297353CC}">
+                <c16:uniqueId val="{00000005-BC71-4E80-9F16-0E567D55CB0A}"/>
+              </c:ext>
+            </c:extLst>
+          </c:dPt>
+          <c:dPt>
+            <c:idx val="3"/>
+            <c:bubble3D val="0"/>
+            <c:spPr>
+              <a:solidFill>
+                <a:schemeClr val="accent1">
+                  <a:lumMod val="75000"/>
+                  <a:alpha val="50000"/>
+                </a:schemeClr>
+              </a:solidFill>
+              <a:ln w="19050">
+                <a:solidFill>
+                  <a:schemeClr val="lt1"/>
+                </a:solidFill>
+              </a:ln>
+              <a:effectLst/>
+            </c:spPr>
+            <c:extLst>
+              <c:ext xmlns:c16="http://schemas.microsoft.com/office/drawing/2014/chart" uri="{C3380CC4-5D6E-409C-BE32-E72D297353CC}">
+                <c16:uniqueId val="{00000007-BC71-4E80-9F16-0E567D55CB0A}"/>
+              </c:ext>
+            </c:extLst>
+          </c:dPt>
+          <c:dPt>
+            <c:idx val="4"/>
+            <c:bubble3D val="0"/>
+            <c:spPr>
+              <a:solidFill>
+                <a:schemeClr val="accent1">
+                  <a:lumMod val="75000"/>
+                  <a:alpha val="30000"/>
+                </a:schemeClr>
+              </a:solidFill>
+              <a:ln w="19050">
+                <a:solidFill>
+                  <a:schemeClr val="lt1"/>
+                </a:solidFill>
+              </a:ln>
+              <a:effectLst/>
+            </c:spPr>
+            <c:extLst>
+              <c:ext xmlns:c16="http://schemas.microsoft.com/office/drawing/2014/chart" uri="{C3380CC4-5D6E-409C-BE32-E72D297353CC}">
+                <c16:uniqueId val="{00000009-BC71-4E80-9F16-0E567D55CB0A}"/>
+              </c:ext>
+            </c:extLst>
+          </c:dPt>
+          <c:dPt>
+            <c:idx val="5"/>
+            <c:bubble3D val="0"/>
+            <c:spPr>
+              <a:solidFill>
+                <a:schemeClr val="accent4"/>
+              </a:solidFill>
+              <a:ln w="19050">
+                <a:solidFill>
+                  <a:schemeClr val="lt1"/>
+                </a:solidFill>
+              </a:ln>
+              <a:effectLst/>
+            </c:spPr>
+            <c:extLst>
+              <c:ext xmlns:c16="http://schemas.microsoft.com/office/drawing/2014/chart" uri="{C3380CC4-5D6E-409C-BE32-E72D297353CC}">
+                <c16:uniqueId val="{0000000B-BC71-4E80-9F16-0E567D55CB0A}"/>
+              </c:ext>
+            </c:extLst>
+          </c:dPt>
+          <c:dPt>
+            <c:idx val="6"/>
+            <c:bubble3D val="0"/>
+            <c:spPr>
+              <a:solidFill>
+                <a:srgbClr val="C00000"/>
+              </a:solidFill>
+              <a:ln w="19050">
+                <a:solidFill>
+                  <a:schemeClr val="lt1"/>
+                </a:solidFill>
+              </a:ln>
+              <a:effectLst/>
+            </c:spPr>
+            <c:extLst>
+              <c:ext xmlns:c16="http://schemas.microsoft.com/office/drawing/2014/chart" uri="{C3380CC4-5D6E-409C-BE32-E72D297353CC}">
+                <c16:uniqueId val="{0000000D-BC71-4E80-9F16-0E567D55CB0A}"/>
+              </c:ext>
+            </c:extLst>
+          </c:dPt>
+          <c:dPt>
+            <c:idx val="7"/>
+            <c:bubble3D val="0"/>
+            <c:spPr>
+              <a:solidFill>
+                <a:srgbClr val="C00000">
+                  <a:alpha val="70000"/>
+                </a:srgbClr>
+              </a:solidFill>
+              <a:ln w="19050">
+                <a:solidFill>
+                  <a:schemeClr val="lt1"/>
+                </a:solidFill>
+              </a:ln>
+              <a:effectLst/>
+            </c:spPr>
+            <c:extLst>
+              <c:ext xmlns:c16="http://schemas.microsoft.com/office/drawing/2014/chart" uri="{C3380CC4-5D6E-409C-BE32-E72D297353CC}">
+                <c16:uniqueId val="{0000000F-BC71-4E80-9F16-0E567D55CB0A}"/>
+              </c:ext>
+            </c:extLst>
+          </c:dPt>
+          <c:dPt>
+            <c:idx val="8"/>
+            <c:bubble3D val="0"/>
+            <c:spPr>
+              <a:solidFill>
+                <a:srgbClr val="C00000">
+                  <a:alpha val="40000"/>
+                </a:srgbClr>
+              </a:solidFill>
+              <a:ln w="19050">
+                <a:solidFill>
+                  <a:schemeClr val="lt1"/>
+                </a:solidFill>
+              </a:ln>
+              <a:effectLst/>
+            </c:spPr>
+            <c:extLst>
+              <c:ext xmlns:c16="http://schemas.microsoft.com/office/drawing/2014/chart" uri="{C3380CC4-5D6E-409C-BE32-E72D297353CC}">
+                <c16:uniqueId val="{00000011-BC71-4E80-9F16-0E567D55CB0A}"/>
+              </c:ext>
+            </c:extLst>
+          </c:dPt>
+          <c:dPt>
+            <c:idx val="9"/>
+            <c:bubble3D val="0"/>
+            <c:spPr>
+              <a:solidFill>
+                <a:srgbClr val="C00000">
+                  <a:alpha val="30000"/>
+                </a:srgbClr>
+              </a:solidFill>
+              <a:ln w="19050">
+                <a:solidFill>
+                  <a:schemeClr val="lt1"/>
+                </a:solidFill>
+              </a:ln>
+              <a:effectLst/>
+            </c:spPr>
+            <c:extLst>
+              <c:ext xmlns:c16="http://schemas.microsoft.com/office/drawing/2014/chart" uri="{C3380CC4-5D6E-409C-BE32-E72D297353CC}">
+                <c16:uniqueId val="{00000013-BC71-4E80-9F16-0E567D55CB0A}"/>
+              </c:ext>
+            </c:extLst>
+          </c:dPt>
+          <c:dPt>
+            <c:idx val="10"/>
+            <c:bubble3D val="0"/>
+            <c:spPr>
+              <a:solidFill>
+                <a:srgbClr val="C00000">
+                  <a:alpha val="10000"/>
+                </a:srgbClr>
+              </a:solidFill>
+              <a:ln w="19050">
+                <a:solidFill>
+                  <a:schemeClr val="lt1"/>
+                </a:solidFill>
+              </a:ln>
+              <a:effectLst/>
+            </c:spPr>
+            <c:extLst>
+              <c:ext xmlns:c16="http://schemas.microsoft.com/office/drawing/2014/chart" uri="{C3380CC4-5D6E-409C-BE32-E72D297353CC}">
+                <c16:uniqueId val="{00000000-22AC-4762-91F8-A2E720EDB6A5}"/>
+              </c:ext>
+            </c:extLst>
+          </c:dPt>
+          <c:dLbls>
+            <c:dLbl>
+              <c:idx val="0"/>
+              <c:tx>
+                <c:rich>
+                  <a:bodyPr/>
+                  <a:lstStyle/>
+                  <a:p>
+                    <a:fld id="{3D5F4F3E-7230-4B27-9003-0CE908B33C79}" type="CELLRANGE">
+                      <a:rPr lang="en-GB"/>
+                      <a:pPr/>
+                      <a:t>[PLAGECELL]</a:t>
+                    </a:fld>
+                    <a:endParaRPr lang="en-GB"/>
+                  </a:p>
+                </c:rich>
+              </c:tx>
+              <c:showLegendKey val="0"/>
+              <c:showVal val="0"/>
+              <c:showCatName val="0"/>
+              <c:showSerName val="0"/>
+              <c:showPercent val="0"/>
+              <c:showBubbleSize val="0"/>
+              <c:extLst>
+                <c:ext xmlns:c15="http://schemas.microsoft.com/office/drawing/2012/chart" uri="{CE6537A1-D6FC-4f65-9D91-7224C49458BB}">
+                  <c15:dlblFieldTable/>
+                  <c15:xForSave val="1"/>
+                  <c15:showDataLabelsRange val="1"/>
+                </c:ext>
+                <c:ext xmlns:c16="http://schemas.microsoft.com/office/drawing/2014/chart" uri="{C3380CC4-5D6E-409C-BE32-E72D297353CC}">
+                  <c16:uniqueId val="{00000001-BC71-4E80-9F16-0E567D55CB0A}"/>
+                </c:ext>
+              </c:extLst>
+            </c:dLbl>
+            <c:dLbl>
+              <c:idx val="1"/>
+              <c:tx>
+                <c:rich>
+                  <a:bodyPr/>
+                  <a:lstStyle/>
+                  <a:p>
+                    <a:fld id="{D38B2566-5E9E-4CC6-A945-6E89FB4263B4}" type="CELLRANGE">
+                      <a:rPr lang="en-GB"/>
+                      <a:pPr/>
+                      <a:t>[PLAGECELL]</a:t>
+                    </a:fld>
+                    <a:endParaRPr lang="en-GB"/>
+                  </a:p>
+                </c:rich>
+              </c:tx>
+              <c:showLegendKey val="0"/>
+              <c:showVal val="0"/>
+              <c:showCatName val="0"/>
+              <c:showSerName val="0"/>
+              <c:showPercent val="0"/>
+              <c:showBubbleSize val="0"/>
+              <c:extLst>
+                <c:ext xmlns:c15="http://schemas.microsoft.com/office/drawing/2012/chart" uri="{CE6537A1-D6FC-4f65-9D91-7224C49458BB}">
+                  <c15:dlblFieldTable/>
+                  <c15:xForSave val="1"/>
+                  <c15:showDataLabelsRange val="1"/>
+                </c:ext>
+                <c:ext xmlns:c16="http://schemas.microsoft.com/office/drawing/2014/chart" uri="{C3380CC4-5D6E-409C-BE32-E72D297353CC}">
+                  <c16:uniqueId val="{00000003-BC71-4E80-9F16-0E567D55CB0A}"/>
+                </c:ext>
+              </c:extLst>
+            </c:dLbl>
+            <c:dLbl>
+              <c:idx val="2"/>
+              <c:tx>
+                <c:rich>
+                  <a:bodyPr/>
+                  <a:lstStyle/>
+                  <a:p>
+                    <a:fld id="{18B6E339-E0E9-4AF7-B8A5-39670243E964}" type="CELLRANGE">
+                      <a:rPr lang="en-GB"/>
+                      <a:pPr/>
+                      <a:t>[PLAGECELL]</a:t>
+                    </a:fld>
+                    <a:endParaRPr lang="en-GB"/>
+                  </a:p>
+                </c:rich>
+              </c:tx>
+              <c:showLegendKey val="0"/>
+              <c:showVal val="0"/>
+              <c:showCatName val="0"/>
+              <c:showSerName val="0"/>
+              <c:showPercent val="0"/>
+              <c:showBubbleSize val="0"/>
+              <c:extLst>
+                <c:ext xmlns:c15="http://schemas.microsoft.com/office/drawing/2012/chart" uri="{CE6537A1-D6FC-4f65-9D91-7224C49458BB}">
+                  <c15:dlblFieldTable/>
+                  <c15:xForSave val="1"/>
+                  <c15:showDataLabelsRange val="1"/>
+                </c:ext>
+                <c:ext xmlns:c16="http://schemas.microsoft.com/office/drawing/2014/chart" uri="{C3380CC4-5D6E-409C-BE32-E72D297353CC}">
+                  <c16:uniqueId val="{00000005-BC71-4E80-9F16-0E567D55CB0A}"/>
+                </c:ext>
+              </c:extLst>
+            </c:dLbl>
+            <c:dLbl>
+              <c:idx val="3"/>
+              <c:tx>
+                <c:rich>
+                  <a:bodyPr/>
+                  <a:lstStyle/>
+                  <a:p>
+                    <a:fld id="{EB312DFE-3688-4677-B416-71C16E06D2F2}" type="CELLRANGE">
+                      <a:rPr lang="en-GB"/>
+                      <a:pPr/>
+                      <a:t>[PLAGECELL]</a:t>
+                    </a:fld>
+                    <a:endParaRPr lang="en-GB"/>
+                  </a:p>
+                </c:rich>
+              </c:tx>
+              <c:showLegendKey val="0"/>
+              <c:showVal val="0"/>
+              <c:showCatName val="0"/>
+              <c:showSerName val="0"/>
+              <c:showPercent val="0"/>
+              <c:showBubbleSize val="0"/>
+              <c:extLst>
+                <c:ext xmlns:c15="http://schemas.microsoft.com/office/drawing/2012/chart" uri="{CE6537A1-D6FC-4f65-9D91-7224C49458BB}">
+                  <c15:dlblFieldTable/>
+                  <c15:xForSave val="1"/>
+                  <c15:showDataLabelsRange val="1"/>
+                </c:ext>
+                <c:ext xmlns:c16="http://schemas.microsoft.com/office/drawing/2014/chart" uri="{C3380CC4-5D6E-409C-BE32-E72D297353CC}">
+                  <c16:uniqueId val="{00000007-BC71-4E80-9F16-0E567D55CB0A}"/>
+                </c:ext>
+              </c:extLst>
+            </c:dLbl>
+            <c:dLbl>
+              <c:idx val="4"/>
+              <c:tx>
+                <c:rich>
+                  <a:bodyPr/>
+                  <a:lstStyle/>
+                  <a:p>
+                    <a:fld id="{00BA3DD2-E922-41DF-B4A4-40B82678F0F8}" type="CELLRANGE">
+                      <a:rPr lang="en-GB"/>
+                      <a:pPr/>
+                      <a:t>[PLAGECELL]</a:t>
+                    </a:fld>
+                    <a:endParaRPr lang="en-GB"/>
+                  </a:p>
+                </c:rich>
+              </c:tx>
+              <c:showLegendKey val="0"/>
+              <c:showVal val="0"/>
+              <c:showCatName val="0"/>
+              <c:showSerName val="0"/>
+              <c:showPercent val="0"/>
+              <c:showBubbleSize val="0"/>
+              <c:extLst>
+                <c:ext xmlns:c15="http://schemas.microsoft.com/office/drawing/2012/chart" uri="{CE6537A1-D6FC-4f65-9D91-7224C49458BB}">
+                  <c15:dlblFieldTable/>
+                  <c15:xForSave val="1"/>
+                  <c15:showDataLabelsRange val="1"/>
+                </c:ext>
+                <c:ext xmlns:c16="http://schemas.microsoft.com/office/drawing/2014/chart" uri="{C3380CC4-5D6E-409C-BE32-E72D297353CC}">
+                  <c16:uniqueId val="{00000009-BC71-4E80-9F16-0E567D55CB0A}"/>
+                </c:ext>
+              </c:extLst>
+            </c:dLbl>
+            <c:dLbl>
+              <c:idx val="5"/>
+              <c:tx>
+                <c:rich>
+                  <a:bodyPr/>
+                  <a:lstStyle/>
+                  <a:p>
+                    <a:fld id="{5D86FA40-3C56-4CF4-9CBF-EB84152055F1}" type="CELLRANGE">
+                      <a:rPr lang="en-GB"/>
+                      <a:pPr/>
+                      <a:t>[PLAGECELL]</a:t>
+                    </a:fld>
+                    <a:endParaRPr lang="en-GB"/>
+                  </a:p>
+                </c:rich>
+              </c:tx>
+              <c:showLegendKey val="0"/>
+              <c:showVal val="0"/>
+              <c:showCatName val="0"/>
+              <c:showSerName val="0"/>
+              <c:showPercent val="0"/>
+              <c:showBubbleSize val="0"/>
+              <c:extLst>
+                <c:ext xmlns:c15="http://schemas.microsoft.com/office/drawing/2012/chart" uri="{CE6537A1-D6FC-4f65-9D91-7224C49458BB}">
+                  <c15:dlblFieldTable/>
+                  <c15:xForSave val="1"/>
+                  <c15:showDataLabelsRange val="1"/>
+                </c:ext>
+                <c:ext xmlns:c16="http://schemas.microsoft.com/office/drawing/2014/chart" uri="{C3380CC4-5D6E-409C-BE32-E72D297353CC}">
+                  <c16:uniqueId val="{0000000B-BC71-4E80-9F16-0E567D55CB0A}"/>
+                </c:ext>
+              </c:extLst>
+            </c:dLbl>
+            <c:dLbl>
+              <c:idx val="6"/>
+              <c:tx>
+                <c:rich>
+                  <a:bodyPr/>
+                  <a:lstStyle/>
+                  <a:p>
+                    <a:fld id="{7D09FE1D-697A-4F8E-80D1-03A7B9F7311B}" type="CELLRANGE">
+                      <a:rPr lang="en-GB"/>
+                      <a:pPr/>
+                      <a:t>[PLAGECELL]</a:t>
+                    </a:fld>
+                    <a:endParaRPr lang="en-GB"/>
+                  </a:p>
+                </c:rich>
+              </c:tx>
+              <c:showLegendKey val="0"/>
+              <c:showVal val="0"/>
+              <c:showCatName val="0"/>
+              <c:showSerName val="0"/>
+              <c:showPercent val="0"/>
+              <c:showBubbleSize val="0"/>
+              <c:extLst>
+                <c:ext xmlns:c15="http://schemas.microsoft.com/office/drawing/2012/chart" uri="{CE6537A1-D6FC-4f65-9D91-7224C49458BB}">
+                  <c15:dlblFieldTable/>
+                  <c15:xForSave val="1"/>
+                  <c15:showDataLabelsRange val="1"/>
+                </c:ext>
+                <c:ext xmlns:c16="http://schemas.microsoft.com/office/drawing/2014/chart" uri="{C3380CC4-5D6E-409C-BE32-E72D297353CC}">
+                  <c16:uniqueId val="{0000000D-BC71-4E80-9F16-0E567D55CB0A}"/>
+                </c:ext>
+              </c:extLst>
+            </c:dLbl>
+            <c:dLbl>
+              <c:idx val="7"/>
+              <c:tx>
+                <c:rich>
+                  <a:bodyPr/>
+                  <a:lstStyle/>
+                  <a:p>
+                    <a:fld id="{27D76BC2-1094-40A9-87C2-5E58DC0FD65E}" type="CELLRANGE">
+                      <a:rPr lang="en-GB"/>
+                      <a:pPr/>
+                      <a:t>[PLAGECELL]</a:t>
+                    </a:fld>
+                    <a:endParaRPr lang="en-GB"/>
+                  </a:p>
+                </c:rich>
+              </c:tx>
+              <c:showLegendKey val="0"/>
+              <c:showVal val="0"/>
+              <c:showCatName val="0"/>
+              <c:showSerName val="0"/>
+              <c:showPercent val="0"/>
+              <c:showBubbleSize val="0"/>
+              <c:extLst>
+                <c:ext xmlns:c15="http://schemas.microsoft.com/office/drawing/2012/chart" uri="{CE6537A1-D6FC-4f65-9D91-7224C49458BB}">
+                  <c15:dlblFieldTable/>
+                  <c15:xForSave val="1"/>
+                  <c15:showDataLabelsRange val="1"/>
+                </c:ext>
+                <c:ext xmlns:c16="http://schemas.microsoft.com/office/drawing/2014/chart" uri="{C3380CC4-5D6E-409C-BE32-E72D297353CC}">
+                  <c16:uniqueId val="{0000000F-BC71-4E80-9F16-0E567D55CB0A}"/>
+                </c:ext>
+              </c:extLst>
+            </c:dLbl>
+            <c:dLbl>
+              <c:idx val="8"/>
+              <c:tx>
+                <c:rich>
+                  <a:bodyPr/>
+                  <a:lstStyle/>
+                  <a:p>
+                    <a:fld id="{1CB71098-BFC8-4F8B-B851-FD9A7A608103}" type="CELLRANGE">
+                      <a:rPr lang="en-GB"/>
+                      <a:pPr/>
+                      <a:t>[PLAGECELL]</a:t>
+                    </a:fld>
+                    <a:endParaRPr lang="en-GB"/>
+                  </a:p>
+                </c:rich>
+              </c:tx>
+              <c:showLegendKey val="0"/>
+              <c:showVal val="0"/>
+              <c:showCatName val="0"/>
+              <c:showSerName val="0"/>
+              <c:showPercent val="0"/>
+              <c:showBubbleSize val="0"/>
+              <c:extLst>
+                <c:ext xmlns:c15="http://schemas.microsoft.com/office/drawing/2012/chart" uri="{CE6537A1-D6FC-4f65-9D91-7224C49458BB}">
+                  <c15:dlblFieldTable/>
+                  <c15:xForSave val="1"/>
+                  <c15:showDataLabelsRange val="1"/>
+                </c:ext>
+                <c:ext xmlns:c16="http://schemas.microsoft.com/office/drawing/2014/chart" uri="{C3380CC4-5D6E-409C-BE32-E72D297353CC}">
+                  <c16:uniqueId val="{00000011-BC71-4E80-9F16-0E567D55CB0A}"/>
+                </c:ext>
+              </c:extLst>
+            </c:dLbl>
+            <c:dLbl>
+              <c:idx val="9"/>
+              <c:tx>
+                <c:rich>
+                  <a:bodyPr/>
+                  <a:lstStyle/>
+                  <a:p>
+                    <a:fld id="{C7F4EF6D-BDF0-45A8-B842-AC21CCB803C2}" type="CELLRANGE">
+                      <a:rPr lang="en-GB"/>
+                      <a:pPr/>
+                      <a:t>[PLAGECELL]</a:t>
+                    </a:fld>
+                    <a:endParaRPr lang="en-GB"/>
+                  </a:p>
+                </c:rich>
+              </c:tx>
+              <c:showLegendKey val="0"/>
+              <c:showVal val="0"/>
+              <c:showCatName val="0"/>
+              <c:showSerName val="0"/>
+              <c:showPercent val="0"/>
+              <c:showBubbleSize val="0"/>
+              <c:extLst>
+                <c:ext xmlns:c15="http://schemas.microsoft.com/office/drawing/2012/chart" uri="{CE6537A1-D6FC-4f65-9D91-7224C49458BB}">
+                  <c15:dlblFieldTable/>
+                  <c15:xForSave val="1"/>
+                  <c15:showDataLabelsRange val="1"/>
+                </c:ext>
+                <c:ext xmlns:c16="http://schemas.microsoft.com/office/drawing/2014/chart" uri="{C3380CC4-5D6E-409C-BE32-E72D297353CC}">
+                  <c16:uniqueId val="{00000013-BC71-4E80-9F16-0E567D55CB0A}"/>
+                </c:ext>
+              </c:extLst>
+            </c:dLbl>
+            <c:dLbl>
+              <c:idx val="10"/>
+              <c:tx>
+                <c:rich>
+                  <a:bodyPr/>
+                  <a:lstStyle/>
+                  <a:p>
+                    <a:fld id="{702DA2B4-040B-4D88-8E59-F74212219FEC}" type="CELLRANGE">
+                      <a:rPr lang="en-GB"/>
+                      <a:pPr/>
+                      <a:t>[PLAGECELL]</a:t>
+                    </a:fld>
+                    <a:endParaRPr lang="en-GB"/>
+                  </a:p>
+                </c:rich>
+              </c:tx>
+              <c:showLegendKey val="0"/>
+              <c:showVal val="0"/>
+              <c:showCatName val="0"/>
+              <c:showSerName val="0"/>
+              <c:showPercent val="0"/>
+              <c:showBubbleSize val="0"/>
+              <c:extLst>
+                <c:ext xmlns:c15="http://schemas.microsoft.com/office/drawing/2012/chart" uri="{CE6537A1-D6FC-4f65-9D91-7224C49458BB}">
+                  <c15:dlblFieldTable/>
+                  <c15:xForSave val="1"/>
+                  <c15:showDataLabelsRange val="1"/>
+                </c:ext>
+                <c:ext xmlns:c16="http://schemas.microsoft.com/office/drawing/2014/chart" uri="{C3380CC4-5D6E-409C-BE32-E72D297353CC}">
+                  <c16:uniqueId val="{00000000-22AC-4762-91F8-A2E720EDB6A5}"/>
+                </c:ext>
+              </c:extLst>
+            </c:dLbl>
+            <c:spPr>
+              <a:noFill/>
+              <a:ln>
+                <a:noFill/>
+              </a:ln>
+              <a:effectLst/>
+            </c:spPr>
+            <c:txPr>
+              <a:bodyPr rot="0" spcFirstLastPara="1" vertOverflow="ellipsis" vert="horz" wrap="square" lIns="38100" tIns="19050" rIns="38100" bIns="19050" anchor="ctr" anchorCtr="1">
+                <a:spAutoFit/>
+              </a:bodyPr>
+              <a:lstStyle/>
+              <a:p>
+                <a:pPr>
+                  <a:defRPr sz="1600" b="1" i="0" u="none" strike="noStrike" kern="1200" baseline="0">
+                    <a:solidFill>
+                      <a:schemeClr val="tx1">
+                        <a:lumMod val="75000"/>
+                        <a:lumOff val="25000"/>
+                      </a:schemeClr>
+                    </a:solidFill>
+                    <a:latin typeface="+mn-lt"/>
+                    <a:ea typeface="+mn-ea"/>
+                    <a:cs typeface="+mn-cs"/>
+                  </a:defRPr>
+                </a:pPr>
+                <a:endParaRPr lang="fr-FR"/>
+              </a:p>
+            </c:txPr>
+            <c:showLegendKey val="0"/>
+            <c:showVal val="0"/>
+            <c:showCatName val="0"/>
+            <c:showSerName val="0"/>
+            <c:showPercent val="0"/>
+            <c:showBubbleSize val="0"/>
+            <c:showLeaderLines val="1"/>
+            <c:leaderLines>
+              <c:spPr>
+                <a:ln w="9525" cap="flat" cmpd="sng" algn="ctr">
+                  <a:solidFill>
+                    <a:schemeClr val="tx1">
+                      <a:lumMod val="35000"/>
+                      <a:lumOff val="65000"/>
+                    </a:schemeClr>
+                  </a:solidFill>
+                  <a:round/>
+                </a:ln>
+                <a:effectLst/>
+              </c:spPr>
+            </c:leaderLines>
+            <c:extLst>
+              <c:ext xmlns:c15="http://schemas.microsoft.com/office/drawing/2012/chart" uri="{CE6537A1-D6FC-4f65-9D91-7224C49458BB}">
+                <c15:showDataLabelsRange val="1"/>
+              </c:ext>
+            </c:extLst>
+          </c:dLbls>
+          <c:cat>
+            <c:strRef>
+              <c:f>Feuil1!$A$2:$A$12</c:f>
+              <c:strCache>
+                <c:ptCount val="11"/>
+                <c:pt idx="0">
+                  <c:v>TRUE</c:v>
+                </c:pt>
+                <c:pt idx="1">
+                  <c:v>Name mistake</c:v>
+                </c:pt>
+                <c:pt idx="2">
+                  <c:v>Copyright</c:v>
+                </c:pt>
+                <c:pt idx="3">
+                  <c:v>Acronymes</c:v>
+                </c:pt>
+                <c:pt idx="4">
+                  <c:v>Author Name </c:v>
+                </c:pt>
+                <c:pt idx="5">
+                  <c:v>Other (Russia)</c:v>
+                </c:pt>
+                <c:pt idx="6">
+                  <c:v>No understanding</c:v>
+                </c:pt>
+                <c:pt idx="7">
+                  <c:v>Higher scale</c:v>
+                </c:pt>
+                <c:pt idx="8">
+                  <c:v>Comp/Ex</c:v>
+                </c:pt>
+                <c:pt idx="9">
+                  <c:v>Int. Group</c:v>
+                </c:pt>
+                <c:pt idx="10">
+                  <c:v>Lower Scale</c:v>
+                </c:pt>
+              </c:strCache>
+            </c:strRef>
+          </c:cat>
+          <c:val>
+            <c:numRef>
+              <c:f>Feuil1!$B$2:$B$12</c:f>
+              <c:numCache>
+                <c:formatCode>General</c:formatCode>
+                <c:ptCount val="11"/>
+                <c:pt idx="0">
+                  <c:v>51</c:v>
+                </c:pt>
+                <c:pt idx="1">
+                  <c:v>33</c:v>
+                </c:pt>
+                <c:pt idx="2">
+                  <c:v>14</c:v>
+                </c:pt>
+                <c:pt idx="3">
+                  <c:v>8</c:v>
+                </c:pt>
+                <c:pt idx="4">
+                  <c:v>2</c:v>
+                </c:pt>
+                <c:pt idx="5">
+                  <c:v>4</c:v>
+                </c:pt>
+                <c:pt idx="6">
+                  <c:v>33</c:v>
+                </c:pt>
+                <c:pt idx="7">
+                  <c:v>15</c:v>
+                </c:pt>
+                <c:pt idx="8">
+                  <c:v>13</c:v>
+                </c:pt>
+                <c:pt idx="9">
+                  <c:v>4</c:v>
+                </c:pt>
+                <c:pt idx="10">
+                  <c:v>3</c:v>
+                </c:pt>
+              </c:numCache>
+            </c:numRef>
+          </c:val>
+          <c:extLst>
+            <c:ext xmlns:c15="http://schemas.microsoft.com/office/drawing/2012/chart" uri="{02D57815-91ED-43cb-92C2-25804820EDAC}">
+              <c15:datalabelsRange>
+                <c15:f>Feuil1!$B$2:$B$12</c15:f>
+                <c15:dlblRangeCache>
+                  <c:ptCount val="11"/>
+                  <c:pt idx="0">
+                    <c:v>51</c:v>
+                  </c:pt>
+                  <c:pt idx="1">
+                    <c:v>33</c:v>
+                  </c:pt>
+                  <c:pt idx="2">
+                    <c:v>14</c:v>
+                  </c:pt>
+                  <c:pt idx="3">
+                    <c:v>8</c:v>
+                  </c:pt>
+                  <c:pt idx="4">
+                    <c:v>2</c:v>
+                  </c:pt>
+                  <c:pt idx="5">
+                    <c:v>4</c:v>
+                  </c:pt>
+                  <c:pt idx="6">
+                    <c:v>33</c:v>
+                  </c:pt>
+                  <c:pt idx="7">
+                    <c:v>15</c:v>
+                  </c:pt>
+                  <c:pt idx="8">
+                    <c:v>13</c:v>
+                  </c:pt>
+                  <c:pt idx="9">
+                    <c:v>4</c:v>
+                  </c:pt>
+                  <c:pt idx="10">
+                    <c:v>3</c:v>
+                  </c:pt>
+                </c15:dlblRangeCache>
+              </c15:datalabelsRange>
+            </c:ext>
+            <c:ext xmlns:c16="http://schemas.microsoft.com/office/drawing/2014/chart" uri="{C3380CC4-5D6E-409C-BE32-E72D297353CC}">
+              <c16:uniqueId val="{00000014-BC71-4E80-9F16-0E567D55CB0A}"/>
+            </c:ext>
+          </c:extLst>
+        </c:ser>
+        <c:dLbls>
+          <c:showLegendKey val="0"/>
+          <c:showVal val="0"/>
+          <c:showCatName val="0"/>
+          <c:showSerName val="0"/>
+          <c:showPercent val="1"/>
+          <c:showBubbleSize val="0"/>
+          <c:showLeaderLines val="1"/>
+        </c:dLbls>
+        <c:firstSliceAng val="0"/>
+        <c:holeSize val="60"/>
+      </c:doughnutChart>
+      <c:spPr>
+        <a:noFill/>
+        <a:ln>
+          <a:noFill/>
+        </a:ln>
+        <a:effectLst/>
+      </c:spPr>
+    </c:plotArea>
+    <c:legend>
+      <c:legendPos val="r"/>
+      <c:layout>
+        <c:manualLayout>
+          <c:xMode val="edge"/>
+          <c:yMode val="edge"/>
+          <c:x val="0.66633399400226623"/>
+          <c:y val="0"/>
+          <c:w val="0.32594278446610492"/>
+          <c:h val="1"/>
+        </c:manualLayout>
+      </c:layout>
+      <c:overlay val="0"/>
+      <c:spPr>
+        <a:noFill/>
+        <a:ln>
+          <a:noFill/>
+        </a:ln>
+        <a:effectLst/>
+      </c:spPr>
+      <c:txPr>
+        <a:bodyPr rot="0" spcFirstLastPara="1" vertOverflow="ellipsis" vert="horz" wrap="square" anchor="ctr" anchorCtr="1"/>
+        <a:lstStyle/>
+        <a:p>
+          <a:pPr>
+            <a:defRPr sz="2400" b="0" i="0" u="none" strike="noStrike" kern="1200" baseline="0">
+              <a:solidFill>
+                <a:schemeClr val="tx1">
+                  <a:lumMod val="65000"/>
+                  <a:lumOff val="35000"/>
+                </a:schemeClr>
+              </a:solidFill>
+              <a:latin typeface="+mn-lt"/>
+              <a:ea typeface="+mn-ea"/>
+              <a:cs typeface="+mn-cs"/>
+            </a:defRPr>
+          </a:pPr>
+          <a:endParaRPr lang="fr-FR"/>
+        </a:p>
+      </c:txPr>
+    </c:legend>
+    <c:plotVisOnly val="1"/>
+    <c:dispBlanksAs val="gap"/>
+    <c:extLst>
+      <c:ext xmlns:c16r3="http://schemas.microsoft.com/office/drawing/2017/03/chart" uri="{56B9EC1D-385E-4148-901F-78D8002777C0}">
+        <c16r3:dataDisplayOptions16>
+          <c16r3:dispNaAsBlank val="1"/>
+        </c16r3:dataDisplayOptions16>
+      </c:ext>
+    </c:extLst>
+    <c:showDLblsOverMax val="0"/>
+  </c:chart>
+  <c:spPr>
+    <a:noFill/>
+    <a:ln>
+      <a:noFill/>
+    </a:ln>
+    <a:effectLst/>
+  </c:spPr>
+  <c:txPr>
+    <a:bodyPr/>
+    <a:lstStyle/>
+    <a:p>
+      <a:pPr>
+        <a:defRPr/>
+      </a:pPr>
+      <a:endParaRPr lang="fr-FR"/>
+    </a:p>
+  </c:txPr>
+  <c:externalData r:id="rId3">
+    <c:autoUpdate val="0"/>
+  </c:externalData>
+</c:chartSpace>
+</file>
+
 <file path=ppt/charts/chart2.xml><?xml version="1.0" encoding="utf-8"?>
 <c:chartSpace xmlns:c="http://schemas.openxmlformats.org/drawingml/2006/chart" xmlns:a="http://schemas.openxmlformats.org/drawingml/2006/main" xmlns:r="http://schemas.openxmlformats.org/officeDocument/2006/relationships" xmlns:c16r2="http://schemas.microsoft.com/office/drawing/2015/06/chart">
   <c:date1904 val="0"/>
@@ -3342,7 +4273,7 @@
                   <a:bodyPr/>
                   <a:lstStyle/>
                   <a:p>
-                    <a:fld id="{7015A572-50A7-4EC7-9548-AFBE31BE01BE}" type="CELLRANGE">
+                    <a:fld id="{B95EC88A-1E56-4AF6-AFB4-0209B4E15FD6}" type="CELLRANGE">
                       <a:rPr lang="en-GB"/>
                       <a:pPr/>
                       <a:t>[PLAGECELL]</a:t>
@@ -3375,7 +4306,7 @@
                   <a:bodyPr/>
                   <a:lstStyle/>
                   <a:p>
-                    <a:fld id="{4518F01B-F886-44FF-9D71-B434D1B0ED07}" type="CELLRANGE">
+                    <a:fld id="{7568AAA7-FB05-40F1-9A8B-18ACDFBA5C41}" type="CELLRANGE">
                       <a:rPr lang="en-GB"/>
                       <a:pPr/>
                       <a:t>[PLAGECELL]</a:t>
@@ -3408,7 +4339,7 @@
                   <a:bodyPr/>
                   <a:lstStyle/>
                   <a:p>
-                    <a:fld id="{49DA0BB2-8B6E-4F43-80C5-6E8E7D5516B9}" type="CELLRANGE">
+                    <a:fld id="{F68F685A-4143-418B-A31A-76087B80FE23}" type="CELLRANGE">
                       <a:rPr lang="en-GB"/>
                       <a:pPr/>
                       <a:t>[PLAGECELL]</a:t>
@@ -3441,7 +4372,7 @@
                   <a:bodyPr/>
                   <a:lstStyle/>
                   <a:p>
-                    <a:fld id="{50D67E04-82B9-4294-8547-A98E34BE7071}" type="CELLRANGE">
+                    <a:fld id="{FCB3C19C-4A97-44E4-8E0D-159D93A5F291}" type="CELLRANGE">
                       <a:rPr lang="en-GB"/>
                       <a:pPr/>
                       <a:t>[PLAGECELL]</a:t>
@@ -3869,7 +4800,7 @@
                   <a:bodyPr/>
                   <a:lstStyle/>
                   <a:p>
-                    <a:fld id="{F0E0505A-C004-44AE-9B93-DC9DE776F31A}" type="CELLRANGE">
+                    <a:fld id="{B02D3A6D-0243-4C1D-B7EB-2F691E85ED1D}" type="CELLRANGE">
                       <a:rPr lang="en-GB"/>
                       <a:pPr/>
                       <a:t>[PLAGECELL]</a:t>
@@ -3902,7 +4833,7 @@
                   <a:bodyPr/>
                   <a:lstStyle/>
                   <a:p>
-                    <a:fld id="{7C79856F-211D-4C54-BBAC-3467B03F5A91}" type="CELLRANGE">
+                    <a:fld id="{93A96BF3-BC84-4288-9A0C-0707F88AFD8C}" type="CELLRANGE">
                       <a:rPr lang="en-GB"/>
                       <a:pPr/>
                       <a:t>[PLAGECELL]</a:t>
@@ -3935,7 +4866,7 @@
                   <a:bodyPr/>
                   <a:lstStyle/>
                   <a:p>
-                    <a:fld id="{F0FFB038-082E-49EC-A03D-16F302282FF1}" type="CELLRANGE">
+                    <a:fld id="{CDDC748E-83DF-4916-BB83-AA02762F60DD}" type="CELLRANGE">
                       <a:rPr lang="en-GB"/>
                       <a:pPr/>
                       <a:t>[PLAGECELL]</a:t>
@@ -3968,7 +4899,7 @@
                   <a:bodyPr/>
                   <a:lstStyle/>
                   <a:p>
-                    <a:fld id="{50154804-ED6A-4BCF-911A-8749B10C607D}" type="CELLRANGE">
+                    <a:fld id="{9C368942-18A3-4C2D-9C71-14B39449AA65}" type="CELLRANGE">
                       <a:rPr lang="en-GB"/>
                       <a:pPr/>
                       <a:t>[PLAGECELL]</a:t>
@@ -4001,7 +4932,7 @@
                   <a:bodyPr/>
                   <a:lstStyle/>
                   <a:p>
-                    <a:fld id="{42B13EBB-430F-41B2-A557-B14B7E65FE44}" type="CELLRANGE">
+                    <a:fld id="{A6B5B356-0058-415F-9BDD-D41938A1B7DF}" type="CELLRANGE">
                       <a:rPr lang="en-GB"/>
                       <a:pPr/>
                       <a:t>[PLAGECELL]</a:t>
@@ -4034,7 +4965,7 @@
                   <a:bodyPr/>
                   <a:lstStyle/>
                   <a:p>
-                    <a:fld id="{06A72B1A-8CEB-405B-B82A-658BEC62C7B4}" type="CELLRANGE">
+                    <a:fld id="{31A29C08-41B2-4FA4-9910-3F40B7C87AC3}" type="CELLRANGE">
                       <a:rPr lang="en-GB"/>
                       <a:pPr/>
                       <a:t>[PLAGECELL]</a:t>
@@ -4468,7 +5399,7 @@
                   <a:bodyPr/>
                   <a:lstStyle/>
                   <a:p>
-                    <a:fld id="{278CA5EA-7AD6-4588-8E6B-51B82C3C7917}" type="CELLRANGE">
+                    <a:fld id="{FC9C77B3-6096-401F-B214-EC5427BE5496}" type="CELLRANGE">
                       <a:rPr lang="en-GB"/>
                       <a:pPr/>
                       <a:t>[PLAGECELL]</a:t>
@@ -4501,7 +5432,7 @@
                   <a:bodyPr/>
                   <a:lstStyle/>
                   <a:p>
-                    <a:fld id="{E5BE247C-CECF-45A1-8AB9-6B9D3EEF3497}" type="CELLRANGE">
+                    <a:fld id="{7C0F9262-E8E2-452E-892B-C271CBD700C7}" type="CELLRANGE">
                       <a:rPr lang="en-GB"/>
                       <a:pPr/>
                       <a:t>[PLAGECELL]</a:t>
@@ -4534,7 +5465,7 @@
                   <a:bodyPr/>
                   <a:lstStyle/>
                   <a:p>
-                    <a:fld id="{53EBA865-3AA6-43B3-AE5C-5C6CE0FA37DC}" type="CELLRANGE">
+                    <a:fld id="{A839CFEA-8BB0-42BD-9BD9-6B89C9A132EB}" type="CELLRANGE">
                       <a:rPr lang="en-GB"/>
                       <a:pPr/>
                       <a:t>[PLAGECELL]</a:t>
@@ -4567,7 +5498,7 @@
                   <a:bodyPr/>
                   <a:lstStyle/>
                   <a:p>
-                    <a:fld id="{C724EAA1-C79B-49BD-B6C7-DD70E1D74F51}" type="CELLRANGE">
+                    <a:fld id="{9B0B6560-D66C-4A44-82EF-F1A6D576D171}" type="CELLRANGE">
                       <a:rPr lang="en-GB"/>
                       <a:pPr/>
                       <a:t>[PLAGECELL]</a:t>
@@ -5058,7 +5989,7 @@
                   <a:bodyPr/>
                   <a:lstStyle/>
                   <a:p>
-                    <a:fld id="{E480E11F-AE31-4367-8D17-E9509E14DEBF}" type="CELLRANGE">
+                    <a:fld id="{AB7189A6-AE40-4352-9AC6-F4A67F2E406C}" type="CELLRANGE">
                       <a:rPr lang="en-GB"/>
                       <a:pPr/>
                       <a:t>[PLAGECELL]</a:t>
@@ -5091,7 +6022,7 @@
                   <a:bodyPr/>
                   <a:lstStyle/>
                   <a:p>
-                    <a:fld id="{C21F03C6-8E6E-4B70-9D5F-B62413B1AF5D}" type="CELLRANGE">
+                    <a:fld id="{0B56B9AE-630E-47FF-8626-106893ABC6C4}" type="CELLRANGE">
                       <a:rPr lang="en-GB"/>
                       <a:pPr/>
                       <a:t>[PLAGECELL]</a:t>
@@ -5124,7 +6055,7 @@
                   <a:bodyPr/>
                   <a:lstStyle/>
                   <a:p>
-                    <a:fld id="{C5DA4A48-1DEE-4ADC-801B-E8C06178DB94}" type="CELLRANGE">
+                    <a:fld id="{2CBA63DE-2C09-4EA9-B555-27F015E8E5FC}" type="CELLRANGE">
                       <a:rPr lang="en-GB"/>
                       <a:pPr/>
                       <a:t>[PLAGECELL]</a:t>
@@ -5157,7 +6088,7 @@
                   <a:bodyPr/>
                   <a:lstStyle/>
                   <a:p>
-                    <a:fld id="{7525B659-E482-4C1B-A821-A344F61290A3}" type="CELLRANGE">
+                    <a:fld id="{393D1D39-3555-4EF4-967D-E638E857CC2D}" type="CELLRANGE">
                       <a:rPr lang="en-GB"/>
                       <a:pPr/>
                       <a:t>[PLAGECELL]</a:t>
@@ -5190,7 +6121,7 @@
                   <a:bodyPr/>
                   <a:lstStyle/>
                   <a:p>
-                    <a:fld id="{B783BE8D-7280-4125-8B15-5B5038E981CA}" type="CELLRANGE">
+                    <a:fld id="{0BA20A9D-93CE-41FD-8F95-77DBA0CC3FFD}" type="CELLRANGE">
                       <a:rPr lang="en-GB"/>
                       <a:pPr/>
                       <a:t>[PLAGECELL]</a:t>
@@ -5223,7 +6154,7 @@
                   <a:bodyPr/>
                   <a:lstStyle/>
                   <a:p>
-                    <a:fld id="{88D0D9EA-49D4-4C13-9152-C98E57473AEE}" type="CELLRANGE">
+                    <a:fld id="{F4C741F8-0404-4BCA-A5F9-0C3E9CA7B5BD}" type="CELLRANGE">
                       <a:rPr lang="en-GB"/>
                       <a:pPr/>
                       <a:t>[PLAGECELL]</a:t>
@@ -5256,7 +6187,7 @@
                   <a:bodyPr/>
                   <a:lstStyle/>
                   <a:p>
-                    <a:fld id="{2EBD5C8D-4D60-410E-B570-8FB0244E47F3}" type="CELLRANGE">
+                    <a:fld id="{C9969006-8A9A-4C5E-8E49-B3991A8EFADA}" type="CELLRANGE">
                       <a:rPr lang="en-GB"/>
                       <a:pPr/>
                       <a:t>[PLAGECELL]</a:t>
@@ -5289,7 +6220,7 @@
                   <a:bodyPr/>
                   <a:lstStyle/>
                   <a:p>
-                    <a:fld id="{B95FF0D0-306C-4DA7-A390-4E199635E6B5}" type="CELLRANGE">
+                    <a:fld id="{93F02B79-AC13-4EC6-90E1-F65D2499D6DF}" type="CELLRANGE">
                       <a:rPr lang="en-GB"/>
                       <a:pPr/>
                       <a:t>[PLAGECELL]</a:t>
@@ -5322,7 +6253,7 @@
                   <a:bodyPr/>
                   <a:lstStyle/>
                   <a:p>
-                    <a:fld id="{EB3D40EB-5150-4E7A-8C0F-070A99C88E88}" type="CELLRANGE">
+                    <a:fld id="{3B803845-5EC0-4C61-B01D-F3328400501D}" type="CELLRANGE">
                       <a:rPr lang="en-GB"/>
                       <a:pPr/>
                       <a:t>[PLAGECELL]</a:t>
@@ -5714,7 +6645,7 @@
                   <a:bodyPr/>
                   <a:lstStyle/>
                   <a:p>
-                    <a:fld id="{050C20D8-4B3C-41C3-91ED-E38B0A161EBF}" type="CELLRANGE">
+                    <a:fld id="{DC5C489A-DFE4-4361-822F-5FCF735E44E4}" type="CELLRANGE">
                       <a:rPr lang="en-GB"/>
                       <a:pPr/>
                       <a:t>[PLAGECELL]</a:t>
@@ -5747,7 +6678,7 @@
                   <a:bodyPr/>
                   <a:lstStyle/>
                   <a:p>
-                    <a:fld id="{6F2DBE8B-5F29-43F2-BB7D-1C0D06C6DBC0}" type="CELLRANGE">
+                    <a:fld id="{132672DB-E62E-47F0-8D37-1AC8D0B84ADC}" type="CELLRANGE">
                       <a:rPr lang="en-GB"/>
                       <a:pPr/>
                       <a:t>[PLAGECELL]</a:t>
@@ -5780,7 +6711,7 @@
                   <a:bodyPr/>
                   <a:lstStyle/>
                   <a:p>
-                    <a:fld id="{E6C992C2-8D02-4A93-8AC9-7FE3F811A51D}" type="CELLRANGE">
+                    <a:fld id="{8956566F-AC67-44E7-8E5D-DCE4AAFBF9F1}" type="CELLRANGE">
                       <a:rPr lang="en-GB"/>
                       <a:pPr/>
                       <a:t>[PLAGECELL]</a:t>
@@ -6286,7 +7217,7 @@
                   <a:bodyPr/>
                   <a:lstStyle/>
                   <a:p>
-                    <a:fld id="{458F0495-4DF6-4A60-9DB0-8A340011E98F}" type="CELLRANGE">
+                    <a:fld id="{14D065AE-B90D-4948-AAE9-4CB3576D33E3}" type="CELLRANGE">
                       <a:rPr lang="en-GB"/>
                       <a:pPr/>
                       <a:t>[PLAGECELL]</a:t>
@@ -6319,7 +7250,7 @@
                   <a:bodyPr/>
                   <a:lstStyle/>
                   <a:p>
-                    <a:fld id="{E309DF81-6AE7-4A55-80AE-BF38FBA7FC8D}" type="CELLRANGE">
+                    <a:fld id="{7FD6416F-C02C-4DED-B379-5698542C265B}" type="CELLRANGE">
                       <a:rPr lang="en-GB"/>
                       <a:pPr/>
                       <a:t>[PLAGECELL]</a:t>
@@ -6352,7 +7283,7 @@
                   <a:bodyPr/>
                   <a:lstStyle/>
                   <a:p>
-                    <a:fld id="{5A3572A1-06F0-40F3-B93B-FB049C475F65}" type="CELLRANGE">
+                    <a:fld id="{1C95B18C-E917-4BAC-9B41-4A121012D22D}" type="CELLRANGE">
                       <a:rPr lang="en-GB"/>
                       <a:pPr/>
                       <a:t>[PLAGECELL]</a:t>
@@ -6385,7 +7316,7 @@
                   <a:bodyPr/>
                   <a:lstStyle/>
                   <a:p>
-                    <a:fld id="{70914C58-DABC-4605-AE1A-D101436085B6}" type="CELLRANGE">
+                    <a:fld id="{EB03CCE4-FE86-4DFF-8422-A14D4A278B8D}" type="CELLRANGE">
                       <a:rPr lang="en-GB"/>
                       <a:pPr/>
                       <a:t>[PLAGECELL]</a:t>
@@ -6418,7 +7349,7 @@
                   <a:bodyPr/>
                   <a:lstStyle/>
                   <a:p>
-                    <a:fld id="{FB0DC161-5079-4420-A9C7-53C3C447F5FE}" type="CELLRANGE">
+                    <a:fld id="{4BC4FB64-D000-4ED8-AA79-7BD82E8925C5}" type="CELLRANGE">
                       <a:rPr lang="en-GB"/>
                       <a:pPr/>
                       <a:t>[PLAGECELL]</a:t>
@@ -6451,7 +7382,7 @@
                   <a:bodyPr/>
                   <a:lstStyle/>
                   <a:p>
-                    <a:fld id="{FA7FCD4C-07CC-42F8-853E-2B5A570D2679}" type="CELLRANGE">
+                    <a:fld id="{FFF199DA-DAA1-442A-B366-ACD160F13E37}" type="CELLRANGE">
                       <a:rPr lang="en-GB"/>
                       <a:pPr/>
                       <a:t>[PLAGECELL]</a:t>
@@ -6484,7 +7415,7 @@
                   <a:bodyPr/>
                   <a:lstStyle/>
                   <a:p>
-                    <a:fld id="{F4D832BE-4877-45A5-BB2E-53DF7DBD3921}" type="CELLRANGE">
+                    <a:fld id="{019625B3-57A5-43A6-8DA4-62A7AEF66711}" type="CELLRANGE">
                       <a:rPr lang="en-GB"/>
                       <a:pPr/>
                       <a:t>[PLAGECELL]</a:t>
@@ -6517,7 +7448,7 @@
                   <a:bodyPr/>
                   <a:lstStyle/>
                   <a:p>
-                    <a:fld id="{941BD0BF-12A9-445A-B627-AA3F86B99418}" type="CELLRANGE">
+                    <a:fld id="{96F2FAC1-7C50-47C6-8944-412B6F7B8C67}" type="CELLRANGE">
                       <a:rPr lang="en-GB"/>
                       <a:pPr/>
                       <a:t>[PLAGECELL]</a:t>
@@ -6550,7 +7481,7 @@
                   <a:bodyPr/>
                   <a:lstStyle/>
                   <a:p>
-                    <a:fld id="{CE411C56-8878-497D-9BC6-C2AD5A0C596B}" type="CELLRANGE">
+                    <a:fld id="{5E19BCBA-91DB-4543-BAB5-C275763D8C8E}" type="CELLRANGE">
                       <a:rPr lang="en-GB"/>
                       <a:pPr/>
                       <a:t>[PLAGECELL]</a:t>
@@ -6583,7 +7514,7 @@
                   <a:bodyPr/>
                   <a:lstStyle/>
                   <a:p>
-                    <a:fld id="{2AD240FA-5AF8-4067-BAF9-3FB137740C3E}" type="CELLRANGE">
+                    <a:fld id="{327D34A1-3762-4177-8C76-AB36AC70D5ED}" type="CELLRANGE">
                       <a:rPr lang="en-GB"/>
                       <a:pPr/>
                       <a:t>[PLAGECELL]</a:t>
@@ -7152,7 +8083,7 @@
                   <a:bodyPr/>
                   <a:lstStyle/>
                   <a:p>
-                    <a:fld id="{2667BA91-B6A0-49CF-9EF6-392B4FF91768}" type="CELLRANGE">
+                    <a:fld id="{2C86DA64-DDAE-4E85-A33F-2C4964E47460}" type="CELLRANGE">
                       <a:rPr lang="en-GB"/>
                       <a:pPr/>
                       <a:t>[PLAGECELL]</a:t>
@@ -7185,7 +8116,7 @@
                   <a:bodyPr/>
                   <a:lstStyle/>
                   <a:p>
-                    <a:fld id="{15829663-50E4-44DF-9AFF-65774E77310D}" type="CELLRANGE">
+                    <a:fld id="{B31C460F-1A3F-4809-80AD-F6D06162259D}" type="CELLRANGE">
                       <a:rPr lang="en-GB"/>
                       <a:pPr/>
                       <a:t>[PLAGECELL]</a:t>
@@ -7218,7 +8149,7 @@
                   <a:bodyPr/>
                   <a:lstStyle/>
                   <a:p>
-                    <a:fld id="{9011D331-AE49-426F-8239-77F35B318672}" type="CELLRANGE">
+                    <a:fld id="{CE1B3596-2373-4791-ABB7-DBA79E5F9CA5}" type="CELLRANGE">
                       <a:rPr lang="en-GB"/>
                       <a:pPr/>
                       <a:t>[PLAGECELL]</a:t>
@@ -7251,7 +8182,7 @@
                   <a:bodyPr/>
                   <a:lstStyle/>
                   <a:p>
-                    <a:fld id="{66DBCA9E-598D-4C47-A80C-87F997FE25EC}" type="CELLRANGE">
+                    <a:fld id="{336BF3F9-19DD-40A4-B79F-05704E92FED3}" type="CELLRANGE">
                       <a:rPr lang="en-GB"/>
                       <a:pPr/>
                       <a:t>[PLAGECELL]</a:t>
@@ -7284,7 +8215,7 @@
                   <a:bodyPr/>
                   <a:lstStyle/>
                   <a:p>
-                    <a:fld id="{13D36C30-4D7F-4C08-8347-6A24C671AEA8}" type="CELLRANGE">
+                    <a:fld id="{65C558CE-03AC-4CE9-86D1-6DE5279F05F3}" type="CELLRANGE">
                       <a:rPr lang="en-GB"/>
                       <a:pPr/>
                       <a:t>[PLAGECELL]</a:t>
@@ -7317,7 +8248,7 @@
                   <a:bodyPr/>
                   <a:lstStyle/>
                   <a:p>
-                    <a:fld id="{55423CA0-3071-4022-9DF4-0DF20C4FF59B}" type="CELLRANGE">
+                    <a:fld id="{4518E405-16C1-4D71-BEE9-02E91ECD42CF}" type="CELLRANGE">
                       <a:rPr lang="en-GB"/>
                       <a:pPr/>
                       <a:t>[PLAGECELL]</a:t>
@@ -7350,7 +8281,7 @@
                   <a:bodyPr/>
                   <a:lstStyle/>
                   <a:p>
-                    <a:fld id="{619434EC-F8A0-4807-A41D-DA17126E401D}" type="CELLRANGE">
+                    <a:fld id="{E0AC32F7-915F-42F0-89EF-A0D9ECB9DFCA}" type="CELLRANGE">
                       <a:rPr lang="en-GB"/>
                       <a:pPr/>
                       <a:t>[PLAGECELL]</a:t>
@@ -7383,7 +8314,7 @@
                   <a:bodyPr/>
                   <a:lstStyle/>
                   <a:p>
-                    <a:fld id="{C1025C40-19F8-46F6-94EC-3B76BA0C5A36}" type="CELLRANGE">
+                    <a:fld id="{5C45CCB4-BCB6-4444-BB7A-CE3CE37D95B1}" type="CELLRANGE">
                       <a:rPr lang="en-GB"/>
                       <a:pPr/>
                       <a:t>[PLAGECELL]</a:t>
@@ -7416,7 +8347,7 @@
                   <a:bodyPr/>
                   <a:lstStyle/>
                   <a:p>
-                    <a:fld id="{040F8D3A-4084-4233-AA69-3C22005B856E}" type="CELLRANGE">
+                    <a:fld id="{136A175C-1F2F-41E4-91C6-08AA21212E1A}" type="CELLRANGE">
                       <a:rPr lang="en-GB"/>
                       <a:pPr/>
                       <a:t>[PLAGECELL]</a:t>
@@ -7449,7 +8380,7 @@
                   <a:bodyPr/>
                   <a:lstStyle/>
                   <a:p>
-                    <a:fld id="{A7655434-1F47-4D92-9B95-476B4382C0AF}" type="CELLRANGE">
+                    <a:fld id="{7198BD12-D2F8-4994-AD1C-E6C67CF21467}" type="CELLRANGE">
                       <a:rPr lang="en-GB"/>
                       <a:pPr/>
                       <a:t>[PLAGECELL]</a:t>
@@ -8018,7 +8949,7 @@
                   <a:bodyPr/>
                   <a:lstStyle/>
                   <a:p>
-                    <a:fld id="{D1627B80-11B0-488D-9385-ECC724D3E02B}" type="CELLRANGE">
+                    <a:fld id="{AAD0B411-8668-4D1F-9291-3B92E21D04FA}" type="CELLRANGE">
                       <a:rPr lang="en-GB"/>
                       <a:pPr/>
                       <a:t>[PLAGECELL]</a:t>
@@ -8051,7 +8982,7 @@
                   <a:bodyPr/>
                   <a:lstStyle/>
                   <a:p>
-                    <a:fld id="{7D0D7090-98B4-4B8E-8772-77999FD06E0C}" type="CELLRANGE">
+                    <a:fld id="{980F6161-2748-4EF6-8D1B-3B321C686C2A}" type="CELLRANGE">
                       <a:rPr lang="en-GB"/>
                       <a:pPr/>
                       <a:t>[PLAGECELL]</a:t>
@@ -8084,7 +9015,7 @@
                   <a:bodyPr/>
                   <a:lstStyle/>
                   <a:p>
-                    <a:fld id="{FDE3B8B3-8A65-4ADD-B7C4-856FCA5BE21D}" type="CELLRANGE">
+                    <a:fld id="{7D861003-4016-4D77-84F5-35852D15396F}" type="CELLRANGE">
                       <a:rPr lang="en-GB"/>
                       <a:pPr/>
                       <a:t>[PLAGECELL]</a:t>
@@ -8117,7 +9048,7 @@
                   <a:bodyPr/>
                   <a:lstStyle/>
                   <a:p>
-                    <a:fld id="{41AB7B1A-87F7-4430-B778-EBF844153515}" type="CELLRANGE">
+                    <a:fld id="{2100EBA7-936D-453E-921B-96B0E0FECF0E}" type="CELLRANGE">
                       <a:rPr lang="en-GB"/>
                       <a:pPr/>
                       <a:t>[PLAGECELL]</a:t>
@@ -8150,7 +9081,7 @@
                   <a:bodyPr/>
                   <a:lstStyle/>
                   <a:p>
-                    <a:fld id="{64B941C3-2F74-4F3C-A608-53BFD3357DC2}" type="CELLRANGE">
+                    <a:fld id="{208F5F80-ACF7-46CB-A7E3-5B4BB6C7C677}" type="CELLRANGE">
                       <a:rPr lang="en-GB"/>
                       <a:pPr/>
                       <a:t>[PLAGECELL]</a:t>
@@ -8183,7 +9114,7 @@
                   <a:bodyPr/>
                   <a:lstStyle/>
                   <a:p>
-                    <a:fld id="{21E62B0B-95B0-40AF-9E86-E0905797566C}" type="CELLRANGE">
+                    <a:fld id="{9E180D17-F32C-42EF-9B6A-08EFD8642959}" type="CELLRANGE">
                       <a:rPr lang="en-GB"/>
                       <a:pPr/>
                       <a:t>[PLAGECELL]</a:t>
@@ -8216,7 +9147,7 @@
                   <a:bodyPr/>
                   <a:lstStyle/>
                   <a:p>
-                    <a:fld id="{DF3C890B-CF9C-4F6F-9605-7AFF2D41E60D}" type="CELLRANGE">
+                    <a:fld id="{9EE2AAAC-5912-4B1A-AAA5-932F09370CD5}" type="CELLRANGE">
                       <a:rPr lang="en-GB"/>
                       <a:pPr/>
                       <a:t>[PLAGECELL]</a:t>
@@ -8249,7 +9180,7 @@
                   <a:bodyPr/>
                   <a:lstStyle/>
                   <a:p>
-                    <a:fld id="{354E2387-1158-4ABE-9F54-84FCDAF516E8}" type="CELLRANGE">
+                    <a:fld id="{095000DB-E04C-4D44-B0CC-C3275F3CA80A}" type="CELLRANGE">
                       <a:rPr lang="en-GB"/>
                       <a:pPr/>
                       <a:t>[PLAGECELL]</a:t>
@@ -8282,7 +9213,7 @@
                   <a:bodyPr/>
                   <a:lstStyle/>
                   <a:p>
-                    <a:fld id="{03FA079D-3D7A-4390-941C-CCEACB8B1AD8}" type="CELLRANGE">
+                    <a:fld id="{32CF5E41-CA01-417D-B57F-24B9CFE63F00}" type="CELLRANGE">
                       <a:rPr lang="en-GB"/>
                       <a:pPr/>
                       <a:t>[PLAGECELL]</a:t>
@@ -8315,7 +9246,7 @@
                   <a:bodyPr/>
                   <a:lstStyle/>
                   <a:p>
-                    <a:fld id="{0A3FBD05-D24E-43F9-869D-EB33EAB1B3AE}" type="CELLRANGE">
+                    <a:fld id="{CFB5FCAE-CDBF-4EAD-BEA2-B60F2935D414}" type="CELLRANGE">
                       <a:rPr lang="en-GB"/>
                       <a:pPr/>
                       <a:t>[PLAGECELL]</a:t>
@@ -8764,6 +9695,43 @@
 </cs:colorStyle>
 </file>
 
+<file path=ppt/charts/colors13.xml><?xml version="1.0" encoding="utf-8"?>
+<cs:colorStyle xmlns:cs="http://schemas.microsoft.com/office/drawing/2012/chartStyle" xmlns:a="http://schemas.openxmlformats.org/drawingml/2006/main" meth="cycle" id="12">
+  <a:schemeClr val="accent2"/>
+  <a:schemeClr val="accent4"/>
+  <a:schemeClr val="accent6"/>
+  <cs:variation/>
+  <cs:variation>
+    <a:lumMod val="60000"/>
+  </cs:variation>
+  <cs:variation>
+    <a:lumMod val="80000"/>
+    <a:lumOff val="20000"/>
+  </cs:variation>
+  <cs:variation>
+    <a:lumMod val="80000"/>
+  </cs:variation>
+  <cs:variation>
+    <a:lumMod val="60000"/>
+    <a:lumOff val="40000"/>
+  </cs:variation>
+  <cs:variation>
+    <a:lumMod val="50000"/>
+  </cs:variation>
+  <cs:variation>
+    <a:lumMod val="70000"/>
+    <a:lumOff val="30000"/>
+  </cs:variation>
+  <cs:variation>
+    <a:lumMod val="70000"/>
+  </cs:variation>
+  <cs:variation>
+    <a:lumMod val="50000"/>
+    <a:lumOff val="50000"/>
+  </cs:variation>
+</cs:colorStyle>
+</file>
+
 <file path=ppt/charts/colors2.xml><?xml version="1.0" encoding="utf-8"?>
 <cs:colorStyle xmlns:cs="http://schemas.microsoft.com/office/drawing/2012/chartStyle" xmlns:a="http://schemas.openxmlformats.org/drawingml/2006/main" meth="cycle" id="10">
   <a:schemeClr val="accent1"/>
@@ -11151,6 +12119,525 @@
 </cs:chartStyle>
 </file>
 
+<file path=ppt/charts/style13.xml><?xml version="1.0" encoding="utf-8"?>
+<cs:chartStyle xmlns:cs="http://schemas.microsoft.com/office/drawing/2012/chartStyle" xmlns:a="http://schemas.openxmlformats.org/drawingml/2006/main" id="251">
+  <cs:axisTitle>
+    <cs:lnRef idx="0"/>
+    <cs:fillRef idx="0"/>
+    <cs:effectRef idx="0"/>
+    <cs:fontRef idx="minor">
+      <a:schemeClr val="tx1">
+        <a:lumMod val="65000"/>
+        <a:lumOff val="35000"/>
+      </a:schemeClr>
+    </cs:fontRef>
+    <cs:defRPr sz="1330" kern="1200"/>
+  </cs:axisTitle>
+  <cs:categoryAxis>
+    <cs:lnRef idx="0"/>
+    <cs:fillRef idx="0"/>
+    <cs:effectRef idx="0"/>
+    <cs:fontRef idx="minor">
+      <a:schemeClr val="tx1">
+        <a:lumMod val="65000"/>
+        <a:lumOff val="35000"/>
+      </a:schemeClr>
+    </cs:fontRef>
+    <cs:spPr>
+      <a:ln w="9525" cap="flat" cmpd="sng" algn="ctr">
+        <a:solidFill>
+          <a:schemeClr val="tx1">
+            <a:lumMod val="15000"/>
+            <a:lumOff val="85000"/>
+          </a:schemeClr>
+        </a:solidFill>
+        <a:round/>
+      </a:ln>
+    </cs:spPr>
+    <cs:defRPr sz="1197" kern="1200"/>
+  </cs:categoryAxis>
+  <cs:chartArea mods="allowNoFillOverride allowNoLineOverride">
+    <cs:lnRef idx="0"/>
+    <cs:fillRef idx="0"/>
+    <cs:effectRef idx="0"/>
+    <cs:fontRef idx="minor">
+      <a:schemeClr val="tx1"/>
+    </cs:fontRef>
+    <cs:spPr>
+      <a:solidFill>
+        <a:schemeClr val="bg1"/>
+      </a:solidFill>
+      <a:ln w="9525" cap="flat" cmpd="sng" algn="ctr">
+        <a:solidFill>
+          <a:schemeClr val="tx1">
+            <a:lumMod val="15000"/>
+            <a:lumOff val="85000"/>
+          </a:schemeClr>
+        </a:solidFill>
+        <a:round/>
+      </a:ln>
+    </cs:spPr>
+    <cs:defRPr sz="1197" kern="1200"/>
+  </cs:chartArea>
+  <cs:dataLabel>
+    <cs:lnRef idx="0"/>
+    <cs:fillRef idx="0"/>
+    <cs:effectRef idx="0"/>
+    <cs:fontRef idx="minor">
+      <a:schemeClr val="tx1">
+        <a:lumMod val="75000"/>
+        <a:lumOff val="25000"/>
+      </a:schemeClr>
+    </cs:fontRef>
+    <cs:defRPr sz="1197" kern="1200"/>
+  </cs:dataLabel>
+  <cs:dataLabelCallout>
+    <cs:lnRef idx="0"/>
+    <cs:fillRef idx="0"/>
+    <cs:effectRef idx="0"/>
+    <cs:fontRef idx="minor">
+      <a:schemeClr val="dk1">
+        <a:lumMod val="65000"/>
+        <a:lumOff val="35000"/>
+      </a:schemeClr>
+    </cs:fontRef>
+    <cs:spPr>
+      <a:solidFill>
+        <a:schemeClr val="lt1"/>
+      </a:solidFill>
+      <a:ln>
+        <a:solidFill>
+          <a:schemeClr val="dk1">
+            <a:lumMod val="25000"/>
+            <a:lumOff val="75000"/>
+          </a:schemeClr>
+        </a:solidFill>
+      </a:ln>
+    </cs:spPr>
+    <cs:defRPr sz="1197" kern="1200"/>
+    <cs:bodyPr rot="0" spcFirstLastPara="1" vertOverflow="clip" horzOverflow="clip" vert="horz" wrap="square" lIns="36576" tIns="18288" rIns="36576" bIns="18288" anchor="ctr" anchorCtr="1">
+      <a:spAutoFit/>
+    </cs:bodyPr>
+  </cs:dataLabelCallout>
+  <cs:dataPoint>
+    <cs:lnRef idx="0"/>
+    <cs:fillRef idx="1">
+      <cs:styleClr val="auto"/>
+    </cs:fillRef>
+    <cs:effectRef idx="0"/>
+    <cs:fontRef idx="minor">
+      <a:schemeClr val="tx1"/>
+    </cs:fontRef>
+    <cs:spPr>
+      <a:ln w="19050">
+        <a:solidFill>
+          <a:schemeClr val="lt1"/>
+        </a:solidFill>
+      </a:ln>
+    </cs:spPr>
+  </cs:dataPoint>
+  <cs:dataPoint3D>
+    <cs:lnRef idx="0"/>
+    <cs:fillRef idx="1">
+      <cs:styleClr val="auto"/>
+    </cs:fillRef>
+    <cs:effectRef idx="0"/>
+    <cs:fontRef idx="minor">
+      <a:schemeClr val="tx1"/>
+    </cs:fontRef>
+    <cs:spPr>
+      <a:ln w="25400">
+        <a:solidFill>
+          <a:schemeClr val="lt1"/>
+        </a:solidFill>
+      </a:ln>
+    </cs:spPr>
+  </cs:dataPoint3D>
+  <cs:dataPointLine>
+    <cs:lnRef idx="0">
+      <cs:styleClr val="auto"/>
+    </cs:lnRef>
+    <cs:fillRef idx="0"/>
+    <cs:effectRef idx="0"/>
+    <cs:fontRef idx="minor">
+      <a:schemeClr val="tx1"/>
+    </cs:fontRef>
+    <cs:spPr>
+      <a:ln w="28575" cap="rnd">
+        <a:solidFill>
+          <a:schemeClr val="phClr"/>
+        </a:solidFill>
+        <a:round/>
+      </a:ln>
+    </cs:spPr>
+  </cs:dataPointLine>
+  <cs:dataPointMarker>
+    <cs:lnRef idx="0">
+      <cs:styleClr val="auto"/>
+    </cs:lnRef>
+    <cs:fillRef idx="1">
+      <cs:styleClr val="auto"/>
+    </cs:fillRef>
+    <cs:effectRef idx="0"/>
+    <cs:fontRef idx="minor">
+      <a:schemeClr val="tx1"/>
+    </cs:fontRef>
+    <cs:spPr>
+      <a:ln w="9525">
+        <a:solidFill>
+          <a:schemeClr val="phClr"/>
+        </a:solidFill>
+      </a:ln>
+    </cs:spPr>
+  </cs:dataPointMarker>
+  <cs:dataPointMarkerLayout symbol="circle" size="5"/>
+  <cs:dataPointWireframe>
+    <cs:lnRef idx="0">
+      <cs:styleClr val="auto"/>
+    </cs:lnRef>
+    <cs:fillRef idx="0"/>
+    <cs:effectRef idx="0"/>
+    <cs:fontRef idx="minor">
+      <a:schemeClr val="tx1"/>
+    </cs:fontRef>
+    <cs:spPr>
+      <a:ln w="9525" cap="rnd">
+        <a:solidFill>
+          <a:schemeClr val="phClr"/>
+        </a:solidFill>
+        <a:round/>
+      </a:ln>
+    </cs:spPr>
+  </cs:dataPointWireframe>
+  <cs:dataTable>
+    <cs:lnRef idx="0"/>
+    <cs:fillRef idx="0"/>
+    <cs:effectRef idx="0"/>
+    <cs:fontRef idx="minor">
+      <a:schemeClr val="tx1">
+        <a:lumMod val="65000"/>
+        <a:lumOff val="35000"/>
+      </a:schemeClr>
+    </cs:fontRef>
+    <cs:spPr>
+      <a:noFill/>
+      <a:ln w="9525" cap="flat" cmpd="sng" algn="ctr">
+        <a:solidFill>
+          <a:schemeClr val="tx1">
+            <a:lumMod val="15000"/>
+            <a:lumOff val="85000"/>
+          </a:schemeClr>
+        </a:solidFill>
+        <a:round/>
+      </a:ln>
+    </cs:spPr>
+    <cs:defRPr sz="1197" kern="1200"/>
+  </cs:dataTable>
+  <cs:downBar>
+    <cs:lnRef idx="0"/>
+    <cs:fillRef idx="0"/>
+    <cs:effectRef idx="0"/>
+    <cs:fontRef idx="minor">
+      <a:schemeClr val="tx1"/>
+    </cs:fontRef>
+    <cs:spPr>
+      <a:solidFill>
+        <a:schemeClr val="dk1">
+          <a:lumMod val="75000"/>
+          <a:lumOff val="25000"/>
+        </a:schemeClr>
+      </a:solidFill>
+      <a:ln w="9525" cap="flat" cmpd="sng" algn="ctr">
+        <a:solidFill>
+          <a:schemeClr val="tx1">
+            <a:lumMod val="65000"/>
+            <a:lumOff val="35000"/>
+          </a:schemeClr>
+        </a:solidFill>
+        <a:round/>
+      </a:ln>
+    </cs:spPr>
+  </cs:downBar>
+  <cs:dropLine>
+    <cs:lnRef idx="0"/>
+    <cs:fillRef idx="0"/>
+    <cs:effectRef idx="0"/>
+    <cs:fontRef idx="minor">
+      <a:schemeClr val="tx1"/>
+    </cs:fontRef>
+    <cs:spPr>
+      <a:ln w="9525" cap="flat" cmpd="sng" algn="ctr">
+        <a:solidFill>
+          <a:schemeClr val="tx1">
+            <a:lumMod val="35000"/>
+            <a:lumOff val="65000"/>
+          </a:schemeClr>
+        </a:solidFill>
+        <a:round/>
+      </a:ln>
+    </cs:spPr>
+  </cs:dropLine>
+  <cs:errorBar>
+    <cs:lnRef idx="0"/>
+    <cs:fillRef idx="0"/>
+    <cs:effectRef idx="0"/>
+    <cs:fontRef idx="minor">
+      <a:schemeClr val="tx1"/>
+    </cs:fontRef>
+    <cs:spPr>
+      <a:ln w="9525" cap="flat" cmpd="sng" algn="ctr">
+        <a:solidFill>
+          <a:schemeClr val="tx1">
+            <a:lumMod val="65000"/>
+            <a:lumOff val="35000"/>
+          </a:schemeClr>
+        </a:solidFill>
+        <a:round/>
+      </a:ln>
+    </cs:spPr>
+  </cs:errorBar>
+  <cs:floor>
+    <cs:lnRef idx="0"/>
+    <cs:fillRef idx="0"/>
+    <cs:effectRef idx="0"/>
+    <cs:fontRef idx="minor">
+      <a:schemeClr val="tx1"/>
+    </cs:fontRef>
+    <cs:spPr>
+      <a:noFill/>
+      <a:ln>
+        <a:noFill/>
+      </a:ln>
+    </cs:spPr>
+  </cs:floor>
+  <cs:gridlineMajor>
+    <cs:lnRef idx="0"/>
+    <cs:fillRef idx="0"/>
+    <cs:effectRef idx="0"/>
+    <cs:fontRef idx="minor">
+      <a:schemeClr val="tx1"/>
+    </cs:fontRef>
+    <cs:spPr>
+      <a:ln w="9525" cap="flat" cmpd="sng" algn="ctr">
+        <a:solidFill>
+          <a:schemeClr val="tx1">
+            <a:lumMod val="15000"/>
+            <a:lumOff val="85000"/>
+          </a:schemeClr>
+        </a:solidFill>
+        <a:round/>
+      </a:ln>
+    </cs:spPr>
+  </cs:gridlineMajor>
+  <cs:gridlineMinor>
+    <cs:lnRef idx="0"/>
+    <cs:fillRef idx="0"/>
+    <cs:effectRef idx="0"/>
+    <cs:fontRef idx="minor">
+      <a:schemeClr val="tx1"/>
+    </cs:fontRef>
+    <cs:spPr>
+      <a:ln w="9525" cap="flat" cmpd="sng" algn="ctr">
+        <a:solidFill>
+          <a:schemeClr val="tx1">
+            <a:lumMod val="5000"/>
+            <a:lumOff val="95000"/>
+          </a:schemeClr>
+        </a:solidFill>
+        <a:round/>
+      </a:ln>
+    </cs:spPr>
+  </cs:gridlineMinor>
+  <cs:hiLoLine>
+    <cs:lnRef idx="0"/>
+    <cs:fillRef idx="0"/>
+    <cs:effectRef idx="0"/>
+    <cs:fontRef idx="minor">
+      <a:schemeClr val="tx1"/>
+    </cs:fontRef>
+    <cs:spPr>
+      <a:ln w="9525" cap="flat" cmpd="sng" algn="ctr">
+        <a:solidFill>
+          <a:schemeClr val="tx1">
+            <a:lumMod val="50000"/>
+            <a:lumOff val="50000"/>
+          </a:schemeClr>
+        </a:solidFill>
+        <a:round/>
+      </a:ln>
+    </cs:spPr>
+  </cs:hiLoLine>
+  <cs:leaderLine>
+    <cs:lnRef idx="0"/>
+    <cs:fillRef idx="0"/>
+    <cs:effectRef idx="0"/>
+    <cs:fontRef idx="minor">
+      <a:schemeClr val="tx1"/>
+    </cs:fontRef>
+    <cs:spPr>
+      <a:ln w="9525" cap="flat" cmpd="sng" algn="ctr">
+        <a:solidFill>
+          <a:schemeClr val="tx1">
+            <a:lumMod val="35000"/>
+            <a:lumOff val="65000"/>
+          </a:schemeClr>
+        </a:solidFill>
+        <a:round/>
+      </a:ln>
+    </cs:spPr>
+  </cs:leaderLine>
+  <cs:legend>
+    <cs:lnRef idx="0"/>
+    <cs:fillRef idx="0"/>
+    <cs:effectRef idx="0"/>
+    <cs:fontRef idx="minor">
+      <a:schemeClr val="tx1">
+        <a:lumMod val="65000"/>
+        <a:lumOff val="35000"/>
+      </a:schemeClr>
+    </cs:fontRef>
+    <cs:defRPr sz="1197" kern="1200"/>
+  </cs:legend>
+  <cs:plotArea mods="allowNoFillOverride allowNoLineOverride">
+    <cs:lnRef idx="0"/>
+    <cs:fillRef idx="0"/>
+    <cs:effectRef idx="0"/>
+    <cs:fontRef idx="minor">
+      <a:schemeClr val="tx1"/>
+    </cs:fontRef>
+  </cs:plotArea>
+  <cs:plotArea3D mods="allowNoFillOverride allowNoLineOverride">
+    <cs:lnRef idx="0"/>
+    <cs:fillRef idx="0"/>
+    <cs:effectRef idx="0"/>
+    <cs:fontRef idx="minor">
+      <a:schemeClr val="tx1"/>
+    </cs:fontRef>
+  </cs:plotArea3D>
+  <cs:seriesAxis>
+    <cs:lnRef idx="0"/>
+    <cs:fillRef idx="0"/>
+    <cs:effectRef idx="0"/>
+    <cs:fontRef idx="minor">
+      <a:schemeClr val="tx1">
+        <a:lumMod val="65000"/>
+        <a:lumOff val="35000"/>
+      </a:schemeClr>
+    </cs:fontRef>
+    <cs:defRPr sz="1197" kern="1200"/>
+  </cs:seriesAxis>
+  <cs:seriesLine>
+    <cs:lnRef idx="0"/>
+    <cs:fillRef idx="0"/>
+    <cs:effectRef idx="0"/>
+    <cs:fontRef idx="minor">
+      <a:schemeClr val="tx1"/>
+    </cs:fontRef>
+    <cs:spPr>
+      <a:ln w="9525" cap="flat" cmpd="sng" algn="ctr">
+        <a:solidFill>
+          <a:schemeClr val="tx1">
+            <a:lumMod val="35000"/>
+            <a:lumOff val="65000"/>
+          </a:schemeClr>
+        </a:solidFill>
+        <a:round/>
+      </a:ln>
+    </cs:spPr>
+  </cs:seriesLine>
+  <cs:title>
+    <cs:lnRef idx="0"/>
+    <cs:fillRef idx="0"/>
+    <cs:effectRef idx="0"/>
+    <cs:fontRef idx="minor">
+      <a:schemeClr val="tx1">
+        <a:lumMod val="65000"/>
+        <a:lumOff val="35000"/>
+      </a:schemeClr>
+    </cs:fontRef>
+    <cs:defRPr sz="1862" b="0" kern="1200" spc="0" baseline="0"/>
+  </cs:title>
+  <cs:trendline>
+    <cs:lnRef idx="0">
+      <cs:styleClr val="auto"/>
+    </cs:lnRef>
+    <cs:fillRef idx="0"/>
+    <cs:effectRef idx="0"/>
+    <cs:fontRef idx="minor">
+      <a:schemeClr val="tx1"/>
+    </cs:fontRef>
+    <cs:spPr>
+      <a:ln w="19050" cap="rnd">
+        <a:solidFill>
+          <a:schemeClr val="phClr"/>
+        </a:solidFill>
+        <a:prstDash val="sysDot"/>
+      </a:ln>
+    </cs:spPr>
+  </cs:trendline>
+  <cs:trendlineLabel>
+    <cs:lnRef idx="0"/>
+    <cs:fillRef idx="0"/>
+    <cs:effectRef idx="0"/>
+    <cs:fontRef idx="minor">
+      <a:schemeClr val="tx1">
+        <a:lumMod val="65000"/>
+        <a:lumOff val="35000"/>
+      </a:schemeClr>
+    </cs:fontRef>
+    <cs:defRPr sz="1197" kern="1200"/>
+  </cs:trendlineLabel>
+  <cs:upBar>
+    <cs:lnRef idx="0"/>
+    <cs:fillRef idx="0"/>
+    <cs:effectRef idx="0"/>
+    <cs:fontRef idx="minor">
+      <a:schemeClr val="tx1"/>
+    </cs:fontRef>
+    <cs:spPr>
+      <a:solidFill>
+        <a:schemeClr val="lt1"/>
+      </a:solidFill>
+      <a:ln w="9525" cap="flat" cmpd="sng" algn="ctr">
+        <a:solidFill>
+          <a:schemeClr val="tx1">
+            <a:lumMod val="65000"/>
+            <a:lumOff val="35000"/>
+          </a:schemeClr>
+        </a:solidFill>
+        <a:round/>
+      </a:ln>
+    </cs:spPr>
+  </cs:upBar>
+  <cs:valueAxis>
+    <cs:lnRef idx="0"/>
+    <cs:fillRef idx="0"/>
+    <cs:effectRef idx="0"/>
+    <cs:fontRef idx="minor">
+      <a:schemeClr val="tx1">
+        <a:lumMod val="65000"/>
+        <a:lumOff val="35000"/>
+      </a:schemeClr>
+    </cs:fontRef>
+    <cs:defRPr sz="1197" kern="1200"/>
+  </cs:valueAxis>
+  <cs:wall>
+    <cs:lnRef idx="0"/>
+    <cs:fillRef idx="0"/>
+    <cs:effectRef idx="0"/>
+    <cs:fontRef idx="minor">
+      <a:schemeClr val="tx1"/>
+    </cs:fontRef>
+    <cs:spPr>
+      <a:noFill/>
+      <a:ln>
+        <a:noFill/>
+      </a:ln>
+    </cs:spPr>
+  </cs:wall>
+</cs:chartStyle>
+</file>
+
 <file path=ppt/charts/style2.xml><?xml version="1.0" encoding="utf-8"?>
 <cs:chartStyle xmlns:cs="http://schemas.microsoft.com/office/drawing/2012/chartStyle" xmlns:a="http://schemas.openxmlformats.org/drawingml/2006/main" id="251">
   <cs:axisTitle>
@@ -15450,7 +16937,7 @@
           <a:p>
             <a:fld id="{5D8C8274-AA4F-429F-9B82-7A72192A35BB}" type="datetimeFigureOut">
               <a:rPr lang="fr-FR" smtClean="0"/>
-              <a:t>01/02/2024</a:t>
+              <a:t>06/02/2024</a:t>
             </a:fld>
             <a:endParaRPr lang="fr-FR"/>
           </a:p>
@@ -15648,7 +17135,7 @@
           <a:p>
             <a:fld id="{5D8C8274-AA4F-429F-9B82-7A72192A35BB}" type="datetimeFigureOut">
               <a:rPr lang="fr-FR" smtClean="0"/>
-              <a:t>01/02/2024</a:t>
+              <a:t>06/02/2024</a:t>
             </a:fld>
             <a:endParaRPr lang="fr-FR"/>
           </a:p>
@@ -15856,7 +17343,7 @@
           <a:p>
             <a:fld id="{5D8C8274-AA4F-429F-9B82-7A72192A35BB}" type="datetimeFigureOut">
               <a:rPr lang="fr-FR" smtClean="0"/>
-              <a:t>01/02/2024</a:t>
+              <a:t>06/02/2024</a:t>
             </a:fld>
             <a:endParaRPr lang="fr-FR"/>
           </a:p>
@@ -16054,7 +17541,7 @@
           <a:p>
             <a:fld id="{5D8C8274-AA4F-429F-9B82-7A72192A35BB}" type="datetimeFigureOut">
               <a:rPr lang="fr-FR" smtClean="0"/>
-              <a:t>01/02/2024</a:t>
+              <a:t>06/02/2024</a:t>
             </a:fld>
             <a:endParaRPr lang="fr-FR"/>
           </a:p>
@@ -16329,7 +17816,7 @@
           <a:p>
             <a:fld id="{5D8C8274-AA4F-429F-9B82-7A72192A35BB}" type="datetimeFigureOut">
               <a:rPr lang="fr-FR" smtClean="0"/>
-              <a:t>01/02/2024</a:t>
+              <a:t>06/02/2024</a:t>
             </a:fld>
             <a:endParaRPr lang="fr-FR"/>
           </a:p>
@@ -16594,7 +18081,7 @@
           <a:p>
             <a:fld id="{5D8C8274-AA4F-429F-9B82-7A72192A35BB}" type="datetimeFigureOut">
               <a:rPr lang="fr-FR" smtClean="0"/>
-              <a:t>01/02/2024</a:t>
+              <a:t>06/02/2024</a:t>
             </a:fld>
             <a:endParaRPr lang="fr-FR"/>
           </a:p>
@@ -17006,7 +18493,7 @@
           <a:p>
             <a:fld id="{5D8C8274-AA4F-429F-9B82-7A72192A35BB}" type="datetimeFigureOut">
               <a:rPr lang="fr-FR" smtClean="0"/>
-              <a:t>01/02/2024</a:t>
+              <a:t>06/02/2024</a:t>
             </a:fld>
             <a:endParaRPr lang="fr-FR"/>
           </a:p>
@@ -17147,7 +18634,7 @@
           <a:p>
             <a:fld id="{5D8C8274-AA4F-429F-9B82-7A72192A35BB}" type="datetimeFigureOut">
               <a:rPr lang="fr-FR" smtClean="0"/>
-              <a:t>01/02/2024</a:t>
+              <a:t>06/02/2024</a:t>
             </a:fld>
             <a:endParaRPr lang="fr-FR"/>
           </a:p>
@@ -17260,7 +18747,7 @@
           <a:p>
             <a:fld id="{5D8C8274-AA4F-429F-9B82-7A72192A35BB}" type="datetimeFigureOut">
               <a:rPr lang="fr-FR" smtClean="0"/>
-              <a:t>01/02/2024</a:t>
+              <a:t>06/02/2024</a:t>
             </a:fld>
             <a:endParaRPr lang="fr-FR"/>
           </a:p>
@@ -17571,7 +19058,7 @@
           <a:p>
             <a:fld id="{5D8C8274-AA4F-429F-9B82-7A72192A35BB}" type="datetimeFigureOut">
               <a:rPr lang="fr-FR" smtClean="0"/>
-              <a:t>01/02/2024</a:t>
+              <a:t>06/02/2024</a:t>
             </a:fld>
             <a:endParaRPr lang="fr-FR"/>
           </a:p>
@@ -17859,7 +19346,7 @@
           <a:p>
             <a:fld id="{5D8C8274-AA4F-429F-9B82-7A72192A35BB}" type="datetimeFigureOut">
               <a:rPr lang="fr-FR" smtClean="0"/>
-              <a:t>01/02/2024</a:t>
+              <a:t>06/02/2024</a:t>
             </a:fld>
             <a:endParaRPr lang="fr-FR"/>
           </a:p>
@@ -18100,7 +19587,7 @@
           <a:p>
             <a:fld id="{5D8C8274-AA4F-429F-9B82-7A72192A35BB}" type="datetimeFigureOut">
               <a:rPr lang="fr-FR" smtClean="0"/>
-              <a:t>01/02/2024</a:t>
+              <a:t>06/02/2024</a:t>
             </a:fld>
             <a:endParaRPr lang="fr-FR"/>
           </a:p>
@@ -19989,6 +21476,99 @@
     <p:extLst>
       <p:ext uri="{BB962C8B-B14F-4D97-AF65-F5344CB8AC3E}">
         <p14:creationId xmlns:p14="http://schemas.microsoft.com/office/powerpoint/2010/main" val="2394263534"/>
+      </p:ext>
+    </p:extLst>
+  </p:cSld>
+  <p:clrMapOvr>
+    <a:masterClrMapping/>
+  </p:clrMapOvr>
+</p:sld>
+</file>
+
+<file path=ppt/slides/slide13.xml><?xml version="1.0" encoding="utf-8"?>
+<p:sld xmlns:a="http://schemas.openxmlformats.org/drawingml/2006/main" xmlns:r="http://schemas.openxmlformats.org/officeDocument/2006/relationships" xmlns:p="http://schemas.openxmlformats.org/presentationml/2006/main">
+  <p:cSld>
+    <p:spTree>
+      <p:nvGrpSpPr>
+        <p:cNvPr id="1" name=""/>
+        <p:cNvGrpSpPr/>
+        <p:nvPr/>
+      </p:nvGrpSpPr>
+      <p:grpSpPr>
+        <a:xfrm>
+          <a:off x="0" y="0"/>
+          <a:ext cx="0" cy="0"/>
+          <a:chOff x="0" y="0"/>
+          <a:chExt cx="0" cy="0"/>
+        </a:xfrm>
+      </p:grpSpPr>
+      <p:graphicFrame>
+        <p:nvGraphicFramePr>
+          <p:cNvPr id="9" name="Graphique 8">
+            <a:extLst>
+              <a:ext uri="{FF2B5EF4-FFF2-40B4-BE49-F238E27FC236}">
+                <a16:creationId xmlns:a16="http://schemas.microsoft.com/office/drawing/2014/main" id="{3513C5A2-B67C-4F77-9D00-B88543B8CE9F}"/>
+              </a:ext>
+            </a:extLst>
+          </p:cNvPr>
+          <p:cNvGraphicFramePr/>
+          <p:nvPr>
+            <p:extLst>
+              <p:ext uri="{D42A27DB-BD31-4B8C-83A1-F6EECF244321}">
+                <p14:modId xmlns:p14="http://schemas.microsoft.com/office/powerpoint/2010/main" val="2465684869"/>
+              </p:ext>
+            </p:extLst>
+          </p:nvPr>
+        </p:nvGraphicFramePr>
+        <p:xfrm>
+          <a:off x="-1185597" y="1486671"/>
+          <a:ext cx="9765355" cy="4761080"/>
+        </p:xfrm>
+        <a:graphic>
+          <a:graphicData uri="http://schemas.openxmlformats.org/drawingml/2006/chart">
+            <c:chart xmlns:c="http://schemas.openxmlformats.org/drawingml/2006/chart" xmlns:r="http://schemas.openxmlformats.org/officeDocument/2006/relationships" r:id="rId2"/>
+          </a:graphicData>
+        </a:graphic>
+      </p:graphicFrame>
+      <p:sp>
+        <p:nvSpPr>
+          <p:cNvPr id="11" name="ZoneTexte 10">
+            <a:extLst>
+              <a:ext uri="{FF2B5EF4-FFF2-40B4-BE49-F238E27FC236}">
+                <a16:creationId xmlns:a16="http://schemas.microsoft.com/office/drawing/2014/main" id="{7BC42229-BEE8-44F1-8701-FC2C1EF84986}"/>
+              </a:ext>
+            </a:extLst>
+          </p:cNvPr>
+          <p:cNvSpPr txBox="1"/>
+          <p:nvPr/>
+        </p:nvSpPr>
+        <p:spPr>
+          <a:xfrm>
+            <a:off x="2217182" y="0"/>
+            <a:ext cx="7860229" cy="646331"/>
+          </a:xfrm>
+          <a:prstGeom prst="rect">
+            <a:avLst/>
+          </a:prstGeom>
+          <a:noFill/>
+        </p:spPr>
+        <p:txBody>
+          <a:bodyPr wrap="none" rtlCol="0">
+            <a:spAutoFit/>
+          </a:bodyPr>
+          <a:lstStyle/>
+          <a:p>
+            <a:r>
+              <a:rPr lang="en-GB" sz="3600" b="1" u="sng" dirty="0"/>
+              <a:t>Bottom countries (Check on 100 papers)</a:t>
+            </a:r>
+          </a:p>
+        </p:txBody>
+      </p:sp>
+    </p:spTree>
+    <p:extLst>
+      <p:ext uri="{BB962C8B-B14F-4D97-AF65-F5344CB8AC3E}">
+        <p14:creationId xmlns:p14="http://schemas.microsoft.com/office/powerpoint/2010/main" val="2991204706"/>
       </p:ext>
     </p:extLst>
   </p:cSld>
@@ -22933,7 +24513,7 @@
                   <a:schemeClr val="accent4"/>
                 </a:solidFill>
               </a:rPr>
-              <a:t>but that there is a mistake with other countries</a:t>
+              <a:t>there is a mistake with other countries</a:t>
             </a:r>
             <a:endParaRPr lang="en-GB" sz="2400" b="1" dirty="0">
               <a:solidFill>

</xml_diff>

<commit_message>
Shame on me aha! I pushed everything at the same time! Cleaning geoparsed data. Updates on figures
</commit_message>
<xml_diff>
--- a/data/geoparsing/Error_geoparsing.pptx
+++ b/data/geoparsing/Error_geoparsing.pptx
@@ -18,6 +18,7 @@
     <p:sldId id="266" r:id="rId12"/>
     <p:sldId id="267" r:id="rId13"/>
     <p:sldId id="268" r:id="rId14"/>
+    <p:sldId id="269" r:id="rId15"/>
   </p:sldIdLst>
   <p:sldSz cx="12192000" cy="6858000"/>
   <p:notesSz cx="6858000" cy="9144000"/>
@@ -263,7 +264,7 @@
                   <a:bodyPr/>
                   <a:lstStyle/>
                   <a:p>
-                    <a:fld id="{25737099-F42B-48A8-A113-73B4DCDE725D}" type="CELLRANGE">
+                    <a:fld id="{14580603-CC40-4B89-8E8B-C69A75593ED2}" type="CELLRANGE">
                       <a:rPr lang="en-GB"/>
                       <a:pPr/>
                       <a:t>[PLAGECELL]</a:t>
@@ -296,7 +297,7 @@
                   <a:bodyPr/>
                   <a:lstStyle/>
                   <a:p>
-                    <a:fld id="{C65475F9-6BB8-4149-BB3B-C863A77D3512}" type="CELLRANGE">
+                    <a:fld id="{C8A46FE6-D96D-417D-807C-5C237081F590}" type="CELLRANGE">
                       <a:rPr lang="en-GB"/>
                       <a:pPr/>
                       <a:t>[PLAGECELL]</a:t>
@@ -329,7 +330,7 @@
                   <a:bodyPr/>
                   <a:lstStyle/>
                   <a:p>
-                    <a:fld id="{586E426E-16F2-4ECA-8518-D173DDF8E7A7}" type="CELLRANGE">
+                    <a:fld id="{01805C9D-B8B7-4177-8238-316C9A7242E6}" type="CELLRANGE">
                       <a:rPr lang="en-GB"/>
                       <a:pPr/>
                       <a:t>[PLAGECELL]</a:t>
@@ -362,7 +363,7 @@
                   <a:bodyPr/>
                   <a:lstStyle/>
                   <a:p>
-                    <a:fld id="{F3E7B82E-E7B6-4D66-AB3B-7ED11F6C3C6C}" type="CELLRANGE">
+                    <a:fld id="{007011F7-481E-4DAC-A167-5918B99AE04D}" type="CELLRANGE">
                       <a:rPr lang="en-GB"/>
                       <a:pPr/>
                       <a:t>[PLAGECELL]</a:t>
@@ -877,7 +878,7 @@
                   <a:bodyPr/>
                   <a:lstStyle/>
                   <a:p>
-                    <a:fld id="{E733370B-E1E5-4B74-98C7-7E5BD62CC84E}" type="CELLRANGE">
+                    <a:fld id="{862C5DDD-F1B3-441B-9E0A-3C8522B2FD88}" type="CELLRANGE">
                       <a:rPr lang="en-GB"/>
                       <a:pPr/>
                       <a:t>[PLAGECELL]</a:t>
@@ -910,7 +911,7 @@
                   <a:bodyPr/>
                   <a:lstStyle/>
                   <a:p>
-                    <a:fld id="{D52BF9C2-73E9-4B3B-8982-7A5AF2324803}" type="CELLRANGE">
+                    <a:fld id="{573FC441-9F45-444F-897A-49EF14EFE538}" type="CELLRANGE">
                       <a:rPr lang="en-GB"/>
                       <a:pPr/>
                       <a:t>[PLAGECELL]</a:t>
@@ -943,7 +944,7 @@
                   <a:bodyPr/>
                   <a:lstStyle/>
                   <a:p>
-                    <a:fld id="{38B36B77-4D02-4EAE-9D41-0B988CE189FE}" type="CELLRANGE">
+                    <a:fld id="{FC8A227B-4176-47F7-8D71-C1C4C00CD54C}" type="CELLRANGE">
                       <a:rPr lang="en-GB"/>
                       <a:pPr/>
                       <a:t>[PLAGECELL]</a:t>
@@ -976,7 +977,7 @@
                   <a:bodyPr/>
                   <a:lstStyle/>
                   <a:p>
-                    <a:fld id="{28673DFD-4ED3-4B42-9907-02F6C8A9F0F4}" type="CELLRANGE">
+                    <a:fld id="{5314752A-C453-4A0F-9119-923F08E2A5EE}" type="CELLRANGE">
                       <a:rPr lang="en-GB"/>
                       <a:pPr/>
                       <a:t>[PLAGECELL]</a:t>
@@ -1009,7 +1010,7 @@
                   <a:bodyPr/>
                   <a:lstStyle/>
                   <a:p>
-                    <a:fld id="{A2B157EA-7AB5-4072-9AC8-EADEBA791DA3}" type="CELLRANGE">
+                    <a:fld id="{D468FA30-00E3-4034-8F74-F0741AECD910}" type="CELLRANGE">
                       <a:rPr lang="en-GB"/>
                       <a:pPr/>
                       <a:t>[PLAGECELL]</a:t>
@@ -1042,7 +1043,7 @@
                   <a:bodyPr/>
                   <a:lstStyle/>
                   <a:p>
-                    <a:fld id="{28CED11F-6E53-4459-ABDD-E3E11264B8F9}" type="CELLRANGE">
+                    <a:fld id="{34E45AA7-063B-4ED6-B482-F8385AEDED55}" type="CELLRANGE">
                       <a:rPr lang="en-GB"/>
                       <a:pPr/>
                       <a:t>[PLAGECELL]</a:t>
@@ -1075,7 +1076,7 @@
                   <a:bodyPr/>
                   <a:lstStyle/>
                   <a:p>
-                    <a:fld id="{BB28A303-E9B7-4272-B7B0-ED6900BA242D}" type="CELLRANGE">
+                    <a:fld id="{44436B70-20B9-4CCA-BE0E-CB21CCFCD38E}" type="CELLRANGE">
                       <a:rPr lang="en-GB"/>
                       <a:pPr/>
                       <a:t>[PLAGECELL]</a:t>
@@ -1108,7 +1109,7 @@
                   <a:bodyPr/>
                   <a:lstStyle/>
                   <a:p>
-                    <a:fld id="{A621237A-89A4-44FD-BF1B-FFE5D01F9C46}" type="CELLRANGE">
+                    <a:fld id="{035D1E64-6029-48E5-908F-82A267202D14}" type="CELLRANGE">
                       <a:rPr lang="en-GB"/>
                       <a:pPr/>
                       <a:t>[PLAGECELL]</a:t>
@@ -1141,7 +1142,7 @@
                   <a:bodyPr/>
                   <a:lstStyle/>
                   <a:p>
-                    <a:fld id="{0EE6B6F0-130A-4B51-BB21-0F369BB27428}" type="CELLRANGE">
+                    <a:fld id="{3DC044F7-7CE0-41FF-A909-F63DB1AA5113}" type="CELLRANGE">
                       <a:rPr lang="en-GB"/>
                       <a:pPr/>
                       <a:t>[PLAGECELL]</a:t>
@@ -1174,7 +1175,7 @@
                   <a:bodyPr/>
                   <a:lstStyle/>
                   <a:p>
-                    <a:fld id="{549CBC65-8EE1-4260-B13F-195C16158B2E}" type="CELLRANGE">
+                    <a:fld id="{75D89717-A4BE-4771-921D-FF4B47E21C25}" type="CELLRANGE">
                       <a:rPr lang="en-GB"/>
                       <a:pPr/>
                       <a:t>[PLAGECELL]</a:t>
@@ -1743,7 +1744,7 @@
                   <a:bodyPr/>
                   <a:lstStyle/>
                   <a:p>
-                    <a:fld id="{FE1FB807-D2F3-4FB8-BA99-818B138423A1}" type="CELLRANGE">
+                    <a:fld id="{8DC0E940-89D3-4DB2-A959-A599D2F6A4B2}" type="CELLRANGE">
                       <a:rPr lang="en-GB"/>
                       <a:pPr/>
                       <a:t>[PLAGECELL]</a:t>
@@ -1776,7 +1777,7 @@
                   <a:bodyPr/>
                   <a:lstStyle/>
                   <a:p>
-                    <a:fld id="{CD20187E-D455-43B7-BE58-FD5EF6D0926D}" type="CELLRANGE">
+                    <a:fld id="{91B122F8-D6A6-4AE9-A033-06790D077216}" type="CELLRANGE">
                       <a:rPr lang="en-GB"/>
                       <a:pPr/>
                       <a:t>[PLAGECELL]</a:t>
@@ -1809,7 +1810,7 @@
                   <a:bodyPr/>
                   <a:lstStyle/>
                   <a:p>
-                    <a:fld id="{170844A0-3CC2-4303-A1FA-3F83643F8C8E}" type="CELLRANGE">
+                    <a:fld id="{26F889E4-7F19-44A0-9C47-EC851E02A9DD}" type="CELLRANGE">
                       <a:rPr lang="en-GB"/>
                       <a:pPr/>
                       <a:t>[PLAGECELL]</a:t>
@@ -1842,7 +1843,7 @@
                   <a:bodyPr/>
                   <a:lstStyle/>
                   <a:p>
-                    <a:fld id="{F4A88DF2-A990-443C-8D3A-29913A36ED05}" type="CELLRANGE">
+                    <a:fld id="{1FFABE85-5380-4EBE-A6FB-A65A22DC7414}" type="CELLRANGE">
                       <a:rPr lang="en-GB"/>
                       <a:pPr/>
                       <a:t>[PLAGECELL]</a:t>
@@ -1875,7 +1876,7 @@
                   <a:bodyPr/>
                   <a:lstStyle/>
                   <a:p>
-                    <a:fld id="{58F62AC9-BB31-4E83-9CA3-232D1B868D41}" type="CELLRANGE">
+                    <a:fld id="{D884C3D5-E439-4D14-BE3D-856F82F905AC}" type="CELLRANGE">
                       <a:rPr lang="en-GB"/>
                       <a:pPr/>
                       <a:t>[PLAGECELL]</a:t>
@@ -1908,7 +1909,7 @@
                   <a:bodyPr/>
                   <a:lstStyle/>
                   <a:p>
-                    <a:fld id="{1F1A4874-210E-4539-B298-615AD042C55C}" type="CELLRANGE">
+                    <a:fld id="{24909E2A-97A7-4E00-AB2F-517E0174B920}" type="CELLRANGE">
                       <a:rPr lang="en-GB"/>
                       <a:pPr/>
                       <a:t>[PLAGECELL]</a:t>
@@ -1941,7 +1942,7 @@
                   <a:bodyPr/>
                   <a:lstStyle/>
                   <a:p>
-                    <a:fld id="{56116548-00E9-40DD-B44A-AEE3C588F3DD}" type="CELLRANGE">
+                    <a:fld id="{7D058D74-6887-475D-A01C-C422A38EC32E}" type="CELLRANGE">
                       <a:rPr lang="en-GB"/>
                       <a:pPr/>
                       <a:t>[PLAGECELL]</a:t>
@@ -1974,7 +1975,7 @@
                   <a:bodyPr/>
                   <a:lstStyle/>
                   <a:p>
-                    <a:fld id="{FA181B74-CEF5-41FC-A6C9-4F3B077261D4}" type="CELLRANGE">
+                    <a:fld id="{DA072A45-73D6-4B75-9553-FCE578EF6999}" type="CELLRANGE">
                       <a:rPr lang="en-GB"/>
                       <a:pPr/>
                       <a:t>[PLAGECELL]</a:t>
@@ -2007,7 +2008,7 @@
                   <a:bodyPr/>
                   <a:lstStyle/>
                   <a:p>
-                    <a:fld id="{E9A289BB-A193-4F44-8DB0-FA3EA7A731FF}" type="CELLRANGE">
+                    <a:fld id="{8EF389D9-3898-4CFE-B374-38C9FD475BAA}" type="CELLRANGE">
                       <a:rPr lang="en-GB"/>
                       <a:pPr/>
                       <a:t>[PLAGECELL]</a:t>
@@ -2040,7 +2041,7 @@
                   <a:bodyPr/>
                   <a:lstStyle/>
                   <a:p>
-                    <a:fld id="{C364882E-E0A0-429A-918E-467DC4D50D94}" type="CELLRANGE">
+                    <a:fld id="{850E7167-06AC-4FAB-BB4D-738E718F9F66}" type="CELLRANGE">
                       <a:rPr lang="en-GB"/>
                       <a:pPr/>
                       <a:t>[PLAGECELL]</a:t>
@@ -2609,7 +2610,7 @@
                   <a:bodyPr/>
                   <a:lstStyle/>
                   <a:p>
-                    <a:fld id="{1F95C306-85D1-446C-AF4E-11A3C41D498D}" type="CELLRANGE">
+                    <a:fld id="{6D7135F2-EC43-4893-96D0-C2FD5E3384A1}" type="CELLRANGE">
                       <a:rPr lang="en-GB"/>
                       <a:pPr/>
                       <a:t>[PLAGECELL]</a:t>
@@ -2642,7 +2643,7 @@
                   <a:bodyPr/>
                   <a:lstStyle/>
                   <a:p>
-                    <a:fld id="{29860C43-D3B5-4139-8AFC-EDF91E3AE0ED}" type="CELLRANGE">
+                    <a:fld id="{E9371E86-B9CA-4574-81EA-32147FB024A7}" type="CELLRANGE">
                       <a:rPr lang="en-GB"/>
                       <a:pPr/>
                       <a:t>[PLAGECELL]</a:t>
@@ -2675,7 +2676,7 @@
                   <a:bodyPr/>
                   <a:lstStyle/>
                   <a:p>
-                    <a:fld id="{FAECA2D4-9FF2-49E4-9F41-D57096CDF063}" type="CELLRANGE">
+                    <a:fld id="{A03E027B-1FC4-448B-A10A-67AEB3234494}" type="CELLRANGE">
                       <a:rPr lang="en-GB"/>
                       <a:pPr/>
                       <a:t>[PLAGECELL]</a:t>
@@ -2708,7 +2709,7 @@
                   <a:bodyPr/>
                   <a:lstStyle/>
                   <a:p>
-                    <a:fld id="{40E99B61-A27F-4E41-8EA5-22B4715123C1}" type="CELLRANGE">
+                    <a:fld id="{0F86DC3D-570B-484E-9EED-75E4D30153AE}" type="CELLRANGE">
                       <a:rPr lang="en-GB"/>
                       <a:pPr/>
                       <a:t>[PLAGECELL]</a:t>
@@ -2741,7 +2742,7 @@
                   <a:bodyPr/>
                   <a:lstStyle/>
                   <a:p>
-                    <a:fld id="{4E5945AB-07D9-4F52-95E8-37E8840CDB03}" type="CELLRANGE">
+                    <a:fld id="{22D45688-18AF-43CE-8132-217CD247F6B6}" type="CELLRANGE">
                       <a:rPr lang="en-GB"/>
                       <a:pPr/>
                       <a:t>[PLAGECELL]</a:t>
@@ -2774,7 +2775,7 @@
                   <a:bodyPr/>
                   <a:lstStyle/>
                   <a:p>
-                    <a:fld id="{D1F54952-5671-451F-BCF2-8EEE4243DBE4}" type="CELLRANGE">
+                    <a:fld id="{A16E9303-0C0B-4AF6-AD0F-3835E27F8B32}" type="CELLRANGE">
                       <a:rPr lang="en-GB"/>
                       <a:pPr/>
                       <a:t>[PLAGECELL]</a:t>
@@ -2807,7 +2808,7 @@
                   <a:bodyPr/>
                   <a:lstStyle/>
                   <a:p>
-                    <a:fld id="{5208FA9F-AFD3-4AC5-83E7-C454994DFCAD}" type="CELLRANGE">
+                    <a:fld id="{ABBCA871-F646-474A-8FEB-F8C80A59CAC6}" type="CELLRANGE">
                       <a:rPr lang="en-GB"/>
                       <a:pPr/>
                       <a:t>[PLAGECELL]</a:t>
@@ -2840,7 +2841,7 @@
                   <a:bodyPr/>
                   <a:lstStyle/>
                   <a:p>
-                    <a:fld id="{0AEF4493-185D-4F9C-BC3A-81A47D88D80D}" type="CELLRANGE">
+                    <a:fld id="{6B90926D-9914-46DA-ACCC-E647CD1404D4}" type="CELLRANGE">
                       <a:rPr lang="en-GB"/>
                       <a:pPr/>
                       <a:t>[PLAGECELL]</a:t>
@@ -2873,7 +2874,7 @@
                   <a:bodyPr/>
                   <a:lstStyle/>
                   <a:p>
-                    <a:fld id="{097C5F0A-4850-4835-9586-303D3D8CB640}" type="CELLRANGE">
+                    <a:fld id="{8551762B-28F4-4C97-A7C3-30AECDFC96F8}" type="CELLRANGE">
                       <a:rPr lang="en-GB"/>
                       <a:pPr/>
                       <a:t>[PLAGECELL]</a:t>
@@ -2906,7 +2907,7 @@
                   <a:bodyPr/>
                   <a:lstStyle/>
                   <a:p>
-                    <a:fld id="{65A4B249-F784-46D2-A97F-DFA25354E240}" type="CELLRANGE">
+                    <a:fld id="{3AA64552-B2EF-4C5F-BFB6-3BCC882A5B9D}" type="CELLRANGE">
                       <a:rPr lang="en-GB"/>
                       <a:pPr/>
                       <a:t>[PLAGECELL]</a:t>
@@ -3497,7 +3498,7 @@
                   <a:bodyPr/>
                   <a:lstStyle/>
                   <a:p>
-                    <a:fld id="{3D5F4F3E-7230-4B27-9003-0CE908B33C79}" type="CELLRANGE">
+                    <a:fld id="{E82C8B71-3586-4B97-8239-AFD98D51BC4C}" type="CELLRANGE">
                       <a:rPr lang="en-GB"/>
                       <a:pPr/>
                       <a:t>[PLAGECELL]</a:t>
@@ -3530,7 +3531,7 @@
                   <a:bodyPr/>
                   <a:lstStyle/>
                   <a:p>
-                    <a:fld id="{D38B2566-5E9E-4CC6-A945-6E89FB4263B4}" type="CELLRANGE">
+                    <a:fld id="{7E41F933-6A7F-4040-B88E-21C9C11D4441}" type="CELLRANGE">
                       <a:rPr lang="en-GB"/>
                       <a:pPr/>
                       <a:t>[PLAGECELL]</a:t>
@@ -3563,7 +3564,7 @@
                   <a:bodyPr/>
                   <a:lstStyle/>
                   <a:p>
-                    <a:fld id="{18B6E339-E0E9-4AF7-B8A5-39670243E964}" type="CELLRANGE">
+                    <a:fld id="{2DE42C02-73E7-45CD-A4E6-14F1F561B919}" type="CELLRANGE">
                       <a:rPr lang="en-GB"/>
                       <a:pPr/>
                       <a:t>[PLAGECELL]</a:t>
@@ -3596,7 +3597,7 @@
                   <a:bodyPr/>
                   <a:lstStyle/>
                   <a:p>
-                    <a:fld id="{EB312DFE-3688-4677-B416-71C16E06D2F2}" type="CELLRANGE">
+                    <a:fld id="{34290DA3-9B1C-4E88-8FD5-BEB9E33E28EA}" type="CELLRANGE">
                       <a:rPr lang="en-GB"/>
                       <a:pPr/>
                       <a:t>[PLAGECELL]</a:t>
@@ -3629,7 +3630,7 @@
                   <a:bodyPr/>
                   <a:lstStyle/>
                   <a:p>
-                    <a:fld id="{00BA3DD2-E922-41DF-B4A4-40B82678F0F8}" type="CELLRANGE">
+                    <a:fld id="{BF01891A-AB3D-4364-A68F-6551BB9BF646}" type="CELLRANGE">
                       <a:rPr lang="en-GB"/>
                       <a:pPr/>
                       <a:t>[PLAGECELL]</a:t>
@@ -3662,7 +3663,7 @@
                   <a:bodyPr/>
                   <a:lstStyle/>
                   <a:p>
-                    <a:fld id="{5D86FA40-3C56-4CF4-9CBF-EB84152055F1}" type="CELLRANGE">
+                    <a:fld id="{85FB1469-834D-46F5-A731-BE62E14AFA4D}" type="CELLRANGE">
                       <a:rPr lang="en-GB"/>
                       <a:pPr/>
                       <a:t>[PLAGECELL]</a:t>
@@ -3695,7 +3696,7 @@
                   <a:bodyPr/>
                   <a:lstStyle/>
                   <a:p>
-                    <a:fld id="{7D09FE1D-697A-4F8E-80D1-03A7B9F7311B}" type="CELLRANGE">
+                    <a:fld id="{3EFDAA63-C2C1-4B46-95DF-BFD7F77710A5}" type="CELLRANGE">
                       <a:rPr lang="en-GB"/>
                       <a:pPr/>
                       <a:t>[PLAGECELL]</a:t>
@@ -3728,7 +3729,7 @@
                   <a:bodyPr/>
                   <a:lstStyle/>
                   <a:p>
-                    <a:fld id="{27D76BC2-1094-40A9-87C2-5E58DC0FD65E}" type="CELLRANGE">
+                    <a:fld id="{5D7634B3-6C39-49C1-9920-F37621A0F78C}" type="CELLRANGE">
                       <a:rPr lang="en-GB"/>
                       <a:pPr/>
                       <a:t>[PLAGECELL]</a:t>
@@ -3761,7 +3762,7 @@
                   <a:bodyPr/>
                   <a:lstStyle/>
                   <a:p>
-                    <a:fld id="{1CB71098-BFC8-4F8B-B851-FD9A7A608103}" type="CELLRANGE">
+                    <a:fld id="{D5715ACC-05AB-4903-B7E1-F602D20C9C66}" type="CELLRANGE">
                       <a:rPr lang="en-GB"/>
                       <a:pPr/>
                       <a:t>[PLAGECELL]</a:t>
@@ -3794,7 +3795,7 @@
                   <a:bodyPr/>
                   <a:lstStyle/>
                   <a:p>
-                    <a:fld id="{C7F4EF6D-BDF0-45A8-B842-AC21CCB803C2}" type="CELLRANGE">
+                    <a:fld id="{7CBF94DB-9BE5-4DFC-97F3-6CD89AEFA090}" type="CELLRANGE">
                       <a:rPr lang="en-GB"/>
                       <a:pPr/>
                       <a:t>[PLAGECELL]</a:t>
@@ -3827,7 +3828,7 @@
                   <a:bodyPr/>
                   <a:lstStyle/>
                   <a:p>
-                    <a:fld id="{702DA2B4-040B-4D88-8E59-F74212219FEC}" type="CELLRANGE">
+                    <a:fld id="{0EB035C4-1562-4399-A1FB-D5C222E613FC}" type="CELLRANGE">
                       <a:rPr lang="en-GB"/>
                       <a:pPr/>
                       <a:t>[PLAGECELL]</a:t>
@@ -4134,6 +4135,686 @@
 </c:chartSpace>
 </file>
 
+<file path=ppt/charts/chart14.xml><?xml version="1.0" encoding="utf-8"?>
+<c:chartSpace xmlns:c="http://schemas.openxmlformats.org/drawingml/2006/chart" xmlns:a="http://schemas.openxmlformats.org/drawingml/2006/main" xmlns:r="http://schemas.openxmlformats.org/officeDocument/2006/relationships" xmlns:c16r2="http://schemas.microsoft.com/office/drawing/2015/06/chart">
+  <c:date1904 val="0"/>
+  <c:lang val="fr-FR"/>
+  <c:roundedCorners val="0"/>
+  <mc:AlternateContent xmlns:mc="http://schemas.openxmlformats.org/markup-compatibility/2006">
+    <mc:Choice xmlns:c14="http://schemas.microsoft.com/office/drawing/2007/8/2/chart" Requires="c14">
+      <c14:style val="102"/>
+    </mc:Choice>
+    <mc:Fallback>
+      <c:style val="2"/>
+    </mc:Fallback>
+  </mc:AlternateContent>
+  <c:chart>
+    <c:autoTitleDeleted val="1"/>
+    <c:plotArea>
+      <c:layout>
+        <c:manualLayout>
+          <c:layoutTarget val="inner"/>
+          <c:xMode val="edge"/>
+          <c:yMode val="edge"/>
+          <c:x val="3.0154988789135768E-2"/>
+          <c:y val="0"/>
+          <c:w val="0.75744394476990551"/>
+          <c:h val="1"/>
+        </c:manualLayout>
+      </c:layout>
+      <c:doughnutChart>
+        <c:varyColors val="1"/>
+        <c:ser>
+          <c:idx val="0"/>
+          <c:order val="0"/>
+          <c:tx>
+            <c:strRef>
+              <c:f>Feuil1!$B$1</c:f>
+              <c:strCache>
+                <c:ptCount val="1"/>
+                <c:pt idx="0">
+                  <c:v>Artciles</c:v>
+                </c:pt>
+              </c:strCache>
+            </c:strRef>
+          </c:tx>
+          <c:dPt>
+            <c:idx val="0"/>
+            <c:bubble3D val="0"/>
+            <c:spPr>
+              <a:solidFill>
+                <a:schemeClr val="accent6">
+                  <a:lumMod val="75000"/>
+                </a:schemeClr>
+              </a:solidFill>
+              <a:ln w="19050">
+                <a:solidFill>
+                  <a:schemeClr val="lt1"/>
+                </a:solidFill>
+              </a:ln>
+              <a:effectLst/>
+            </c:spPr>
+            <c:extLst>
+              <c:ext xmlns:c16="http://schemas.microsoft.com/office/drawing/2014/chart" uri="{C3380CC4-5D6E-409C-BE32-E72D297353CC}">
+                <c16:uniqueId val="{00000001-80CD-4879-85A7-DD0AB97C9BFB}"/>
+              </c:ext>
+            </c:extLst>
+          </c:dPt>
+          <c:dPt>
+            <c:idx val="1"/>
+            <c:bubble3D val="0"/>
+            <c:spPr>
+              <a:solidFill>
+                <a:schemeClr val="accent6">
+                  <a:lumMod val="60000"/>
+                  <a:lumOff val="40000"/>
+                </a:schemeClr>
+              </a:solidFill>
+              <a:ln w="19050">
+                <a:solidFill>
+                  <a:schemeClr val="lt1"/>
+                </a:solidFill>
+              </a:ln>
+              <a:effectLst/>
+            </c:spPr>
+            <c:extLst>
+              <c:ext xmlns:c16="http://schemas.microsoft.com/office/drawing/2014/chart" uri="{C3380CC4-5D6E-409C-BE32-E72D297353CC}">
+                <c16:uniqueId val="{00000003-80CD-4879-85A7-DD0AB97C9BFB}"/>
+              </c:ext>
+            </c:extLst>
+          </c:dPt>
+          <c:dPt>
+            <c:idx val="2"/>
+            <c:bubble3D val="0"/>
+            <c:spPr>
+              <a:solidFill>
+                <a:schemeClr val="accent5">
+                  <a:lumMod val="20000"/>
+                  <a:lumOff val="80000"/>
+                </a:schemeClr>
+              </a:solidFill>
+              <a:ln w="19050">
+                <a:solidFill>
+                  <a:schemeClr val="lt1"/>
+                </a:solidFill>
+              </a:ln>
+              <a:effectLst/>
+            </c:spPr>
+            <c:extLst>
+              <c:ext xmlns:c16="http://schemas.microsoft.com/office/drawing/2014/chart" uri="{C3380CC4-5D6E-409C-BE32-E72D297353CC}">
+                <c16:uniqueId val="{00000005-80CD-4879-85A7-DD0AB97C9BFB}"/>
+              </c:ext>
+            </c:extLst>
+          </c:dPt>
+          <c:dPt>
+            <c:idx val="3"/>
+            <c:bubble3D val="0"/>
+            <c:spPr>
+              <a:solidFill>
+                <a:schemeClr val="accent4">
+                  <a:lumMod val="60000"/>
+                  <a:lumOff val="40000"/>
+                </a:schemeClr>
+              </a:solidFill>
+              <a:ln w="19050">
+                <a:solidFill>
+                  <a:schemeClr val="lt1"/>
+                </a:solidFill>
+              </a:ln>
+              <a:effectLst/>
+            </c:spPr>
+            <c:extLst>
+              <c:ext xmlns:c16="http://schemas.microsoft.com/office/drawing/2014/chart" uri="{C3380CC4-5D6E-409C-BE32-E72D297353CC}">
+                <c16:uniqueId val="{00000007-80CD-4879-85A7-DD0AB97C9BFB}"/>
+              </c:ext>
+            </c:extLst>
+          </c:dPt>
+          <c:dPt>
+            <c:idx val="4"/>
+            <c:bubble3D val="0"/>
+            <c:spPr>
+              <a:solidFill>
+                <a:schemeClr val="accent2">
+                  <a:lumMod val="75000"/>
+                  <a:alpha val="80000"/>
+                </a:schemeClr>
+              </a:solidFill>
+              <a:ln w="19050">
+                <a:solidFill>
+                  <a:schemeClr val="lt1"/>
+                </a:solidFill>
+              </a:ln>
+              <a:effectLst/>
+            </c:spPr>
+            <c:extLst>
+              <c:ext xmlns:c16="http://schemas.microsoft.com/office/drawing/2014/chart" uri="{C3380CC4-5D6E-409C-BE32-E72D297353CC}">
+                <c16:uniqueId val="{00000009-80CD-4879-85A7-DD0AB97C9BFB}"/>
+              </c:ext>
+            </c:extLst>
+          </c:dPt>
+          <c:dPt>
+            <c:idx val="5"/>
+            <c:bubble3D val="0"/>
+            <c:spPr>
+              <a:solidFill>
+                <a:schemeClr val="accent2">
+                  <a:alpha val="70000"/>
+                </a:schemeClr>
+              </a:solidFill>
+              <a:ln w="19050">
+                <a:solidFill>
+                  <a:schemeClr val="lt1"/>
+                </a:solidFill>
+              </a:ln>
+              <a:effectLst/>
+            </c:spPr>
+            <c:extLst>
+              <c:ext xmlns:c16="http://schemas.microsoft.com/office/drawing/2014/chart" uri="{C3380CC4-5D6E-409C-BE32-E72D297353CC}">
+                <c16:uniqueId val="{0000000B-80CD-4879-85A7-DD0AB97C9BFB}"/>
+              </c:ext>
+            </c:extLst>
+          </c:dPt>
+          <c:dPt>
+            <c:idx val="6"/>
+            <c:bubble3D val="0"/>
+            <c:spPr>
+              <a:solidFill>
+                <a:schemeClr val="accent2">
+                  <a:lumMod val="40000"/>
+                  <a:lumOff val="60000"/>
+                  <a:alpha val="50000"/>
+                </a:schemeClr>
+              </a:solidFill>
+              <a:ln w="19050">
+                <a:solidFill>
+                  <a:schemeClr val="lt1"/>
+                </a:solidFill>
+              </a:ln>
+              <a:effectLst/>
+            </c:spPr>
+            <c:extLst>
+              <c:ext xmlns:c16="http://schemas.microsoft.com/office/drawing/2014/chart" uri="{C3380CC4-5D6E-409C-BE32-E72D297353CC}">
+                <c16:uniqueId val="{0000000D-80CD-4879-85A7-DD0AB97C9BFB}"/>
+              </c:ext>
+            </c:extLst>
+          </c:dPt>
+          <c:dLbls>
+            <c:dLbl>
+              <c:idx val="0"/>
+              <c:tx>
+                <c:rich>
+                  <a:bodyPr/>
+                  <a:lstStyle/>
+                  <a:p>
+                    <a:fld id="{8B204EA4-D1F8-4ADA-AD18-66F89C3F6D34}" type="CELLRANGE">
+                      <a:rPr lang="en-GB"/>
+                      <a:pPr/>
+                      <a:t>[PLAGECELL]</a:t>
+                    </a:fld>
+                    <a:endParaRPr lang="en-GB"/>
+                  </a:p>
+                </c:rich>
+              </c:tx>
+              <c:showLegendKey val="0"/>
+              <c:showVal val="0"/>
+              <c:showCatName val="0"/>
+              <c:showSerName val="0"/>
+              <c:showPercent val="0"/>
+              <c:showBubbleSize val="0"/>
+              <c:extLst>
+                <c:ext xmlns:c15="http://schemas.microsoft.com/office/drawing/2012/chart" uri="{CE6537A1-D6FC-4f65-9D91-7224C49458BB}">
+                  <c15:dlblFieldTable/>
+                  <c15:xForSave val="1"/>
+                  <c15:showDataLabelsRange val="1"/>
+                </c:ext>
+                <c:ext xmlns:c16="http://schemas.microsoft.com/office/drawing/2014/chart" uri="{C3380CC4-5D6E-409C-BE32-E72D297353CC}">
+                  <c16:uniqueId val="{00000001-80CD-4879-85A7-DD0AB97C9BFB}"/>
+                </c:ext>
+              </c:extLst>
+            </c:dLbl>
+            <c:dLbl>
+              <c:idx val="1"/>
+              <c:tx>
+                <c:rich>
+                  <a:bodyPr/>
+                  <a:lstStyle/>
+                  <a:p>
+                    <a:fld id="{60B9B7B4-DD65-4783-A76D-2BBB379FE657}" type="CELLRANGE">
+                      <a:rPr lang="en-GB"/>
+                      <a:pPr/>
+                      <a:t>[PLAGECELL]</a:t>
+                    </a:fld>
+                    <a:endParaRPr lang="en-GB"/>
+                  </a:p>
+                </c:rich>
+              </c:tx>
+              <c:showLegendKey val="0"/>
+              <c:showVal val="0"/>
+              <c:showCatName val="0"/>
+              <c:showSerName val="0"/>
+              <c:showPercent val="0"/>
+              <c:showBubbleSize val="0"/>
+              <c:extLst>
+                <c:ext xmlns:c15="http://schemas.microsoft.com/office/drawing/2012/chart" uri="{CE6537A1-D6FC-4f65-9D91-7224C49458BB}">
+                  <c15:dlblFieldTable/>
+                  <c15:xForSave val="1"/>
+                  <c15:showDataLabelsRange val="1"/>
+                </c:ext>
+                <c:ext xmlns:c16="http://schemas.microsoft.com/office/drawing/2014/chart" uri="{C3380CC4-5D6E-409C-BE32-E72D297353CC}">
+                  <c16:uniqueId val="{00000003-80CD-4879-85A7-DD0AB97C9BFB}"/>
+                </c:ext>
+              </c:extLst>
+            </c:dLbl>
+            <c:dLbl>
+              <c:idx val="2"/>
+              <c:tx>
+                <c:rich>
+                  <a:bodyPr/>
+                  <a:lstStyle/>
+                  <a:p>
+                    <a:fld id="{493FBC57-F2B7-48C9-85A2-A664C1B2DD24}" type="CELLRANGE">
+                      <a:rPr lang="en-GB"/>
+                      <a:pPr/>
+                      <a:t>[PLAGECELL]</a:t>
+                    </a:fld>
+                    <a:endParaRPr lang="en-GB"/>
+                  </a:p>
+                </c:rich>
+              </c:tx>
+              <c:showLegendKey val="0"/>
+              <c:showVal val="0"/>
+              <c:showCatName val="0"/>
+              <c:showSerName val="0"/>
+              <c:showPercent val="0"/>
+              <c:showBubbleSize val="0"/>
+              <c:extLst>
+                <c:ext xmlns:c15="http://schemas.microsoft.com/office/drawing/2012/chart" uri="{CE6537A1-D6FC-4f65-9D91-7224C49458BB}">
+                  <c15:dlblFieldTable/>
+                  <c15:xForSave val="1"/>
+                  <c15:showDataLabelsRange val="1"/>
+                </c:ext>
+                <c:ext xmlns:c16="http://schemas.microsoft.com/office/drawing/2014/chart" uri="{C3380CC4-5D6E-409C-BE32-E72D297353CC}">
+                  <c16:uniqueId val="{00000005-80CD-4879-85A7-DD0AB97C9BFB}"/>
+                </c:ext>
+              </c:extLst>
+            </c:dLbl>
+            <c:dLbl>
+              <c:idx val="3"/>
+              <c:tx>
+                <c:rich>
+                  <a:bodyPr/>
+                  <a:lstStyle/>
+                  <a:p>
+                    <a:fld id="{45A87229-224C-471B-8D50-5E5A98E0F2EE}" type="CELLRANGE">
+                      <a:rPr lang="en-GB"/>
+                      <a:pPr/>
+                      <a:t>[PLAGECELL]</a:t>
+                    </a:fld>
+                    <a:endParaRPr lang="en-GB"/>
+                  </a:p>
+                </c:rich>
+              </c:tx>
+              <c:showLegendKey val="0"/>
+              <c:showVal val="0"/>
+              <c:showCatName val="0"/>
+              <c:showSerName val="0"/>
+              <c:showPercent val="0"/>
+              <c:showBubbleSize val="0"/>
+              <c:extLst>
+                <c:ext xmlns:c15="http://schemas.microsoft.com/office/drawing/2012/chart" uri="{CE6537A1-D6FC-4f65-9D91-7224C49458BB}">
+                  <c15:dlblFieldTable/>
+                  <c15:xForSave val="1"/>
+                  <c15:showDataLabelsRange val="1"/>
+                </c:ext>
+                <c:ext xmlns:c16="http://schemas.microsoft.com/office/drawing/2014/chart" uri="{C3380CC4-5D6E-409C-BE32-E72D297353CC}">
+                  <c16:uniqueId val="{00000007-80CD-4879-85A7-DD0AB97C9BFB}"/>
+                </c:ext>
+              </c:extLst>
+            </c:dLbl>
+            <c:dLbl>
+              <c:idx val="4"/>
+              <c:tx>
+                <c:rich>
+                  <a:bodyPr/>
+                  <a:lstStyle/>
+                  <a:p>
+                    <a:fld id="{9D2CF28A-F202-4383-88FA-110A08C79449}" type="CELLRANGE">
+                      <a:rPr lang="en-GB"/>
+                      <a:pPr/>
+                      <a:t>[PLAGECELL]</a:t>
+                    </a:fld>
+                    <a:endParaRPr lang="en-GB"/>
+                  </a:p>
+                </c:rich>
+              </c:tx>
+              <c:showLegendKey val="0"/>
+              <c:showVal val="0"/>
+              <c:showCatName val="0"/>
+              <c:showSerName val="0"/>
+              <c:showPercent val="0"/>
+              <c:showBubbleSize val="0"/>
+              <c:extLst>
+                <c:ext xmlns:c15="http://schemas.microsoft.com/office/drawing/2012/chart" uri="{CE6537A1-D6FC-4f65-9D91-7224C49458BB}">
+                  <c15:dlblFieldTable/>
+                  <c15:xForSave val="1"/>
+                  <c15:showDataLabelsRange val="1"/>
+                </c:ext>
+                <c:ext xmlns:c16="http://schemas.microsoft.com/office/drawing/2014/chart" uri="{C3380CC4-5D6E-409C-BE32-E72D297353CC}">
+                  <c16:uniqueId val="{00000009-80CD-4879-85A7-DD0AB97C9BFB}"/>
+                </c:ext>
+              </c:extLst>
+            </c:dLbl>
+            <c:dLbl>
+              <c:idx val="5"/>
+              <c:tx>
+                <c:rich>
+                  <a:bodyPr/>
+                  <a:lstStyle/>
+                  <a:p>
+                    <a:fld id="{EBFE7E75-84D1-4EB1-B9DB-627E4074BE55}" type="CELLRANGE">
+                      <a:rPr lang="en-GB"/>
+                      <a:pPr/>
+                      <a:t>[PLAGECELL]</a:t>
+                    </a:fld>
+                    <a:endParaRPr lang="en-GB"/>
+                  </a:p>
+                </c:rich>
+              </c:tx>
+              <c:showLegendKey val="0"/>
+              <c:showVal val="0"/>
+              <c:showCatName val="0"/>
+              <c:showSerName val="0"/>
+              <c:showPercent val="0"/>
+              <c:showBubbleSize val="0"/>
+              <c:extLst>
+                <c:ext xmlns:c15="http://schemas.microsoft.com/office/drawing/2012/chart" uri="{CE6537A1-D6FC-4f65-9D91-7224C49458BB}">
+                  <c15:dlblFieldTable/>
+                  <c15:xForSave val="1"/>
+                  <c15:showDataLabelsRange val="1"/>
+                </c:ext>
+                <c:ext xmlns:c16="http://schemas.microsoft.com/office/drawing/2014/chart" uri="{C3380CC4-5D6E-409C-BE32-E72D297353CC}">
+                  <c16:uniqueId val="{0000000B-80CD-4879-85A7-DD0AB97C9BFB}"/>
+                </c:ext>
+              </c:extLst>
+            </c:dLbl>
+            <c:dLbl>
+              <c:idx val="6"/>
+              <c:tx>
+                <c:rich>
+                  <a:bodyPr/>
+                  <a:lstStyle/>
+                  <a:p>
+                    <a:fld id="{F1EF9CA4-3ED3-4D55-88C7-8BAB4113C501}" type="CELLRANGE">
+                      <a:rPr lang="en-GB"/>
+                      <a:pPr/>
+                      <a:t>[PLAGECELL]</a:t>
+                    </a:fld>
+                    <a:endParaRPr lang="en-GB"/>
+                  </a:p>
+                </c:rich>
+              </c:tx>
+              <c:showLegendKey val="0"/>
+              <c:showVal val="0"/>
+              <c:showCatName val="0"/>
+              <c:showSerName val="0"/>
+              <c:showPercent val="0"/>
+              <c:showBubbleSize val="0"/>
+              <c:extLst>
+                <c:ext xmlns:c15="http://schemas.microsoft.com/office/drawing/2012/chart" uri="{CE6537A1-D6FC-4f65-9D91-7224C49458BB}">
+                  <c15:dlblFieldTable/>
+                  <c15:xForSave val="1"/>
+                  <c15:showDataLabelsRange val="1"/>
+                </c:ext>
+                <c:ext xmlns:c16="http://schemas.microsoft.com/office/drawing/2014/chart" uri="{C3380CC4-5D6E-409C-BE32-E72D297353CC}">
+                  <c16:uniqueId val="{0000000D-80CD-4879-85A7-DD0AB97C9BFB}"/>
+                </c:ext>
+              </c:extLst>
+            </c:dLbl>
+            <c:spPr>
+              <a:noFill/>
+              <a:ln>
+                <a:noFill/>
+              </a:ln>
+              <a:effectLst/>
+            </c:spPr>
+            <c:txPr>
+              <a:bodyPr rot="0" spcFirstLastPara="1" vertOverflow="ellipsis" vert="horz" wrap="square" lIns="38100" tIns="19050" rIns="38100" bIns="19050" anchor="ctr" anchorCtr="1">
+                <a:spAutoFit/>
+              </a:bodyPr>
+              <a:lstStyle/>
+              <a:p>
+                <a:pPr>
+                  <a:defRPr sz="1600" b="1" i="0" u="none" strike="noStrike" kern="1200" baseline="0">
+                    <a:solidFill>
+                      <a:schemeClr val="tx1">
+                        <a:lumMod val="75000"/>
+                        <a:lumOff val="25000"/>
+                      </a:schemeClr>
+                    </a:solidFill>
+                    <a:latin typeface="+mn-lt"/>
+                    <a:ea typeface="+mn-ea"/>
+                    <a:cs typeface="+mn-cs"/>
+                  </a:defRPr>
+                </a:pPr>
+                <a:endParaRPr lang="fr-FR"/>
+              </a:p>
+            </c:txPr>
+            <c:showLegendKey val="0"/>
+            <c:showVal val="0"/>
+            <c:showCatName val="0"/>
+            <c:showSerName val="0"/>
+            <c:showPercent val="0"/>
+            <c:showBubbleSize val="0"/>
+            <c:showLeaderLines val="1"/>
+            <c:leaderLines>
+              <c:spPr>
+                <a:ln w="9525" cap="flat" cmpd="sng" algn="ctr">
+                  <a:solidFill>
+                    <a:schemeClr val="tx1">
+                      <a:lumMod val="35000"/>
+                      <a:lumOff val="65000"/>
+                    </a:schemeClr>
+                  </a:solidFill>
+                  <a:round/>
+                </a:ln>
+                <a:effectLst/>
+              </c:spPr>
+            </c:leaderLines>
+            <c:extLst>
+              <c:ext xmlns:c15="http://schemas.microsoft.com/office/drawing/2012/chart" uri="{CE6537A1-D6FC-4f65-9D91-7224C49458BB}">
+                <c15:showDataLabelsRange val="1"/>
+              </c:ext>
+            </c:extLst>
+          </c:dLbls>
+          <c:cat>
+            <c:strRef>
+              <c:f>Feuil1!$A$2:$A$8</c:f>
+              <c:strCache>
+                <c:ptCount val="7"/>
+                <c:pt idx="0">
+                  <c:v>TRUE</c:v>
+                </c:pt>
+                <c:pt idx="1">
+                  <c:v>False &amp; Corrected</c:v>
+                </c:pt>
+                <c:pt idx="2">
+                  <c:v>No understanding &amp; Correctable</c:v>
+                </c:pt>
+                <c:pt idx="3">
+                  <c:v>Half-true</c:v>
+                </c:pt>
+                <c:pt idx="4">
+                  <c:v>Scale</c:v>
+                </c:pt>
+                <c:pt idx="5">
+                  <c:v>Consortium</c:v>
+                </c:pt>
+                <c:pt idx="6">
+                  <c:v>No understanding</c:v>
+                </c:pt>
+              </c:strCache>
+            </c:strRef>
+          </c:cat>
+          <c:val>
+            <c:numRef>
+              <c:f>Feuil1!$B$2:$B$8</c:f>
+              <c:numCache>
+                <c:formatCode>General</c:formatCode>
+                <c:ptCount val="7"/>
+                <c:pt idx="0">
+                  <c:v>63</c:v>
+                </c:pt>
+                <c:pt idx="1">
+                  <c:v>3</c:v>
+                </c:pt>
+                <c:pt idx="2">
+                  <c:v>6</c:v>
+                </c:pt>
+                <c:pt idx="3">
+                  <c:v>12</c:v>
+                </c:pt>
+                <c:pt idx="4">
+                  <c:v>8</c:v>
+                </c:pt>
+                <c:pt idx="5">
+                  <c:v>3</c:v>
+                </c:pt>
+                <c:pt idx="6">
+                  <c:v>5</c:v>
+                </c:pt>
+              </c:numCache>
+            </c:numRef>
+          </c:val>
+          <c:extLst>
+            <c:ext xmlns:c15="http://schemas.microsoft.com/office/drawing/2012/chart" uri="{02D57815-91ED-43cb-92C2-25804820EDAC}">
+              <c15:datalabelsRange>
+                <c15:f>Feuil1!$B$2:$B$8</c15:f>
+                <c15:dlblRangeCache>
+                  <c:ptCount val="7"/>
+                  <c:pt idx="0">
+                    <c:v>63</c:v>
+                  </c:pt>
+                  <c:pt idx="1">
+                    <c:v>3</c:v>
+                  </c:pt>
+                  <c:pt idx="2">
+                    <c:v>6</c:v>
+                  </c:pt>
+                  <c:pt idx="3">
+                    <c:v>12</c:v>
+                  </c:pt>
+                  <c:pt idx="4">
+                    <c:v>8</c:v>
+                  </c:pt>
+                  <c:pt idx="5">
+                    <c:v>3</c:v>
+                  </c:pt>
+                  <c:pt idx="6">
+                    <c:v>5</c:v>
+                  </c:pt>
+                </c15:dlblRangeCache>
+              </c15:datalabelsRange>
+            </c:ext>
+            <c:ext xmlns:c16="http://schemas.microsoft.com/office/drawing/2014/chart" uri="{C3380CC4-5D6E-409C-BE32-E72D297353CC}">
+              <c16:uniqueId val="{00000016-80CD-4879-85A7-DD0AB97C9BFB}"/>
+            </c:ext>
+          </c:extLst>
+        </c:ser>
+        <c:dLbls>
+          <c:showLegendKey val="0"/>
+          <c:showVal val="0"/>
+          <c:showCatName val="0"/>
+          <c:showSerName val="0"/>
+          <c:showPercent val="1"/>
+          <c:showBubbleSize val="0"/>
+          <c:showLeaderLines val="1"/>
+        </c:dLbls>
+        <c:firstSliceAng val="0"/>
+        <c:holeSize val="60"/>
+      </c:doughnutChart>
+      <c:spPr>
+        <a:noFill/>
+        <a:ln>
+          <a:noFill/>
+        </a:ln>
+        <a:effectLst/>
+      </c:spPr>
+    </c:plotArea>
+    <c:legend>
+      <c:legendPos val="r"/>
+      <c:layout>
+        <c:manualLayout>
+          <c:xMode val="edge"/>
+          <c:yMode val="edge"/>
+          <c:x val="0.66633399400226612"/>
+          <c:y val="0"/>
+          <c:w val="0.33366600599773383"/>
+          <c:h val="1"/>
+        </c:manualLayout>
+      </c:layout>
+      <c:overlay val="0"/>
+      <c:spPr>
+        <a:noFill/>
+        <a:ln>
+          <a:noFill/>
+        </a:ln>
+        <a:effectLst/>
+      </c:spPr>
+      <c:txPr>
+        <a:bodyPr rot="0" spcFirstLastPara="1" vertOverflow="ellipsis" vert="horz" wrap="square" anchor="ctr" anchorCtr="1"/>
+        <a:lstStyle/>
+        <a:p>
+          <a:pPr>
+            <a:defRPr sz="2400" b="0" i="0" u="none" strike="noStrike" kern="1200" baseline="0">
+              <a:solidFill>
+                <a:schemeClr val="tx1">
+                  <a:lumMod val="65000"/>
+                  <a:lumOff val="35000"/>
+                </a:schemeClr>
+              </a:solidFill>
+              <a:latin typeface="+mn-lt"/>
+              <a:ea typeface="+mn-ea"/>
+              <a:cs typeface="+mn-cs"/>
+            </a:defRPr>
+          </a:pPr>
+          <a:endParaRPr lang="fr-FR"/>
+        </a:p>
+      </c:txPr>
+    </c:legend>
+    <c:plotVisOnly val="1"/>
+    <c:dispBlanksAs val="gap"/>
+    <c:extLst>
+      <c:ext xmlns:c16r3="http://schemas.microsoft.com/office/drawing/2017/03/chart" uri="{56B9EC1D-385E-4148-901F-78D8002777C0}">
+        <c16r3:dataDisplayOptions16>
+          <c16r3:dispNaAsBlank val="1"/>
+        </c16r3:dataDisplayOptions16>
+      </c:ext>
+    </c:extLst>
+    <c:showDLblsOverMax val="0"/>
+  </c:chart>
+  <c:spPr>
+    <a:noFill/>
+    <a:ln>
+      <a:noFill/>
+    </a:ln>
+    <a:effectLst/>
+  </c:spPr>
+  <c:txPr>
+    <a:bodyPr/>
+    <a:lstStyle/>
+    <a:p>
+      <a:pPr>
+        <a:defRPr/>
+      </a:pPr>
+      <a:endParaRPr lang="fr-FR"/>
+    </a:p>
+  </c:txPr>
+  <c:externalData r:id="rId3">
+    <c:autoUpdate val="0"/>
+  </c:externalData>
+</c:chartSpace>
+</file>
+
 <file path=ppt/charts/chart2.xml><?xml version="1.0" encoding="utf-8"?>
 <c:chartSpace xmlns:c="http://schemas.openxmlformats.org/drawingml/2006/chart" xmlns:a="http://schemas.openxmlformats.org/drawingml/2006/main" xmlns:r="http://schemas.openxmlformats.org/officeDocument/2006/relationships" xmlns:c16r2="http://schemas.microsoft.com/office/drawing/2015/06/chart">
   <c:date1904 val="0"/>
@@ -4273,7 +4954,7 @@
                   <a:bodyPr/>
                   <a:lstStyle/>
                   <a:p>
-                    <a:fld id="{B95EC88A-1E56-4AF6-AFB4-0209B4E15FD6}" type="CELLRANGE">
+                    <a:fld id="{7E3B692F-2B5D-4173-9375-5FE5CCA43BE6}" type="CELLRANGE">
                       <a:rPr lang="en-GB"/>
                       <a:pPr/>
                       <a:t>[PLAGECELL]</a:t>
@@ -4306,7 +4987,7 @@
                   <a:bodyPr/>
                   <a:lstStyle/>
                   <a:p>
-                    <a:fld id="{7568AAA7-FB05-40F1-9A8B-18ACDFBA5C41}" type="CELLRANGE">
+                    <a:fld id="{80F16A80-00E7-42D4-B1AA-2119A4D2E352}" type="CELLRANGE">
                       <a:rPr lang="en-GB"/>
                       <a:pPr/>
                       <a:t>[PLAGECELL]</a:t>
@@ -4339,7 +5020,7 @@
                   <a:bodyPr/>
                   <a:lstStyle/>
                   <a:p>
-                    <a:fld id="{F68F685A-4143-418B-A31A-76087B80FE23}" type="CELLRANGE">
+                    <a:fld id="{258A519F-88E2-4829-8CB0-4D041AD1BFB5}" type="CELLRANGE">
                       <a:rPr lang="en-GB"/>
                       <a:pPr/>
                       <a:t>[PLAGECELL]</a:t>
@@ -4372,7 +5053,7 @@
                   <a:bodyPr/>
                   <a:lstStyle/>
                   <a:p>
-                    <a:fld id="{FCB3C19C-4A97-44E4-8E0D-159D93A5F291}" type="CELLRANGE">
+                    <a:fld id="{2FB7EA15-419A-4B8C-A395-98E567AB91EC}" type="CELLRANGE">
                       <a:rPr lang="en-GB"/>
                       <a:pPr/>
                       <a:t>[PLAGECELL]</a:t>
@@ -4800,7 +5481,7 @@
                   <a:bodyPr/>
                   <a:lstStyle/>
                   <a:p>
-                    <a:fld id="{B02D3A6D-0243-4C1D-B7EB-2F691E85ED1D}" type="CELLRANGE">
+                    <a:fld id="{42FD1451-59D8-472A-899F-8DC128E7CCAF}" type="CELLRANGE">
                       <a:rPr lang="en-GB"/>
                       <a:pPr/>
                       <a:t>[PLAGECELL]</a:t>
@@ -4833,7 +5514,7 @@
                   <a:bodyPr/>
                   <a:lstStyle/>
                   <a:p>
-                    <a:fld id="{93A96BF3-BC84-4288-9A0C-0707F88AFD8C}" type="CELLRANGE">
+                    <a:fld id="{C5DBA9B9-56BB-4CC4-8EBE-FEE93CB176B3}" type="CELLRANGE">
                       <a:rPr lang="en-GB"/>
                       <a:pPr/>
                       <a:t>[PLAGECELL]</a:t>
@@ -4866,7 +5547,7 @@
                   <a:bodyPr/>
                   <a:lstStyle/>
                   <a:p>
-                    <a:fld id="{CDDC748E-83DF-4916-BB83-AA02762F60DD}" type="CELLRANGE">
+                    <a:fld id="{70722BFD-92D3-4D29-82DA-616F4CB4CF40}" type="CELLRANGE">
                       <a:rPr lang="en-GB"/>
                       <a:pPr/>
                       <a:t>[PLAGECELL]</a:t>
@@ -4899,7 +5580,7 @@
                   <a:bodyPr/>
                   <a:lstStyle/>
                   <a:p>
-                    <a:fld id="{9C368942-18A3-4C2D-9C71-14B39449AA65}" type="CELLRANGE">
+                    <a:fld id="{C6CED70E-3FD7-40CB-B6BE-9FEC9CFBA767}" type="CELLRANGE">
                       <a:rPr lang="en-GB"/>
                       <a:pPr/>
                       <a:t>[PLAGECELL]</a:t>
@@ -4932,7 +5613,7 @@
                   <a:bodyPr/>
                   <a:lstStyle/>
                   <a:p>
-                    <a:fld id="{A6B5B356-0058-415F-9BDD-D41938A1B7DF}" type="CELLRANGE">
+                    <a:fld id="{E7A3C05E-0B74-4750-9E19-2A6CC9AF717F}" type="CELLRANGE">
                       <a:rPr lang="en-GB"/>
                       <a:pPr/>
                       <a:t>[PLAGECELL]</a:t>
@@ -4965,7 +5646,7 @@
                   <a:bodyPr/>
                   <a:lstStyle/>
                   <a:p>
-                    <a:fld id="{31A29C08-41B2-4FA4-9910-3F40B7C87AC3}" type="CELLRANGE">
+                    <a:fld id="{7821A76C-B1E7-4EC0-ACD7-088FD844E9FD}" type="CELLRANGE">
                       <a:rPr lang="en-GB"/>
                       <a:pPr/>
                       <a:t>[PLAGECELL]</a:t>
@@ -5399,7 +6080,7 @@
                   <a:bodyPr/>
                   <a:lstStyle/>
                   <a:p>
-                    <a:fld id="{FC9C77B3-6096-401F-B214-EC5427BE5496}" type="CELLRANGE">
+                    <a:fld id="{D0A53DDC-6944-4A37-9BDD-BBF47B6CC01D}" type="CELLRANGE">
                       <a:rPr lang="en-GB"/>
                       <a:pPr/>
                       <a:t>[PLAGECELL]</a:t>
@@ -5432,7 +6113,7 @@
                   <a:bodyPr/>
                   <a:lstStyle/>
                   <a:p>
-                    <a:fld id="{7C0F9262-E8E2-452E-892B-C271CBD700C7}" type="CELLRANGE">
+                    <a:fld id="{7CAAFAD1-23BC-4E02-B21F-400369D7BC74}" type="CELLRANGE">
                       <a:rPr lang="en-GB"/>
                       <a:pPr/>
                       <a:t>[PLAGECELL]</a:t>
@@ -5465,7 +6146,7 @@
                   <a:bodyPr/>
                   <a:lstStyle/>
                   <a:p>
-                    <a:fld id="{A839CFEA-8BB0-42BD-9BD9-6B89C9A132EB}" type="CELLRANGE">
+                    <a:fld id="{8F37E5DA-30B8-41DD-8B1C-E7404DA98C30}" type="CELLRANGE">
                       <a:rPr lang="en-GB"/>
                       <a:pPr/>
                       <a:t>[PLAGECELL]</a:t>
@@ -5498,7 +6179,7 @@
                   <a:bodyPr/>
                   <a:lstStyle/>
                   <a:p>
-                    <a:fld id="{9B0B6560-D66C-4A44-82EF-F1A6D576D171}" type="CELLRANGE">
+                    <a:fld id="{7C2EE498-BF91-4756-9F0F-3C01B4FC9A07}" type="CELLRANGE">
                       <a:rPr lang="en-GB"/>
                       <a:pPr/>
                       <a:t>[PLAGECELL]</a:t>
@@ -5989,7 +6670,7 @@
                   <a:bodyPr/>
                   <a:lstStyle/>
                   <a:p>
-                    <a:fld id="{AB7189A6-AE40-4352-9AC6-F4A67F2E406C}" type="CELLRANGE">
+                    <a:fld id="{949CA570-B797-4313-A32C-AC08B9920C75}" type="CELLRANGE">
                       <a:rPr lang="en-GB"/>
                       <a:pPr/>
                       <a:t>[PLAGECELL]</a:t>
@@ -6022,7 +6703,7 @@
                   <a:bodyPr/>
                   <a:lstStyle/>
                   <a:p>
-                    <a:fld id="{0B56B9AE-630E-47FF-8626-106893ABC6C4}" type="CELLRANGE">
+                    <a:fld id="{832BCEF4-D2D6-485F-893C-4AD3C6CB5CAF}" type="CELLRANGE">
                       <a:rPr lang="en-GB"/>
                       <a:pPr/>
                       <a:t>[PLAGECELL]</a:t>
@@ -6055,7 +6736,7 @@
                   <a:bodyPr/>
                   <a:lstStyle/>
                   <a:p>
-                    <a:fld id="{2CBA63DE-2C09-4EA9-B555-27F015E8E5FC}" type="CELLRANGE">
+                    <a:fld id="{F12ACAA9-D8D5-464F-A183-0D373312C10A}" type="CELLRANGE">
                       <a:rPr lang="en-GB"/>
                       <a:pPr/>
                       <a:t>[PLAGECELL]</a:t>
@@ -6088,7 +6769,7 @@
                   <a:bodyPr/>
                   <a:lstStyle/>
                   <a:p>
-                    <a:fld id="{393D1D39-3555-4EF4-967D-E638E857CC2D}" type="CELLRANGE">
+                    <a:fld id="{8B3BFF92-2D80-4D17-8737-880C1A5667FF}" type="CELLRANGE">
                       <a:rPr lang="en-GB"/>
                       <a:pPr/>
                       <a:t>[PLAGECELL]</a:t>
@@ -6121,7 +6802,7 @@
                   <a:bodyPr/>
                   <a:lstStyle/>
                   <a:p>
-                    <a:fld id="{0BA20A9D-93CE-41FD-8F95-77DBA0CC3FFD}" type="CELLRANGE">
+                    <a:fld id="{8FE514F8-140F-4766-AC2C-5096CAE3D1E4}" type="CELLRANGE">
                       <a:rPr lang="en-GB"/>
                       <a:pPr/>
                       <a:t>[PLAGECELL]</a:t>
@@ -6154,7 +6835,7 @@
                   <a:bodyPr/>
                   <a:lstStyle/>
                   <a:p>
-                    <a:fld id="{F4C741F8-0404-4BCA-A5F9-0C3E9CA7B5BD}" type="CELLRANGE">
+                    <a:fld id="{190F966D-55BB-4A22-9BFD-5B6E95EDAE85}" type="CELLRANGE">
                       <a:rPr lang="en-GB"/>
                       <a:pPr/>
                       <a:t>[PLAGECELL]</a:t>
@@ -6187,7 +6868,7 @@
                   <a:bodyPr/>
                   <a:lstStyle/>
                   <a:p>
-                    <a:fld id="{C9969006-8A9A-4C5E-8E49-B3991A8EFADA}" type="CELLRANGE">
+                    <a:fld id="{CD5CE292-9341-4E01-BC87-17B15AF9BB0D}" type="CELLRANGE">
                       <a:rPr lang="en-GB"/>
                       <a:pPr/>
                       <a:t>[PLAGECELL]</a:t>
@@ -6220,7 +6901,7 @@
                   <a:bodyPr/>
                   <a:lstStyle/>
                   <a:p>
-                    <a:fld id="{93F02B79-AC13-4EC6-90E1-F65D2499D6DF}" type="CELLRANGE">
+                    <a:fld id="{66C2B046-21BF-4F85-9A39-1AE333BE766B}" type="CELLRANGE">
                       <a:rPr lang="en-GB"/>
                       <a:pPr/>
                       <a:t>[PLAGECELL]</a:t>
@@ -6253,7 +6934,7 @@
                   <a:bodyPr/>
                   <a:lstStyle/>
                   <a:p>
-                    <a:fld id="{3B803845-5EC0-4C61-B01D-F3328400501D}" type="CELLRANGE">
+                    <a:fld id="{63C06BE1-1F76-4CE1-A756-87A227CB7CAF}" type="CELLRANGE">
                       <a:rPr lang="en-GB"/>
                       <a:pPr/>
                       <a:t>[PLAGECELL]</a:t>
@@ -6645,7 +7326,7 @@
                   <a:bodyPr/>
                   <a:lstStyle/>
                   <a:p>
-                    <a:fld id="{DC5C489A-DFE4-4361-822F-5FCF735E44E4}" type="CELLRANGE">
+                    <a:fld id="{2B9E6134-3F4C-4962-A05E-486A8A518CF7}" type="CELLRANGE">
                       <a:rPr lang="en-GB"/>
                       <a:pPr/>
                       <a:t>[PLAGECELL]</a:t>
@@ -6678,7 +7359,7 @@
                   <a:bodyPr/>
                   <a:lstStyle/>
                   <a:p>
-                    <a:fld id="{132672DB-E62E-47F0-8D37-1AC8D0B84ADC}" type="CELLRANGE">
+                    <a:fld id="{105F840F-9DDF-48CF-9411-8D2387DF1316}" type="CELLRANGE">
                       <a:rPr lang="en-GB"/>
                       <a:pPr/>
                       <a:t>[PLAGECELL]</a:t>
@@ -6711,7 +7392,7 @@
                   <a:bodyPr/>
                   <a:lstStyle/>
                   <a:p>
-                    <a:fld id="{8956566F-AC67-44E7-8E5D-DCE4AAFBF9F1}" type="CELLRANGE">
+                    <a:fld id="{B8DFC538-01E9-4A98-B87E-AF22110EB0AE}" type="CELLRANGE">
                       <a:rPr lang="en-GB"/>
                       <a:pPr/>
                       <a:t>[PLAGECELL]</a:t>
@@ -7217,7 +7898,7 @@
                   <a:bodyPr/>
                   <a:lstStyle/>
                   <a:p>
-                    <a:fld id="{14D065AE-B90D-4948-AAE9-4CB3576D33E3}" type="CELLRANGE">
+                    <a:fld id="{546BA666-02C0-4259-BBAA-7E6F3E5AA805}" type="CELLRANGE">
                       <a:rPr lang="en-GB"/>
                       <a:pPr/>
                       <a:t>[PLAGECELL]</a:t>
@@ -7250,7 +7931,7 @@
                   <a:bodyPr/>
                   <a:lstStyle/>
                   <a:p>
-                    <a:fld id="{7FD6416F-C02C-4DED-B379-5698542C265B}" type="CELLRANGE">
+                    <a:fld id="{F1411C73-B6E9-4B82-8F1D-C3C3FDBF11BE}" type="CELLRANGE">
                       <a:rPr lang="en-GB"/>
                       <a:pPr/>
                       <a:t>[PLAGECELL]</a:t>
@@ -7283,7 +7964,7 @@
                   <a:bodyPr/>
                   <a:lstStyle/>
                   <a:p>
-                    <a:fld id="{1C95B18C-E917-4BAC-9B41-4A121012D22D}" type="CELLRANGE">
+                    <a:fld id="{46808DC8-614C-4622-A3D5-06C5FCFC9BE2}" type="CELLRANGE">
                       <a:rPr lang="en-GB"/>
                       <a:pPr/>
                       <a:t>[PLAGECELL]</a:t>
@@ -7316,7 +7997,7 @@
                   <a:bodyPr/>
                   <a:lstStyle/>
                   <a:p>
-                    <a:fld id="{EB03CCE4-FE86-4DFF-8422-A14D4A278B8D}" type="CELLRANGE">
+                    <a:fld id="{F25C887B-B1C8-4E8F-8FFC-03338CC13E08}" type="CELLRANGE">
                       <a:rPr lang="en-GB"/>
                       <a:pPr/>
                       <a:t>[PLAGECELL]</a:t>
@@ -7349,7 +8030,7 @@
                   <a:bodyPr/>
                   <a:lstStyle/>
                   <a:p>
-                    <a:fld id="{4BC4FB64-D000-4ED8-AA79-7BD82E8925C5}" type="CELLRANGE">
+                    <a:fld id="{9B07B190-0059-4110-B986-A20FD7B1576D}" type="CELLRANGE">
                       <a:rPr lang="en-GB"/>
                       <a:pPr/>
                       <a:t>[PLAGECELL]</a:t>
@@ -7382,7 +8063,7 @@
                   <a:bodyPr/>
                   <a:lstStyle/>
                   <a:p>
-                    <a:fld id="{FFF199DA-DAA1-442A-B366-ACD160F13E37}" type="CELLRANGE">
+                    <a:fld id="{D9942DE5-B471-468A-BACD-D4F3DE209D42}" type="CELLRANGE">
                       <a:rPr lang="en-GB"/>
                       <a:pPr/>
                       <a:t>[PLAGECELL]</a:t>
@@ -7415,7 +8096,7 @@
                   <a:bodyPr/>
                   <a:lstStyle/>
                   <a:p>
-                    <a:fld id="{019625B3-57A5-43A6-8DA4-62A7AEF66711}" type="CELLRANGE">
+                    <a:fld id="{F94CC208-AFF7-4195-8C12-41EF735AE70B}" type="CELLRANGE">
                       <a:rPr lang="en-GB"/>
                       <a:pPr/>
                       <a:t>[PLAGECELL]</a:t>
@@ -7448,7 +8129,7 @@
                   <a:bodyPr/>
                   <a:lstStyle/>
                   <a:p>
-                    <a:fld id="{96F2FAC1-7C50-47C6-8944-412B6F7B8C67}" type="CELLRANGE">
+                    <a:fld id="{C7BB440E-5A68-40DA-8CB4-BC89820C1A93}" type="CELLRANGE">
                       <a:rPr lang="en-GB"/>
                       <a:pPr/>
                       <a:t>[PLAGECELL]</a:t>
@@ -7481,7 +8162,7 @@
                   <a:bodyPr/>
                   <a:lstStyle/>
                   <a:p>
-                    <a:fld id="{5E19BCBA-91DB-4543-BAB5-C275763D8C8E}" type="CELLRANGE">
+                    <a:fld id="{186A16B0-565C-4091-8E19-3C87AC957DC1}" type="CELLRANGE">
                       <a:rPr lang="en-GB"/>
                       <a:pPr/>
                       <a:t>[PLAGECELL]</a:t>
@@ -7514,7 +8195,7 @@
                   <a:bodyPr/>
                   <a:lstStyle/>
                   <a:p>
-                    <a:fld id="{327D34A1-3762-4177-8C76-AB36AC70D5ED}" type="CELLRANGE">
+                    <a:fld id="{F3E350C7-9EA4-4CD5-83DE-D2269E0B5584}" type="CELLRANGE">
                       <a:rPr lang="en-GB"/>
                       <a:pPr/>
                       <a:t>[PLAGECELL]</a:t>
@@ -8083,7 +8764,7 @@
                   <a:bodyPr/>
                   <a:lstStyle/>
                   <a:p>
-                    <a:fld id="{2C86DA64-DDAE-4E85-A33F-2C4964E47460}" type="CELLRANGE">
+                    <a:fld id="{96D50A1A-F594-4B84-B970-9913C183C09A}" type="CELLRANGE">
                       <a:rPr lang="en-GB"/>
                       <a:pPr/>
                       <a:t>[PLAGECELL]</a:t>
@@ -8116,7 +8797,7 @@
                   <a:bodyPr/>
                   <a:lstStyle/>
                   <a:p>
-                    <a:fld id="{B31C460F-1A3F-4809-80AD-F6D06162259D}" type="CELLRANGE">
+                    <a:fld id="{B5F2FD87-BE06-44B5-B0D5-743D73C4810B}" type="CELLRANGE">
                       <a:rPr lang="en-GB"/>
                       <a:pPr/>
                       <a:t>[PLAGECELL]</a:t>
@@ -8149,7 +8830,7 @@
                   <a:bodyPr/>
                   <a:lstStyle/>
                   <a:p>
-                    <a:fld id="{CE1B3596-2373-4791-ABB7-DBA79E5F9CA5}" type="CELLRANGE">
+                    <a:fld id="{94D6905F-6B23-4906-9404-ED3EEE6CD171}" type="CELLRANGE">
                       <a:rPr lang="en-GB"/>
                       <a:pPr/>
                       <a:t>[PLAGECELL]</a:t>
@@ -8182,7 +8863,7 @@
                   <a:bodyPr/>
                   <a:lstStyle/>
                   <a:p>
-                    <a:fld id="{336BF3F9-19DD-40A4-B79F-05704E92FED3}" type="CELLRANGE">
+                    <a:fld id="{341CED31-0B1F-4911-8BEC-6E66F66293D1}" type="CELLRANGE">
                       <a:rPr lang="en-GB"/>
                       <a:pPr/>
                       <a:t>[PLAGECELL]</a:t>
@@ -8215,7 +8896,7 @@
                   <a:bodyPr/>
                   <a:lstStyle/>
                   <a:p>
-                    <a:fld id="{65C558CE-03AC-4CE9-86D1-6DE5279F05F3}" type="CELLRANGE">
+                    <a:fld id="{30C16110-E175-4A58-9F15-403CBF8B9DA0}" type="CELLRANGE">
                       <a:rPr lang="en-GB"/>
                       <a:pPr/>
                       <a:t>[PLAGECELL]</a:t>
@@ -8248,7 +8929,7 @@
                   <a:bodyPr/>
                   <a:lstStyle/>
                   <a:p>
-                    <a:fld id="{4518E405-16C1-4D71-BEE9-02E91ECD42CF}" type="CELLRANGE">
+                    <a:fld id="{79EC1A4F-B14C-49FE-92B0-D0D95CAA8479}" type="CELLRANGE">
                       <a:rPr lang="en-GB"/>
                       <a:pPr/>
                       <a:t>[PLAGECELL]</a:t>
@@ -8281,7 +8962,7 @@
                   <a:bodyPr/>
                   <a:lstStyle/>
                   <a:p>
-                    <a:fld id="{E0AC32F7-915F-42F0-89EF-A0D9ECB9DFCA}" type="CELLRANGE">
+                    <a:fld id="{286D942E-01C2-4827-A9CE-A00E15518EDC}" type="CELLRANGE">
                       <a:rPr lang="en-GB"/>
                       <a:pPr/>
                       <a:t>[PLAGECELL]</a:t>
@@ -8314,7 +8995,7 @@
                   <a:bodyPr/>
                   <a:lstStyle/>
                   <a:p>
-                    <a:fld id="{5C45CCB4-BCB6-4444-BB7A-CE3CE37D95B1}" type="CELLRANGE">
+                    <a:fld id="{0D8AB5F0-0AF8-4730-B3A2-89809EE7EDBD}" type="CELLRANGE">
                       <a:rPr lang="en-GB"/>
                       <a:pPr/>
                       <a:t>[PLAGECELL]</a:t>
@@ -8347,7 +9028,7 @@
                   <a:bodyPr/>
                   <a:lstStyle/>
                   <a:p>
-                    <a:fld id="{136A175C-1F2F-41E4-91C6-08AA21212E1A}" type="CELLRANGE">
+                    <a:fld id="{CB25670B-8612-4EED-A653-5CE4A9E2E47D}" type="CELLRANGE">
                       <a:rPr lang="en-GB"/>
                       <a:pPr/>
                       <a:t>[PLAGECELL]</a:t>
@@ -8380,7 +9061,7 @@
                   <a:bodyPr/>
                   <a:lstStyle/>
                   <a:p>
-                    <a:fld id="{7198BD12-D2F8-4994-AD1C-E6C67CF21467}" type="CELLRANGE">
+                    <a:fld id="{EB3B94A3-781F-42F6-90F8-4C39551C7B95}" type="CELLRANGE">
                       <a:rPr lang="en-GB"/>
                       <a:pPr/>
                       <a:t>[PLAGECELL]</a:t>
@@ -8949,7 +9630,7 @@
                   <a:bodyPr/>
                   <a:lstStyle/>
                   <a:p>
-                    <a:fld id="{AAD0B411-8668-4D1F-9291-3B92E21D04FA}" type="CELLRANGE">
+                    <a:fld id="{F06BBE23-AA73-4FBE-AB50-27B7C3C44D3F}" type="CELLRANGE">
                       <a:rPr lang="en-GB"/>
                       <a:pPr/>
                       <a:t>[PLAGECELL]</a:t>
@@ -8982,7 +9663,7 @@
                   <a:bodyPr/>
                   <a:lstStyle/>
                   <a:p>
-                    <a:fld id="{980F6161-2748-4EF6-8D1B-3B321C686C2A}" type="CELLRANGE">
+                    <a:fld id="{E53035AB-A53F-429C-9516-E1EF2F11FE87}" type="CELLRANGE">
                       <a:rPr lang="en-GB"/>
                       <a:pPr/>
                       <a:t>[PLAGECELL]</a:t>
@@ -9015,7 +9696,7 @@
                   <a:bodyPr/>
                   <a:lstStyle/>
                   <a:p>
-                    <a:fld id="{7D861003-4016-4D77-84F5-35852D15396F}" type="CELLRANGE">
+                    <a:fld id="{A2F22EEC-6260-4836-9FB3-779744B72F31}" type="CELLRANGE">
                       <a:rPr lang="en-GB"/>
                       <a:pPr/>
                       <a:t>[PLAGECELL]</a:t>
@@ -9048,7 +9729,7 @@
                   <a:bodyPr/>
                   <a:lstStyle/>
                   <a:p>
-                    <a:fld id="{2100EBA7-936D-453E-921B-96B0E0FECF0E}" type="CELLRANGE">
+                    <a:fld id="{B3FEFC3C-C8C9-4F69-8407-D0FCC201B066}" type="CELLRANGE">
                       <a:rPr lang="en-GB"/>
                       <a:pPr/>
                       <a:t>[PLAGECELL]</a:t>
@@ -9081,7 +9762,7 @@
                   <a:bodyPr/>
                   <a:lstStyle/>
                   <a:p>
-                    <a:fld id="{208F5F80-ACF7-46CB-A7E3-5B4BB6C7C677}" type="CELLRANGE">
+                    <a:fld id="{1B65FBBC-B4C0-49F8-A8C8-31D4601C6C43}" type="CELLRANGE">
                       <a:rPr lang="en-GB"/>
                       <a:pPr/>
                       <a:t>[PLAGECELL]</a:t>
@@ -9114,7 +9795,7 @@
                   <a:bodyPr/>
                   <a:lstStyle/>
                   <a:p>
-                    <a:fld id="{9E180D17-F32C-42EF-9B6A-08EFD8642959}" type="CELLRANGE">
+                    <a:fld id="{3CC873D6-2B9B-4EEB-813C-C98730694036}" type="CELLRANGE">
                       <a:rPr lang="en-GB"/>
                       <a:pPr/>
                       <a:t>[PLAGECELL]</a:t>
@@ -9147,7 +9828,7 @@
                   <a:bodyPr/>
                   <a:lstStyle/>
                   <a:p>
-                    <a:fld id="{9EE2AAAC-5912-4B1A-AAA5-932F09370CD5}" type="CELLRANGE">
+                    <a:fld id="{BA79ED7B-957E-4AE0-B997-CC8785A00351}" type="CELLRANGE">
                       <a:rPr lang="en-GB"/>
                       <a:pPr/>
                       <a:t>[PLAGECELL]</a:t>
@@ -9180,7 +9861,7 @@
                   <a:bodyPr/>
                   <a:lstStyle/>
                   <a:p>
-                    <a:fld id="{095000DB-E04C-4D44-B0CC-C3275F3CA80A}" type="CELLRANGE">
+                    <a:fld id="{6874394B-F16B-4224-B10F-8726D3051836}" type="CELLRANGE">
                       <a:rPr lang="en-GB"/>
                       <a:pPr/>
                       <a:t>[PLAGECELL]</a:t>
@@ -9213,7 +9894,7 @@
                   <a:bodyPr/>
                   <a:lstStyle/>
                   <a:p>
-                    <a:fld id="{32CF5E41-CA01-417D-B57F-24B9CFE63F00}" type="CELLRANGE">
+                    <a:fld id="{D07D18AC-5F4A-4278-B016-5338CACA427C}" type="CELLRANGE">
                       <a:rPr lang="en-GB"/>
                       <a:pPr/>
                       <a:t>[PLAGECELL]</a:t>
@@ -9246,7 +9927,7 @@
                   <a:bodyPr/>
                   <a:lstStyle/>
                   <a:p>
-                    <a:fld id="{CFB5FCAE-CDBF-4EAD-BEA2-B60F2935D414}" type="CELLRANGE">
+                    <a:fld id="{A0521B33-2364-4B4C-87B6-E4327F98009D}" type="CELLRANGE">
                       <a:rPr lang="en-GB"/>
                       <a:pPr/>
                       <a:t>[PLAGECELL]</a:t>
@@ -9732,6 +10413,43 @@
 </cs:colorStyle>
 </file>
 
+<file path=ppt/charts/colors14.xml><?xml version="1.0" encoding="utf-8"?>
+<cs:colorStyle xmlns:cs="http://schemas.microsoft.com/office/drawing/2012/chartStyle" xmlns:a="http://schemas.openxmlformats.org/drawingml/2006/main" meth="cycle" id="12">
+  <a:schemeClr val="accent2"/>
+  <a:schemeClr val="accent4"/>
+  <a:schemeClr val="accent6"/>
+  <cs:variation/>
+  <cs:variation>
+    <a:lumMod val="60000"/>
+  </cs:variation>
+  <cs:variation>
+    <a:lumMod val="80000"/>
+    <a:lumOff val="20000"/>
+  </cs:variation>
+  <cs:variation>
+    <a:lumMod val="80000"/>
+  </cs:variation>
+  <cs:variation>
+    <a:lumMod val="60000"/>
+    <a:lumOff val="40000"/>
+  </cs:variation>
+  <cs:variation>
+    <a:lumMod val="50000"/>
+  </cs:variation>
+  <cs:variation>
+    <a:lumMod val="70000"/>
+    <a:lumOff val="30000"/>
+  </cs:variation>
+  <cs:variation>
+    <a:lumMod val="70000"/>
+  </cs:variation>
+  <cs:variation>
+    <a:lumMod val="50000"/>
+    <a:lumOff val="50000"/>
+  </cs:variation>
+</cs:colorStyle>
+</file>
+
 <file path=ppt/charts/colors2.xml><?xml version="1.0" encoding="utf-8"?>
 <cs:colorStyle xmlns:cs="http://schemas.microsoft.com/office/drawing/2012/chartStyle" xmlns:a="http://schemas.openxmlformats.org/drawingml/2006/main" meth="cycle" id="10">
   <a:schemeClr val="accent1"/>
@@ -12638,6 +13356,525 @@
 </cs:chartStyle>
 </file>
 
+<file path=ppt/charts/style14.xml><?xml version="1.0" encoding="utf-8"?>
+<cs:chartStyle xmlns:cs="http://schemas.microsoft.com/office/drawing/2012/chartStyle" xmlns:a="http://schemas.openxmlformats.org/drawingml/2006/main" id="251">
+  <cs:axisTitle>
+    <cs:lnRef idx="0"/>
+    <cs:fillRef idx="0"/>
+    <cs:effectRef idx="0"/>
+    <cs:fontRef idx="minor">
+      <a:schemeClr val="tx1">
+        <a:lumMod val="65000"/>
+        <a:lumOff val="35000"/>
+      </a:schemeClr>
+    </cs:fontRef>
+    <cs:defRPr sz="1330" kern="1200"/>
+  </cs:axisTitle>
+  <cs:categoryAxis>
+    <cs:lnRef idx="0"/>
+    <cs:fillRef idx="0"/>
+    <cs:effectRef idx="0"/>
+    <cs:fontRef idx="minor">
+      <a:schemeClr val="tx1">
+        <a:lumMod val="65000"/>
+        <a:lumOff val="35000"/>
+      </a:schemeClr>
+    </cs:fontRef>
+    <cs:spPr>
+      <a:ln w="9525" cap="flat" cmpd="sng" algn="ctr">
+        <a:solidFill>
+          <a:schemeClr val="tx1">
+            <a:lumMod val="15000"/>
+            <a:lumOff val="85000"/>
+          </a:schemeClr>
+        </a:solidFill>
+        <a:round/>
+      </a:ln>
+    </cs:spPr>
+    <cs:defRPr sz="1197" kern="1200"/>
+  </cs:categoryAxis>
+  <cs:chartArea mods="allowNoFillOverride allowNoLineOverride">
+    <cs:lnRef idx="0"/>
+    <cs:fillRef idx="0"/>
+    <cs:effectRef idx="0"/>
+    <cs:fontRef idx="minor">
+      <a:schemeClr val="tx1"/>
+    </cs:fontRef>
+    <cs:spPr>
+      <a:solidFill>
+        <a:schemeClr val="bg1"/>
+      </a:solidFill>
+      <a:ln w="9525" cap="flat" cmpd="sng" algn="ctr">
+        <a:solidFill>
+          <a:schemeClr val="tx1">
+            <a:lumMod val="15000"/>
+            <a:lumOff val="85000"/>
+          </a:schemeClr>
+        </a:solidFill>
+        <a:round/>
+      </a:ln>
+    </cs:spPr>
+    <cs:defRPr sz="1197" kern="1200"/>
+  </cs:chartArea>
+  <cs:dataLabel>
+    <cs:lnRef idx="0"/>
+    <cs:fillRef idx="0"/>
+    <cs:effectRef idx="0"/>
+    <cs:fontRef idx="minor">
+      <a:schemeClr val="tx1">
+        <a:lumMod val="75000"/>
+        <a:lumOff val="25000"/>
+      </a:schemeClr>
+    </cs:fontRef>
+    <cs:defRPr sz="1197" kern="1200"/>
+  </cs:dataLabel>
+  <cs:dataLabelCallout>
+    <cs:lnRef idx="0"/>
+    <cs:fillRef idx="0"/>
+    <cs:effectRef idx="0"/>
+    <cs:fontRef idx="minor">
+      <a:schemeClr val="dk1">
+        <a:lumMod val="65000"/>
+        <a:lumOff val="35000"/>
+      </a:schemeClr>
+    </cs:fontRef>
+    <cs:spPr>
+      <a:solidFill>
+        <a:schemeClr val="lt1"/>
+      </a:solidFill>
+      <a:ln>
+        <a:solidFill>
+          <a:schemeClr val="dk1">
+            <a:lumMod val="25000"/>
+            <a:lumOff val="75000"/>
+          </a:schemeClr>
+        </a:solidFill>
+      </a:ln>
+    </cs:spPr>
+    <cs:defRPr sz="1197" kern="1200"/>
+    <cs:bodyPr rot="0" spcFirstLastPara="1" vertOverflow="clip" horzOverflow="clip" vert="horz" wrap="square" lIns="36576" tIns="18288" rIns="36576" bIns="18288" anchor="ctr" anchorCtr="1">
+      <a:spAutoFit/>
+    </cs:bodyPr>
+  </cs:dataLabelCallout>
+  <cs:dataPoint>
+    <cs:lnRef idx="0"/>
+    <cs:fillRef idx="1">
+      <cs:styleClr val="auto"/>
+    </cs:fillRef>
+    <cs:effectRef idx="0"/>
+    <cs:fontRef idx="minor">
+      <a:schemeClr val="tx1"/>
+    </cs:fontRef>
+    <cs:spPr>
+      <a:ln w="19050">
+        <a:solidFill>
+          <a:schemeClr val="lt1"/>
+        </a:solidFill>
+      </a:ln>
+    </cs:spPr>
+  </cs:dataPoint>
+  <cs:dataPoint3D>
+    <cs:lnRef idx="0"/>
+    <cs:fillRef idx="1">
+      <cs:styleClr val="auto"/>
+    </cs:fillRef>
+    <cs:effectRef idx="0"/>
+    <cs:fontRef idx="minor">
+      <a:schemeClr val="tx1"/>
+    </cs:fontRef>
+    <cs:spPr>
+      <a:ln w="25400">
+        <a:solidFill>
+          <a:schemeClr val="lt1"/>
+        </a:solidFill>
+      </a:ln>
+    </cs:spPr>
+  </cs:dataPoint3D>
+  <cs:dataPointLine>
+    <cs:lnRef idx="0">
+      <cs:styleClr val="auto"/>
+    </cs:lnRef>
+    <cs:fillRef idx="0"/>
+    <cs:effectRef idx="0"/>
+    <cs:fontRef idx="minor">
+      <a:schemeClr val="tx1"/>
+    </cs:fontRef>
+    <cs:spPr>
+      <a:ln w="28575" cap="rnd">
+        <a:solidFill>
+          <a:schemeClr val="phClr"/>
+        </a:solidFill>
+        <a:round/>
+      </a:ln>
+    </cs:spPr>
+  </cs:dataPointLine>
+  <cs:dataPointMarker>
+    <cs:lnRef idx="0">
+      <cs:styleClr val="auto"/>
+    </cs:lnRef>
+    <cs:fillRef idx="1">
+      <cs:styleClr val="auto"/>
+    </cs:fillRef>
+    <cs:effectRef idx="0"/>
+    <cs:fontRef idx="minor">
+      <a:schemeClr val="tx1"/>
+    </cs:fontRef>
+    <cs:spPr>
+      <a:ln w="9525">
+        <a:solidFill>
+          <a:schemeClr val="phClr"/>
+        </a:solidFill>
+      </a:ln>
+    </cs:spPr>
+  </cs:dataPointMarker>
+  <cs:dataPointMarkerLayout symbol="circle" size="5"/>
+  <cs:dataPointWireframe>
+    <cs:lnRef idx="0">
+      <cs:styleClr val="auto"/>
+    </cs:lnRef>
+    <cs:fillRef idx="0"/>
+    <cs:effectRef idx="0"/>
+    <cs:fontRef idx="minor">
+      <a:schemeClr val="tx1"/>
+    </cs:fontRef>
+    <cs:spPr>
+      <a:ln w="9525" cap="rnd">
+        <a:solidFill>
+          <a:schemeClr val="phClr"/>
+        </a:solidFill>
+        <a:round/>
+      </a:ln>
+    </cs:spPr>
+  </cs:dataPointWireframe>
+  <cs:dataTable>
+    <cs:lnRef idx="0"/>
+    <cs:fillRef idx="0"/>
+    <cs:effectRef idx="0"/>
+    <cs:fontRef idx="minor">
+      <a:schemeClr val="tx1">
+        <a:lumMod val="65000"/>
+        <a:lumOff val="35000"/>
+      </a:schemeClr>
+    </cs:fontRef>
+    <cs:spPr>
+      <a:noFill/>
+      <a:ln w="9525" cap="flat" cmpd="sng" algn="ctr">
+        <a:solidFill>
+          <a:schemeClr val="tx1">
+            <a:lumMod val="15000"/>
+            <a:lumOff val="85000"/>
+          </a:schemeClr>
+        </a:solidFill>
+        <a:round/>
+      </a:ln>
+    </cs:spPr>
+    <cs:defRPr sz="1197" kern="1200"/>
+  </cs:dataTable>
+  <cs:downBar>
+    <cs:lnRef idx="0"/>
+    <cs:fillRef idx="0"/>
+    <cs:effectRef idx="0"/>
+    <cs:fontRef idx="minor">
+      <a:schemeClr val="tx1"/>
+    </cs:fontRef>
+    <cs:spPr>
+      <a:solidFill>
+        <a:schemeClr val="dk1">
+          <a:lumMod val="75000"/>
+          <a:lumOff val="25000"/>
+        </a:schemeClr>
+      </a:solidFill>
+      <a:ln w="9525" cap="flat" cmpd="sng" algn="ctr">
+        <a:solidFill>
+          <a:schemeClr val="tx1">
+            <a:lumMod val="65000"/>
+            <a:lumOff val="35000"/>
+          </a:schemeClr>
+        </a:solidFill>
+        <a:round/>
+      </a:ln>
+    </cs:spPr>
+  </cs:downBar>
+  <cs:dropLine>
+    <cs:lnRef idx="0"/>
+    <cs:fillRef idx="0"/>
+    <cs:effectRef idx="0"/>
+    <cs:fontRef idx="minor">
+      <a:schemeClr val="tx1"/>
+    </cs:fontRef>
+    <cs:spPr>
+      <a:ln w="9525" cap="flat" cmpd="sng" algn="ctr">
+        <a:solidFill>
+          <a:schemeClr val="tx1">
+            <a:lumMod val="35000"/>
+            <a:lumOff val="65000"/>
+          </a:schemeClr>
+        </a:solidFill>
+        <a:round/>
+      </a:ln>
+    </cs:spPr>
+  </cs:dropLine>
+  <cs:errorBar>
+    <cs:lnRef idx="0"/>
+    <cs:fillRef idx="0"/>
+    <cs:effectRef idx="0"/>
+    <cs:fontRef idx="minor">
+      <a:schemeClr val="tx1"/>
+    </cs:fontRef>
+    <cs:spPr>
+      <a:ln w="9525" cap="flat" cmpd="sng" algn="ctr">
+        <a:solidFill>
+          <a:schemeClr val="tx1">
+            <a:lumMod val="65000"/>
+            <a:lumOff val="35000"/>
+          </a:schemeClr>
+        </a:solidFill>
+        <a:round/>
+      </a:ln>
+    </cs:spPr>
+  </cs:errorBar>
+  <cs:floor>
+    <cs:lnRef idx="0"/>
+    <cs:fillRef idx="0"/>
+    <cs:effectRef idx="0"/>
+    <cs:fontRef idx="minor">
+      <a:schemeClr val="tx1"/>
+    </cs:fontRef>
+    <cs:spPr>
+      <a:noFill/>
+      <a:ln>
+        <a:noFill/>
+      </a:ln>
+    </cs:spPr>
+  </cs:floor>
+  <cs:gridlineMajor>
+    <cs:lnRef idx="0"/>
+    <cs:fillRef idx="0"/>
+    <cs:effectRef idx="0"/>
+    <cs:fontRef idx="minor">
+      <a:schemeClr val="tx1"/>
+    </cs:fontRef>
+    <cs:spPr>
+      <a:ln w="9525" cap="flat" cmpd="sng" algn="ctr">
+        <a:solidFill>
+          <a:schemeClr val="tx1">
+            <a:lumMod val="15000"/>
+            <a:lumOff val="85000"/>
+          </a:schemeClr>
+        </a:solidFill>
+        <a:round/>
+      </a:ln>
+    </cs:spPr>
+  </cs:gridlineMajor>
+  <cs:gridlineMinor>
+    <cs:lnRef idx="0"/>
+    <cs:fillRef idx="0"/>
+    <cs:effectRef idx="0"/>
+    <cs:fontRef idx="minor">
+      <a:schemeClr val="tx1"/>
+    </cs:fontRef>
+    <cs:spPr>
+      <a:ln w="9525" cap="flat" cmpd="sng" algn="ctr">
+        <a:solidFill>
+          <a:schemeClr val="tx1">
+            <a:lumMod val="5000"/>
+            <a:lumOff val="95000"/>
+          </a:schemeClr>
+        </a:solidFill>
+        <a:round/>
+      </a:ln>
+    </cs:spPr>
+  </cs:gridlineMinor>
+  <cs:hiLoLine>
+    <cs:lnRef idx="0"/>
+    <cs:fillRef idx="0"/>
+    <cs:effectRef idx="0"/>
+    <cs:fontRef idx="minor">
+      <a:schemeClr val="tx1"/>
+    </cs:fontRef>
+    <cs:spPr>
+      <a:ln w="9525" cap="flat" cmpd="sng" algn="ctr">
+        <a:solidFill>
+          <a:schemeClr val="tx1">
+            <a:lumMod val="50000"/>
+            <a:lumOff val="50000"/>
+          </a:schemeClr>
+        </a:solidFill>
+        <a:round/>
+      </a:ln>
+    </cs:spPr>
+  </cs:hiLoLine>
+  <cs:leaderLine>
+    <cs:lnRef idx="0"/>
+    <cs:fillRef idx="0"/>
+    <cs:effectRef idx="0"/>
+    <cs:fontRef idx="minor">
+      <a:schemeClr val="tx1"/>
+    </cs:fontRef>
+    <cs:spPr>
+      <a:ln w="9525" cap="flat" cmpd="sng" algn="ctr">
+        <a:solidFill>
+          <a:schemeClr val="tx1">
+            <a:lumMod val="35000"/>
+            <a:lumOff val="65000"/>
+          </a:schemeClr>
+        </a:solidFill>
+        <a:round/>
+      </a:ln>
+    </cs:spPr>
+  </cs:leaderLine>
+  <cs:legend>
+    <cs:lnRef idx="0"/>
+    <cs:fillRef idx="0"/>
+    <cs:effectRef idx="0"/>
+    <cs:fontRef idx="minor">
+      <a:schemeClr val="tx1">
+        <a:lumMod val="65000"/>
+        <a:lumOff val="35000"/>
+      </a:schemeClr>
+    </cs:fontRef>
+    <cs:defRPr sz="1197" kern="1200"/>
+  </cs:legend>
+  <cs:plotArea mods="allowNoFillOverride allowNoLineOverride">
+    <cs:lnRef idx="0"/>
+    <cs:fillRef idx="0"/>
+    <cs:effectRef idx="0"/>
+    <cs:fontRef idx="minor">
+      <a:schemeClr val="tx1"/>
+    </cs:fontRef>
+  </cs:plotArea>
+  <cs:plotArea3D mods="allowNoFillOverride allowNoLineOverride">
+    <cs:lnRef idx="0"/>
+    <cs:fillRef idx="0"/>
+    <cs:effectRef idx="0"/>
+    <cs:fontRef idx="minor">
+      <a:schemeClr val="tx1"/>
+    </cs:fontRef>
+  </cs:plotArea3D>
+  <cs:seriesAxis>
+    <cs:lnRef idx="0"/>
+    <cs:fillRef idx="0"/>
+    <cs:effectRef idx="0"/>
+    <cs:fontRef idx="minor">
+      <a:schemeClr val="tx1">
+        <a:lumMod val="65000"/>
+        <a:lumOff val="35000"/>
+      </a:schemeClr>
+    </cs:fontRef>
+    <cs:defRPr sz="1197" kern="1200"/>
+  </cs:seriesAxis>
+  <cs:seriesLine>
+    <cs:lnRef idx="0"/>
+    <cs:fillRef idx="0"/>
+    <cs:effectRef idx="0"/>
+    <cs:fontRef idx="minor">
+      <a:schemeClr val="tx1"/>
+    </cs:fontRef>
+    <cs:spPr>
+      <a:ln w="9525" cap="flat" cmpd="sng" algn="ctr">
+        <a:solidFill>
+          <a:schemeClr val="tx1">
+            <a:lumMod val="35000"/>
+            <a:lumOff val="65000"/>
+          </a:schemeClr>
+        </a:solidFill>
+        <a:round/>
+      </a:ln>
+    </cs:spPr>
+  </cs:seriesLine>
+  <cs:title>
+    <cs:lnRef idx="0"/>
+    <cs:fillRef idx="0"/>
+    <cs:effectRef idx="0"/>
+    <cs:fontRef idx="minor">
+      <a:schemeClr val="tx1">
+        <a:lumMod val="65000"/>
+        <a:lumOff val="35000"/>
+      </a:schemeClr>
+    </cs:fontRef>
+    <cs:defRPr sz="1862" b="0" kern="1200" spc="0" baseline="0"/>
+  </cs:title>
+  <cs:trendline>
+    <cs:lnRef idx="0">
+      <cs:styleClr val="auto"/>
+    </cs:lnRef>
+    <cs:fillRef idx="0"/>
+    <cs:effectRef idx="0"/>
+    <cs:fontRef idx="minor">
+      <a:schemeClr val="tx1"/>
+    </cs:fontRef>
+    <cs:spPr>
+      <a:ln w="19050" cap="rnd">
+        <a:solidFill>
+          <a:schemeClr val="phClr"/>
+        </a:solidFill>
+        <a:prstDash val="sysDot"/>
+      </a:ln>
+    </cs:spPr>
+  </cs:trendline>
+  <cs:trendlineLabel>
+    <cs:lnRef idx="0"/>
+    <cs:fillRef idx="0"/>
+    <cs:effectRef idx="0"/>
+    <cs:fontRef idx="minor">
+      <a:schemeClr val="tx1">
+        <a:lumMod val="65000"/>
+        <a:lumOff val="35000"/>
+      </a:schemeClr>
+    </cs:fontRef>
+    <cs:defRPr sz="1197" kern="1200"/>
+  </cs:trendlineLabel>
+  <cs:upBar>
+    <cs:lnRef idx="0"/>
+    <cs:fillRef idx="0"/>
+    <cs:effectRef idx="0"/>
+    <cs:fontRef idx="minor">
+      <a:schemeClr val="tx1"/>
+    </cs:fontRef>
+    <cs:spPr>
+      <a:solidFill>
+        <a:schemeClr val="lt1"/>
+      </a:solidFill>
+      <a:ln w="9525" cap="flat" cmpd="sng" algn="ctr">
+        <a:solidFill>
+          <a:schemeClr val="tx1">
+            <a:lumMod val="65000"/>
+            <a:lumOff val="35000"/>
+          </a:schemeClr>
+        </a:solidFill>
+        <a:round/>
+      </a:ln>
+    </cs:spPr>
+  </cs:upBar>
+  <cs:valueAxis>
+    <cs:lnRef idx="0"/>
+    <cs:fillRef idx="0"/>
+    <cs:effectRef idx="0"/>
+    <cs:fontRef idx="minor">
+      <a:schemeClr val="tx1">
+        <a:lumMod val="65000"/>
+        <a:lumOff val="35000"/>
+      </a:schemeClr>
+    </cs:fontRef>
+    <cs:defRPr sz="1197" kern="1200"/>
+  </cs:valueAxis>
+  <cs:wall>
+    <cs:lnRef idx="0"/>
+    <cs:fillRef idx="0"/>
+    <cs:effectRef idx="0"/>
+    <cs:fontRef idx="minor">
+      <a:schemeClr val="tx1"/>
+    </cs:fontRef>
+    <cs:spPr>
+      <a:noFill/>
+      <a:ln>
+        <a:noFill/>
+      </a:ln>
+    </cs:spPr>
+  </cs:wall>
+</cs:chartStyle>
+</file>
+
 <file path=ppt/charts/style2.xml><?xml version="1.0" encoding="utf-8"?>
 <cs:chartStyle xmlns:cs="http://schemas.microsoft.com/office/drawing/2012/chartStyle" xmlns:a="http://schemas.openxmlformats.org/drawingml/2006/main" id="251">
   <cs:axisTitle>
@@ -16937,7 +18174,7 @@
           <a:p>
             <a:fld id="{5D8C8274-AA4F-429F-9B82-7A72192A35BB}" type="datetimeFigureOut">
               <a:rPr lang="fr-FR" smtClean="0"/>
-              <a:t>06/02/2024</a:t>
+              <a:t>21/02/2024</a:t>
             </a:fld>
             <a:endParaRPr lang="fr-FR"/>
           </a:p>
@@ -17135,7 +18372,7 @@
           <a:p>
             <a:fld id="{5D8C8274-AA4F-429F-9B82-7A72192A35BB}" type="datetimeFigureOut">
               <a:rPr lang="fr-FR" smtClean="0"/>
-              <a:t>06/02/2024</a:t>
+              <a:t>21/02/2024</a:t>
             </a:fld>
             <a:endParaRPr lang="fr-FR"/>
           </a:p>
@@ -17343,7 +18580,7 @@
           <a:p>
             <a:fld id="{5D8C8274-AA4F-429F-9B82-7A72192A35BB}" type="datetimeFigureOut">
               <a:rPr lang="fr-FR" smtClean="0"/>
-              <a:t>06/02/2024</a:t>
+              <a:t>21/02/2024</a:t>
             </a:fld>
             <a:endParaRPr lang="fr-FR"/>
           </a:p>
@@ -17541,7 +18778,7 @@
           <a:p>
             <a:fld id="{5D8C8274-AA4F-429F-9B82-7A72192A35BB}" type="datetimeFigureOut">
               <a:rPr lang="fr-FR" smtClean="0"/>
-              <a:t>06/02/2024</a:t>
+              <a:t>21/02/2024</a:t>
             </a:fld>
             <a:endParaRPr lang="fr-FR"/>
           </a:p>
@@ -17816,7 +19053,7 @@
           <a:p>
             <a:fld id="{5D8C8274-AA4F-429F-9B82-7A72192A35BB}" type="datetimeFigureOut">
               <a:rPr lang="fr-FR" smtClean="0"/>
-              <a:t>06/02/2024</a:t>
+              <a:t>21/02/2024</a:t>
             </a:fld>
             <a:endParaRPr lang="fr-FR"/>
           </a:p>
@@ -18081,7 +19318,7 @@
           <a:p>
             <a:fld id="{5D8C8274-AA4F-429F-9B82-7A72192A35BB}" type="datetimeFigureOut">
               <a:rPr lang="fr-FR" smtClean="0"/>
-              <a:t>06/02/2024</a:t>
+              <a:t>21/02/2024</a:t>
             </a:fld>
             <a:endParaRPr lang="fr-FR"/>
           </a:p>
@@ -18493,7 +19730,7 @@
           <a:p>
             <a:fld id="{5D8C8274-AA4F-429F-9B82-7A72192A35BB}" type="datetimeFigureOut">
               <a:rPr lang="fr-FR" smtClean="0"/>
-              <a:t>06/02/2024</a:t>
+              <a:t>21/02/2024</a:t>
             </a:fld>
             <a:endParaRPr lang="fr-FR"/>
           </a:p>
@@ -18634,7 +19871,7 @@
           <a:p>
             <a:fld id="{5D8C8274-AA4F-429F-9B82-7A72192A35BB}" type="datetimeFigureOut">
               <a:rPr lang="fr-FR" smtClean="0"/>
-              <a:t>06/02/2024</a:t>
+              <a:t>21/02/2024</a:t>
             </a:fld>
             <a:endParaRPr lang="fr-FR"/>
           </a:p>
@@ -18747,7 +19984,7 @@
           <a:p>
             <a:fld id="{5D8C8274-AA4F-429F-9B82-7A72192A35BB}" type="datetimeFigureOut">
               <a:rPr lang="fr-FR" smtClean="0"/>
-              <a:t>06/02/2024</a:t>
+              <a:t>21/02/2024</a:t>
             </a:fld>
             <a:endParaRPr lang="fr-FR"/>
           </a:p>
@@ -19058,7 +20295,7 @@
           <a:p>
             <a:fld id="{5D8C8274-AA4F-429F-9B82-7A72192A35BB}" type="datetimeFigureOut">
               <a:rPr lang="fr-FR" smtClean="0"/>
-              <a:t>06/02/2024</a:t>
+              <a:t>21/02/2024</a:t>
             </a:fld>
             <a:endParaRPr lang="fr-FR"/>
           </a:p>
@@ -19346,7 +20583,7 @@
           <a:p>
             <a:fld id="{5D8C8274-AA4F-429F-9B82-7A72192A35BB}" type="datetimeFigureOut">
               <a:rPr lang="fr-FR" smtClean="0"/>
-              <a:t>06/02/2024</a:t>
+              <a:t>21/02/2024</a:t>
             </a:fld>
             <a:endParaRPr lang="fr-FR"/>
           </a:p>
@@ -19587,7 +20824,7 @@
           <a:p>
             <a:fld id="{5D8C8274-AA4F-429F-9B82-7A72192A35BB}" type="datetimeFigureOut">
               <a:rPr lang="fr-FR" smtClean="0"/>
-              <a:t>06/02/2024</a:t>
+              <a:t>21/02/2024</a:t>
             </a:fld>
             <a:endParaRPr lang="fr-FR"/>
           </a:p>
@@ -21569,6 +22806,64 @@
     <p:extLst>
       <p:ext uri="{BB962C8B-B14F-4D97-AF65-F5344CB8AC3E}">
         <p14:creationId xmlns:p14="http://schemas.microsoft.com/office/powerpoint/2010/main" val="2991204706"/>
+      </p:ext>
+    </p:extLst>
+  </p:cSld>
+  <p:clrMapOvr>
+    <a:masterClrMapping/>
+  </p:clrMapOvr>
+</p:sld>
+</file>
+
+<file path=ppt/slides/slide14.xml><?xml version="1.0" encoding="utf-8"?>
+<p:sld xmlns:a="http://schemas.openxmlformats.org/drawingml/2006/main" xmlns:r="http://schemas.openxmlformats.org/officeDocument/2006/relationships" xmlns:p="http://schemas.openxmlformats.org/presentationml/2006/main">
+  <p:cSld>
+    <p:spTree>
+      <p:nvGrpSpPr>
+        <p:cNvPr id="1" name=""/>
+        <p:cNvGrpSpPr/>
+        <p:nvPr/>
+      </p:nvGrpSpPr>
+      <p:grpSpPr>
+        <a:xfrm>
+          <a:off x="0" y="0"/>
+          <a:ext cx="0" cy="0"/>
+          <a:chOff x="0" y="0"/>
+          <a:chExt cx="0" cy="0"/>
+        </a:xfrm>
+      </p:grpSpPr>
+      <p:graphicFrame>
+        <p:nvGraphicFramePr>
+          <p:cNvPr id="4" name="Graphique 3">
+            <a:extLst>
+              <a:ext uri="{FF2B5EF4-FFF2-40B4-BE49-F238E27FC236}">
+                <a16:creationId xmlns:a16="http://schemas.microsoft.com/office/drawing/2014/main" id="{1F0552EC-6D9A-4568-AEA9-656E7C6260B5}"/>
+              </a:ext>
+            </a:extLst>
+          </p:cNvPr>
+          <p:cNvGraphicFramePr/>
+          <p:nvPr>
+            <p:extLst>
+              <p:ext uri="{D42A27DB-BD31-4B8C-83A1-F6EECF244321}">
+                <p14:modId xmlns:p14="http://schemas.microsoft.com/office/powerpoint/2010/main" val="635653935"/>
+              </p:ext>
+            </p:extLst>
+          </p:nvPr>
+        </p:nvGraphicFramePr>
+        <p:xfrm>
+          <a:off x="635946" y="1167357"/>
+          <a:ext cx="9765355" cy="4761080"/>
+        </p:xfrm>
+        <a:graphic>
+          <a:graphicData uri="http://schemas.openxmlformats.org/drawingml/2006/chart">
+            <c:chart xmlns:c="http://schemas.openxmlformats.org/drawingml/2006/chart" xmlns:r="http://schemas.openxmlformats.org/officeDocument/2006/relationships" r:id="rId2"/>
+          </a:graphicData>
+        </a:graphic>
+      </p:graphicFrame>
+    </p:spTree>
+    <p:extLst>
+      <p:ext uri="{BB962C8B-B14F-4D97-AF65-F5344CB8AC3E}">
+        <p14:creationId xmlns:p14="http://schemas.microsoft.com/office/powerpoint/2010/main" val="2608137371"/>
       </p:ext>
     </p:extLst>
   </p:cSld>

</xml_diff>